<commit_message>
some more work. added two videos.
</commit_message>
<xml_diff>
--- a/images/anchors.pptx
+++ b/images/anchors.pptx
@@ -12,7 +12,7 @@
     <p:sldId id="260" r:id="rId3"/>
     <p:sldId id="258" r:id="rId4"/>
     <p:sldId id="257" r:id="rId5"/>
-    <p:sldId id="259" r:id="rId6"/>
+    <p:sldId id="261" r:id="rId6"/>
   </p:sldIdLst>
   <p:sldSz cx="2743200" cy="914400"/>
   <p:notesSz cx="6858000" cy="9144000"/>
@@ -3791,150 +3791,158 @@
 </file>
 
 <file path=ppt/diagrams/colors5.xml><?xml version="1.0" encoding="utf-8"?>
-<dgm:colorsDef xmlns:dgm="http://schemas.openxmlformats.org/drawingml/2006/diagram" xmlns:a="http://schemas.openxmlformats.org/drawingml/2006/main" uniqueId="urn:microsoft.com/office/officeart/2005/8/colors/accent2_1">
+<dgm:colorsDef xmlns:dgm="http://schemas.openxmlformats.org/drawingml/2006/diagram" xmlns:a="http://schemas.openxmlformats.org/drawingml/2006/main" uniqueId="urn:microsoft.com/office/officeart/2005/8/colors/colorful1">
   <dgm:title val=""/>
   <dgm:desc val=""/>
   <dgm:catLst>
-    <dgm:cat type="accent2" pri="11100"/>
+    <dgm:cat type="colorful" pri="10100"/>
   </dgm:catLst>
   <dgm:styleLbl name="node0">
     <dgm:fillClrLst meth="repeat">
-      <a:schemeClr val="lt1"/>
+      <a:schemeClr val="accent1"/>
     </dgm:fillClrLst>
     <dgm:linClrLst meth="repeat">
-      <a:schemeClr val="accent2">
-        <a:shade val="80000"/>
-      </a:schemeClr>
-    </dgm:linClrLst>
-    <dgm:effectClrLst/>
-    <dgm:txLinClrLst/>
-    <dgm:txFillClrLst meth="repeat">
-      <a:schemeClr val="dk1"/>
-    </dgm:txFillClrLst>
-    <dgm:txEffectClrLst/>
-  </dgm:styleLbl>
-  <dgm:styleLbl name="node1">
-    <dgm:fillClrLst meth="repeat">
       <a:schemeClr val="lt1"/>
-    </dgm:fillClrLst>
-    <dgm:linClrLst meth="repeat">
-      <a:schemeClr val="accent2">
-        <a:shade val="80000"/>
-      </a:schemeClr>
-    </dgm:linClrLst>
-    <dgm:effectClrLst/>
-    <dgm:txLinClrLst/>
-    <dgm:txFillClrLst meth="repeat">
-      <a:schemeClr val="dk1"/>
-    </dgm:txFillClrLst>
-    <dgm:txEffectClrLst/>
-  </dgm:styleLbl>
-  <dgm:styleLbl name="alignNode1">
-    <dgm:fillClrLst meth="repeat">
-      <a:schemeClr val="lt1"/>
-    </dgm:fillClrLst>
-    <dgm:linClrLst meth="repeat">
-      <a:schemeClr val="accent2">
-        <a:shade val="80000"/>
-      </a:schemeClr>
-    </dgm:linClrLst>
-    <dgm:effectClrLst/>
-    <dgm:txLinClrLst/>
-    <dgm:txFillClrLst meth="repeat">
-      <a:schemeClr val="dk1"/>
-    </dgm:txFillClrLst>
-    <dgm:txEffectClrLst/>
-  </dgm:styleLbl>
-  <dgm:styleLbl name="lnNode1">
-    <dgm:fillClrLst meth="repeat">
-      <a:schemeClr val="lt1"/>
-    </dgm:fillClrLst>
-    <dgm:linClrLst meth="repeat">
-      <a:schemeClr val="accent2">
-        <a:shade val="80000"/>
-      </a:schemeClr>
-    </dgm:linClrLst>
-    <dgm:effectClrLst/>
-    <dgm:txLinClrLst/>
-    <dgm:txFillClrLst meth="repeat">
-      <a:schemeClr val="dk1"/>
-    </dgm:txFillClrLst>
-    <dgm:txEffectClrLst/>
-  </dgm:styleLbl>
-  <dgm:styleLbl name="vennNode1">
-    <dgm:fillClrLst meth="repeat">
-      <a:schemeClr val="lt1">
-        <a:alpha val="50000"/>
-      </a:schemeClr>
-    </dgm:fillClrLst>
-    <dgm:linClrLst meth="repeat">
-      <a:schemeClr val="accent2">
-        <a:shade val="80000"/>
-      </a:schemeClr>
     </dgm:linClrLst>
     <dgm:effectClrLst/>
     <dgm:txLinClrLst/>
     <dgm:txFillClrLst/>
     <dgm:txEffectClrLst/>
   </dgm:styleLbl>
-  <dgm:styleLbl name="node2">
+  <dgm:styleLbl name="node1">
     <dgm:fillClrLst meth="repeat">
-      <a:schemeClr val="lt1"/>
+      <a:schemeClr val="accent2"/>
+      <a:schemeClr val="accent3"/>
+      <a:schemeClr val="accent4"/>
+      <a:schemeClr val="accent5"/>
+      <a:schemeClr val="accent6"/>
     </dgm:fillClrLst>
     <dgm:linClrLst meth="repeat">
-      <a:schemeClr val="accent2">
-        <a:shade val="80000"/>
-      </a:schemeClr>
+      <a:schemeClr val="lt1"/>
     </dgm:linClrLst>
     <dgm:effectClrLst/>
     <dgm:txLinClrLst/>
-    <dgm:txFillClrLst meth="repeat">
-      <a:schemeClr val="dk1"/>
-    </dgm:txFillClrLst>
+    <dgm:txFillClrLst/>
     <dgm:txEffectClrLst/>
   </dgm:styleLbl>
-  <dgm:styleLbl name="node3">
+  <dgm:styleLbl name="alignNode1">
     <dgm:fillClrLst meth="repeat">
-      <a:schemeClr val="lt1"/>
+      <a:schemeClr val="accent2"/>
+      <a:schemeClr val="accent3"/>
+      <a:schemeClr val="accent4"/>
+      <a:schemeClr val="accent5"/>
+      <a:schemeClr val="accent6"/>
     </dgm:fillClrLst>
     <dgm:linClrLst meth="repeat">
-      <a:schemeClr val="accent2">
-        <a:shade val="80000"/>
-      </a:schemeClr>
+      <a:schemeClr val="accent2"/>
+      <a:schemeClr val="accent3"/>
+      <a:schemeClr val="accent4"/>
+      <a:schemeClr val="accent5"/>
+      <a:schemeClr val="accent6"/>
     </dgm:linClrLst>
     <dgm:effectClrLst/>
     <dgm:txLinClrLst/>
-    <dgm:txFillClrLst meth="repeat">
-      <a:schemeClr val="dk1"/>
-    </dgm:txFillClrLst>
+    <dgm:txFillClrLst/>
     <dgm:txEffectClrLst/>
   </dgm:styleLbl>
-  <dgm:styleLbl name="node4">
+  <dgm:styleLbl name="lnNode1">
     <dgm:fillClrLst meth="repeat">
-      <a:schemeClr val="lt1"/>
+      <a:schemeClr val="accent2"/>
+      <a:schemeClr val="accent3"/>
+      <a:schemeClr val="accent4"/>
+      <a:schemeClr val="accent5"/>
+      <a:schemeClr val="accent6"/>
     </dgm:fillClrLst>
     <dgm:linClrLst meth="repeat">
-      <a:schemeClr val="accent2">
-        <a:shade val="80000"/>
-      </a:schemeClr>
+      <a:schemeClr val="lt1"/>
     </dgm:linClrLst>
     <dgm:effectClrLst/>
     <dgm:txLinClrLst/>
-    <dgm:txFillClrLst meth="repeat">
-      <a:schemeClr val="dk1"/>
-    </dgm:txFillClrLst>
+    <dgm:txFillClrLst/>
+    <dgm:txEffectClrLst/>
+  </dgm:styleLbl>
+  <dgm:styleLbl name="vennNode1">
+    <dgm:fillClrLst meth="repeat">
+      <a:schemeClr val="accent2">
+        <a:alpha val="50000"/>
+      </a:schemeClr>
+      <a:schemeClr val="accent3">
+        <a:alpha val="50000"/>
+      </a:schemeClr>
+      <a:schemeClr val="accent4">
+        <a:alpha val="50000"/>
+      </a:schemeClr>
+      <a:schemeClr val="accent5">
+        <a:alpha val="50000"/>
+      </a:schemeClr>
+      <a:schemeClr val="accent6">
+        <a:alpha val="50000"/>
+      </a:schemeClr>
+    </dgm:fillClrLst>
+    <dgm:linClrLst meth="repeat">
+      <a:schemeClr val="lt1"/>
+    </dgm:linClrLst>
+    <dgm:effectClrLst/>
+    <dgm:txLinClrLst/>
+    <dgm:txFillClrLst/>
+    <dgm:txEffectClrLst/>
+  </dgm:styleLbl>
+  <dgm:styleLbl name="node2">
+    <dgm:fillClrLst>
+      <a:schemeClr val="accent2"/>
+    </dgm:fillClrLst>
+    <dgm:linClrLst meth="repeat">
+      <a:schemeClr val="lt1"/>
+    </dgm:linClrLst>
+    <dgm:effectClrLst/>
+    <dgm:txLinClrLst/>
+    <dgm:txFillClrLst/>
+    <dgm:txEffectClrLst/>
+  </dgm:styleLbl>
+  <dgm:styleLbl name="node3">
+    <dgm:fillClrLst>
+      <a:schemeClr val="accent3"/>
+    </dgm:fillClrLst>
+    <dgm:linClrLst meth="repeat">
+      <a:schemeClr val="lt1"/>
+    </dgm:linClrLst>
+    <dgm:effectClrLst/>
+    <dgm:txLinClrLst/>
+    <dgm:txFillClrLst/>
+    <dgm:txEffectClrLst/>
+  </dgm:styleLbl>
+  <dgm:styleLbl name="node4">
+    <dgm:fillClrLst>
+      <a:schemeClr val="accent4"/>
+    </dgm:fillClrLst>
+    <dgm:linClrLst meth="repeat">
+      <a:schemeClr val="lt1"/>
+    </dgm:linClrLst>
+    <dgm:effectClrLst/>
+    <dgm:txLinClrLst/>
+    <dgm:txFillClrLst/>
     <dgm:txEffectClrLst/>
   </dgm:styleLbl>
   <dgm:styleLbl name="fgImgPlace1">
     <dgm:fillClrLst meth="repeat">
       <a:schemeClr val="accent2">
-        <a:tint val="40000"/>
+        <a:tint val="50000"/>
+      </a:schemeClr>
+      <a:schemeClr val="accent3">
+        <a:tint val="50000"/>
+      </a:schemeClr>
+      <a:schemeClr val="accent4">
+        <a:tint val="50000"/>
+      </a:schemeClr>
+      <a:schemeClr val="accent5">
+        <a:tint val="50000"/>
+      </a:schemeClr>
+      <a:schemeClr val="accent6">
+        <a:tint val="50000"/>
       </a:schemeClr>
     </dgm:fillClrLst>
     <dgm:linClrLst meth="repeat">
-      <a:schemeClr val="accent2">
-        <a:shade val="80000"/>
-      </a:schemeClr>
+      <a:schemeClr val="lt1"/>
     </dgm:linClrLst>
     <dgm:effectClrLst/>
     <dgm:txLinClrLst/>
@@ -3944,15 +3952,16 @@
     <dgm:txEffectClrLst/>
   </dgm:styleLbl>
   <dgm:styleLbl name="alignImgPlace1">
-    <dgm:fillClrLst meth="repeat">
+    <dgm:fillClrLst>
+      <a:schemeClr val="accent1">
+        <a:tint val="50000"/>
+      </a:schemeClr>
       <a:schemeClr val="accent2">
-        <a:tint val="40000"/>
+        <a:tint val="20000"/>
       </a:schemeClr>
     </dgm:fillClrLst>
     <dgm:linClrLst meth="repeat">
-      <a:schemeClr val="accent2">
-        <a:shade val="80000"/>
-      </a:schemeClr>
+      <a:schemeClr val="lt1"/>
     </dgm:linClrLst>
     <dgm:effectClrLst/>
     <dgm:txLinClrLst/>
@@ -3962,15 +3971,16 @@
     <dgm:txEffectClrLst/>
   </dgm:styleLbl>
   <dgm:styleLbl name="bgImgPlace1">
-    <dgm:fillClrLst meth="repeat">
+    <dgm:fillClrLst>
+      <a:schemeClr val="accent1">
+        <a:tint val="50000"/>
+      </a:schemeClr>
       <a:schemeClr val="accent2">
-        <a:tint val="40000"/>
+        <a:tint val="20000"/>
       </a:schemeClr>
     </dgm:fillClrLst>
     <dgm:linClrLst meth="repeat">
-      <a:schemeClr val="accent2">
-        <a:shade val="80000"/>
-      </a:schemeClr>
+      <a:schemeClr val="lt1"/>
     </dgm:linClrLst>
     <dgm:effectClrLst/>
     <dgm:txLinClrLst/>
@@ -3981,61 +3991,225 @@
   </dgm:styleLbl>
   <dgm:styleLbl name="sibTrans2D1">
     <dgm:fillClrLst meth="repeat">
-      <a:schemeClr val="accent2">
-        <a:tint val="60000"/>
-      </a:schemeClr>
+      <a:schemeClr val="accent2"/>
+      <a:schemeClr val="accent3"/>
+      <a:schemeClr val="accent4"/>
+      <a:schemeClr val="accent5"/>
+      <a:schemeClr val="accent6"/>
     </dgm:fillClrLst>
-    <dgm:linClrLst meth="repeat">
-      <a:schemeClr val="accent2">
-        <a:tint val="60000"/>
-      </a:schemeClr>
+    <dgm:linClrLst meth="cycle">
+      <a:schemeClr val="lt1"/>
+    </dgm:linClrLst>
+    <dgm:effectClrLst/>
+    <dgm:txLinClrLst/>
+    <dgm:txFillClrLst/>
+    <dgm:txEffectClrLst/>
+  </dgm:styleLbl>
+  <dgm:styleLbl name="fgSibTrans2D1">
+    <dgm:fillClrLst meth="repeat">
+      <a:schemeClr val="accent2"/>
+      <a:schemeClr val="accent3"/>
+      <a:schemeClr val="accent4"/>
+      <a:schemeClr val="accent5"/>
+      <a:schemeClr val="accent6"/>
+    </dgm:fillClrLst>
+    <dgm:linClrLst meth="cycle">
+      <a:schemeClr val="lt1"/>
     </dgm:linClrLst>
     <dgm:effectClrLst/>
     <dgm:txLinClrLst/>
     <dgm:txFillClrLst meth="repeat">
-      <a:schemeClr val="dk1"/>
+      <a:schemeClr val="lt1"/>
     </dgm:txFillClrLst>
     <dgm:txEffectClrLst/>
   </dgm:styleLbl>
-  <dgm:styleLbl name="fgSibTrans2D1">
+  <dgm:styleLbl name="bgSibTrans2D1">
     <dgm:fillClrLst meth="repeat">
-      <a:schemeClr val="accent2">
-        <a:tint val="60000"/>
-      </a:schemeClr>
+      <a:schemeClr val="accent2"/>
+      <a:schemeClr val="accent3"/>
+      <a:schemeClr val="accent4"/>
+      <a:schemeClr val="accent5"/>
+      <a:schemeClr val="accent6"/>
     </dgm:fillClrLst>
-    <dgm:linClrLst meth="repeat">
-      <a:schemeClr val="accent2">
-        <a:tint val="60000"/>
-      </a:schemeClr>
+    <dgm:linClrLst meth="cycle">
+      <a:schemeClr val="lt1"/>
     </dgm:linClrLst>
     <dgm:effectClrLst/>
     <dgm:txLinClrLst/>
     <dgm:txFillClrLst meth="repeat">
-      <a:schemeClr val="dk1"/>
+      <a:schemeClr val="lt1"/>
     </dgm:txFillClrLst>
     <dgm:txEffectClrLst/>
   </dgm:styleLbl>
-  <dgm:styleLbl name="bgSibTrans2D1">
+  <dgm:styleLbl name="sibTrans1D1">
     <dgm:fillClrLst meth="repeat">
-      <a:schemeClr val="accent2">
-        <a:tint val="60000"/>
-      </a:schemeClr>
+      <a:schemeClr val="accent2"/>
+      <a:schemeClr val="accent3"/>
+      <a:schemeClr val="accent4"/>
+      <a:schemeClr val="accent5"/>
+      <a:schemeClr val="accent6"/>
     </dgm:fillClrLst>
     <dgm:linClrLst meth="repeat">
-      <a:schemeClr val="accent2">
-        <a:tint val="60000"/>
-      </a:schemeClr>
+      <a:schemeClr val="accent2"/>
+      <a:schemeClr val="accent3"/>
+      <a:schemeClr val="accent4"/>
+      <a:schemeClr val="accent5"/>
+      <a:schemeClr val="accent6"/>
     </dgm:linClrLst>
     <dgm:effectClrLst/>
     <dgm:txLinClrLst/>
     <dgm:txFillClrLst meth="repeat">
-      <a:schemeClr val="dk1"/>
+      <a:schemeClr val="tx1"/>
     </dgm:txFillClrLst>
     <dgm:txEffectClrLst/>
   </dgm:styleLbl>
-  <dgm:styleLbl name="sibTrans1D1">
+  <dgm:styleLbl name="callout">
     <dgm:fillClrLst meth="repeat">
       <a:schemeClr val="accent2"/>
+    </dgm:fillClrLst>
+    <dgm:linClrLst meth="repeat">
+      <a:schemeClr val="accent2">
+        <a:tint val="50000"/>
+      </a:schemeClr>
+    </dgm:linClrLst>
+    <dgm:effectClrLst/>
+    <dgm:txLinClrLst/>
+    <dgm:txFillClrLst meth="repeat">
+      <a:schemeClr val="tx1"/>
+    </dgm:txFillClrLst>
+    <dgm:txEffectClrLst/>
+  </dgm:styleLbl>
+  <dgm:styleLbl name="asst0">
+    <dgm:fillClrLst meth="repeat">
+      <a:schemeClr val="accent1"/>
+    </dgm:fillClrLst>
+    <dgm:linClrLst meth="repeat">
+      <a:schemeClr val="lt1"/>
+    </dgm:linClrLst>
+    <dgm:effectClrLst/>
+    <dgm:txLinClrLst/>
+    <dgm:txFillClrLst/>
+    <dgm:txEffectClrLst/>
+  </dgm:styleLbl>
+  <dgm:styleLbl name="asst1">
+    <dgm:fillClrLst meth="repeat">
+      <a:schemeClr val="accent2"/>
+    </dgm:fillClrLst>
+    <dgm:linClrLst meth="repeat">
+      <a:schemeClr val="lt1"/>
+    </dgm:linClrLst>
+    <dgm:effectClrLst/>
+    <dgm:txLinClrLst/>
+    <dgm:txFillClrLst/>
+    <dgm:txEffectClrLst/>
+  </dgm:styleLbl>
+  <dgm:styleLbl name="asst2">
+    <dgm:fillClrLst>
+      <a:schemeClr val="accent3"/>
+    </dgm:fillClrLst>
+    <dgm:linClrLst meth="repeat">
+      <a:schemeClr val="lt1"/>
+    </dgm:linClrLst>
+    <dgm:effectClrLst/>
+    <dgm:txLinClrLst/>
+    <dgm:txFillClrLst/>
+    <dgm:txEffectClrLst/>
+  </dgm:styleLbl>
+  <dgm:styleLbl name="asst3">
+    <dgm:fillClrLst>
+      <a:schemeClr val="accent4"/>
+    </dgm:fillClrLst>
+    <dgm:linClrLst meth="repeat">
+      <a:schemeClr val="lt1"/>
+    </dgm:linClrLst>
+    <dgm:effectClrLst/>
+    <dgm:txLinClrLst/>
+    <dgm:txFillClrLst/>
+    <dgm:txEffectClrLst/>
+  </dgm:styleLbl>
+  <dgm:styleLbl name="asst4">
+    <dgm:fillClrLst>
+      <a:schemeClr val="accent5"/>
+    </dgm:fillClrLst>
+    <dgm:linClrLst meth="repeat">
+      <a:schemeClr val="lt1"/>
+    </dgm:linClrLst>
+    <dgm:effectClrLst/>
+    <dgm:txLinClrLst/>
+    <dgm:txFillClrLst/>
+    <dgm:txEffectClrLst/>
+  </dgm:styleLbl>
+  <dgm:styleLbl name="parChTrans2D1">
+    <dgm:fillClrLst meth="repeat">
+      <a:schemeClr val="accent2"/>
+    </dgm:fillClrLst>
+    <dgm:linClrLst meth="repeat">
+      <a:schemeClr val="lt1"/>
+    </dgm:linClrLst>
+    <dgm:effectClrLst/>
+    <dgm:txLinClrLst/>
+    <dgm:txFillClrLst meth="repeat">
+      <a:schemeClr val="lt1"/>
+    </dgm:txFillClrLst>
+    <dgm:txEffectClrLst/>
+  </dgm:styleLbl>
+  <dgm:styleLbl name="parChTrans2D2">
+    <dgm:fillClrLst meth="repeat">
+      <a:schemeClr val="accent3"/>
+    </dgm:fillClrLst>
+    <dgm:linClrLst meth="repeat">
+      <a:schemeClr val="lt1"/>
+    </dgm:linClrLst>
+    <dgm:effectClrLst/>
+    <dgm:txLinClrLst/>
+    <dgm:txFillClrLst/>
+    <dgm:txEffectClrLst/>
+  </dgm:styleLbl>
+  <dgm:styleLbl name="parChTrans2D3">
+    <dgm:fillClrLst meth="repeat">
+      <a:schemeClr val="accent4"/>
+    </dgm:fillClrLst>
+    <dgm:linClrLst meth="repeat">
+      <a:schemeClr val="lt1"/>
+    </dgm:linClrLst>
+    <dgm:effectClrLst/>
+    <dgm:txLinClrLst/>
+    <dgm:txFillClrLst/>
+    <dgm:txEffectClrLst/>
+  </dgm:styleLbl>
+  <dgm:styleLbl name="parChTrans2D4">
+    <dgm:fillClrLst meth="repeat">
+      <a:schemeClr val="accent5"/>
+    </dgm:fillClrLst>
+    <dgm:linClrLst meth="repeat">
+      <a:schemeClr val="lt1"/>
+    </dgm:linClrLst>
+    <dgm:effectClrLst/>
+    <dgm:txLinClrLst/>
+    <dgm:txFillClrLst meth="repeat">
+      <a:schemeClr val="lt1"/>
+    </dgm:txFillClrLst>
+    <dgm:txEffectClrLst/>
+  </dgm:styleLbl>
+  <dgm:styleLbl name="parChTrans1D1">
+    <dgm:fillClrLst meth="repeat">
+      <a:schemeClr val="accent2"/>
+    </dgm:fillClrLst>
+    <dgm:linClrLst meth="repeat">
+      <a:schemeClr val="accent1"/>
+    </dgm:linClrLst>
+    <dgm:effectClrLst/>
+    <dgm:txLinClrLst/>
+    <dgm:txFillClrLst meth="repeat">
+      <a:schemeClr val="tx1"/>
+    </dgm:txFillClrLst>
+    <dgm:txEffectClrLst/>
+  </dgm:styleLbl>
+  <dgm:styleLbl name="parChTrans1D2">
+    <dgm:fillClrLst meth="repeat">
+      <a:schemeClr val="accent3">
+        <a:tint val="90000"/>
+      </a:schemeClr>
     </dgm:fillClrLst>
     <dgm:linClrLst meth="repeat">
       <a:schemeClr val="accent2"/>
@@ -4047,12 +4221,14 @@
     </dgm:txFillClrLst>
     <dgm:txEffectClrLst/>
   </dgm:styleLbl>
-  <dgm:styleLbl name="callout">
+  <dgm:styleLbl name="parChTrans1D3">
     <dgm:fillClrLst meth="repeat">
-      <a:schemeClr val="accent2"/>
+      <a:schemeClr val="accent4">
+        <a:tint val="70000"/>
+      </a:schemeClr>
     </dgm:fillClrLst>
     <dgm:linClrLst meth="repeat">
-      <a:schemeClr val="accent2"/>
+      <a:schemeClr val="accent3"/>
     </dgm:linClrLst>
     <dgm:effectClrLst/>
     <dgm:txLinClrLst/>
@@ -4061,14 +4237,34 @@
     </dgm:txFillClrLst>
     <dgm:txEffectClrLst/>
   </dgm:styleLbl>
-  <dgm:styleLbl name="asst0">
+  <dgm:styleLbl name="parChTrans1D4">
     <dgm:fillClrLst meth="repeat">
-      <a:schemeClr val="lt1"/>
+      <a:schemeClr val="accent5">
+        <a:tint val="50000"/>
+      </a:schemeClr>
     </dgm:fillClrLst>
     <dgm:linClrLst meth="repeat">
-      <a:schemeClr val="accent2">
-        <a:shade val="80000"/>
-      </a:schemeClr>
+      <a:schemeClr val="accent4"/>
+    </dgm:linClrLst>
+    <dgm:effectClrLst/>
+    <dgm:txLinClrLst/>
+    <dgm:txFillClrLst meth="repeat">
+      <a:schemeClr val="tx1"/>
+    </dgm:txFillClrLst>
+    <dgm:txEffectClrLst/>
+  </dgm:styleLbl>
+  <dgm:styleLbl name="fgAcc1">
+    <dgm:fillClrLst meth="repeat">
+      <a:schemeClr val="lt1">
+        <a:alpha val="90000"/>
+      </a:schemeClr>
+    </dgm:fillClrLst>
+    <dgm:linClrLst meth="repeat">
+      <a:schemeClr val="accent2"/>
+      <a:schemeClr val="accent3"/>
+      <a:schemeClr val="accent4"/>
+      <a:schemeClr val="accent5"/>
+      <a:schemeClr val="accent6"/>
     </dgm:linClrLst>
     <dgm:effectClrLst/>
     <dgm:txLinClrLst/>
@@ -4077,14 +4273,18 @@
     </dgm:txFillClrLst>
     <dgm:txEffectClrLst/>
   </dgm:styleLbl>
-  <dgm:styleLbl name="asst1">
+  <dgm:styleLbl name="conFgAcc1">
     <dgm:fillClrLst meth="repeat">
-      <a:schemeClr val="lt1"/>
+      <a:schemeClr val="lt1">
+        <a:alpha val="90000"/>
+      </a:schemeClr>
     </dgm:fillClrLst>
     <dgm:linClrLst meth="repeat">
-      <a:schemeClr val="accent2">
-        <a:shade val="80000"/>
-      </a:schemeClr>
+      <a:schemeClr val="accent2"/>
+      <a:schemeClr val="accent3"/>
+      <a:schemeClr val="accent4"/>
+      <a:schemeClr val="accent5"/>
+      <a:schemeClr val="accent6"/>
     </dgm:linClrLst>
     <dgm:effectClrLst/>
     <dgm:txLinClrLst/>
@@ -4093,14 +4293,18 @@
     </dgm:txFillClrLst>
     <dgm:txEffectClrLst/>
   </dgm:styleLbl>
-  <dgm:styleLbl name="asst2">
+  <dgm:styleLbl name="alignAcc1">
     <dgm:fillClrLst meth="repeat">
-      <a:schemeClr val="lt1"/>
+      <a:schemeClr val="lt1">
+        <a:alpha val="90000"/>
+      </a:schemeClr>
     </dgm:fillClrLst>
     <dgm:linClrLst meth="repeat">
-      <a:schemeClr val="accent2">
-        <a:shade val="80000"/>
-      </a:schemeClr>
+      <a:schemeClr val="accent2"/>
+      <a:schemeClr val="accent3"/>
+      <a:schemeClr val="accent4"/>
+      <a:schemeClr val="accent5"/>
+      <a:schemeClr val="accent6"/>
     </dgm:linClrLst>
     <dgm:effectClrLst/>
     <dgm:txLinClrLst/>
@@ -4109,14 +4313,14 @@
     </dgm:txFillClrLst>
     <dgm:txEffectClrLst/>
   </dgm:styleLbl>
-  <dgm:styleLbl name="asst3">
+  <dgm:styleLbl name="trAlignAcc1">
     <dgm:fillClrLst meth="repeat">
-      <a:schemeClr val="lt1"/>
+      <a:schemeClr val="lt1">
+        <a:alpha val="40000"/>
+      </a:schemeClr>
     </dgm:fillClrLst>
     <dgm:linClrLst meth="repeat">
-      <a:schemeClr val="accent2">
-        <a:shade val="80000"/>
-      </a:schemeClr>
+      <a:schemeClr val="accent1"/>
     </dgm:linClrLst>
     <dgm:effectClrLst/>
     <dgm:txLinClrLst/>
@@ -4125,14 +4329,18 @@
     </dgm:txFillClrLst>
     <dgm:txEffectClrLst/>
   </dgm:styleLbl>
-  <dgm:styleLbl name="asst4">
+  <dgm:styleLbl name="bgAcc1">
     <dgm:fillClrLst meth="repeat">
-      <a:schemeClr val="lt1"/>
+      <a:schemeClr val="lt1">
+        <a:alpha val="90000"/>
+      </a:schemeClr>
     </dgm:fillClrLst>
     <dgm:linClrLst meth="repeat">
-      <a:schemeClr val="accent2">
-        <a:shade val="80000"/>
-      </a:schemeClr>
+      <a:schemeClr val="accent2"/>
+      <a:schemeClr val="accent3"/>
+      <a:schemeClr val="accent4"/>
+      <a:schemeClr val="accent5"/>
+      <a:schemeClr val="accent6"/>
     </dgm:linClrLst>
     <dgm:effectClrLst/>
     <dgm:txLinClrLst/>
@@ -4141,49 +4349,318 @@
     </dgm:txFillClrLst>
     <dgm:txEffectClrLst/>
   </dgm:styleLbl>
-  <dgm:styleLbl name="parChTrans2D1">
+  <dgm:styleLbl name="solidFgAcc1">
+    <dgm:fillClrLst meth="repeat">
+      <a:schemeClr val="lt1"/>
+    </dgm:fillClrLst>
+    <dgm:linClrLst meth="repeat">
+      <a:schemeClr val="accent2"/>
+      <a:schemeClr val="accent3"/>
+      <a:schemeClr val="accent4"/>
+      <a:schemeClr val="accent5"/>
+      <a:schemeClr val="accent6"/>
+    </dgm:linClrLst>
+    <dgm:effectClrLst/>
+    <dgm:txLinClrLst/>
+    <dgm:txFillClrLst meth="repeat">
+      <a:schemeClr val="dk1"/>
+    </dgm:txFillClrLst>
+    <dgm:txEffectClrLst/>
+  </dgm:styleLbl>
+  <dgm:styleLbl name="solidAlignAcc1">
+    <dgm:fillClrLst meth="repeat">
+      <a:schemeClr val="lt1"/>
+    </dgm:fillClrLst>
+    <dgm:linClrLst meth="repeat">
+      <a:schemeClr val="accent2"/>
+      <a:schemeClr val="accent3"/>
+      <a:schemeClr val="accent4"/>
+      <a:schemeClr val="accent5"/>
+      <a:schemeClr val="accent6"/>
+    </dgm:linClrLst>
+    <dgm:effectClrLst/>
+    <dgm:txLinClrLst/>
+    <dgm:txFillClrLst meth="repeat">
+      <a:schemeClr val="dk1"/>
+    </dgm:txFillClrLst>
+    <dgm:txEffectClrLst/>
+  </dgm:styleLbl>
+  <dgm:styleLbl name="solidBgAcc1">
+    <dgm:fillClrLst meth="repeat">
+      <a:schemeClr val="lt1"/>
+    </dgm:fillClrLst>
+    <dgm:linClrLst meth="repeat">
+      <a:schemeClr val="accent2"/>
+      <a:schemeClr val="accent3"/>
+      <a:schemeClr val="accent4"/>
+      <a:schemeClr val="accent5"/>
+      <a:schemeClr val="accent6"/>
+    </dgm:linClrLst>
+    <dgm:effectClrLst/>
+    <dgm:txLinClrLst/>
+    <dgm:txFillClrLst meth="repeat">
+      <a:schemeClr val="dk1"/>
+    </dgm:txFillClrLst>
+    <dgm:txEffectClrLst/>
+  </dgm:styleLbl>
+  <dgm:styleLbl name="fgAccFollowNode1">
     <dgm:fillClrLst meth="repeat">
       <a:schemeClr val="accent2">
-        <a:tint val="60000"/>
+        <a:tint val="40000"/>
+        <a:alpha val="90000"/>
+      </a:schemeClr>
+      <a:schemeClr val="accent3">
+        <a:tint val="40000"/>
+        <a:alpha val="90000"/>
+      </a:schemeClr>
+      <a:schemeClr val="accent4">
+        <a:tint val="40000"/>
+        <a:alpha val="90000"/>
+      </a:schemeClr>
+      <a:schemeClr val="accent5">
+        <a:tint val="40000"/>
+        <a:alpha val="90000"/>
+      </a:schemeClr>
+      <a:schemeClr val="accent6">
+        <a:tint val="40000"/>
+        <a:alpha val="90000"/>
       </a:schemeClr>
     </dgm:fillClrLst>
     <dgm:linClrLst meth="repeat">
       <a:schemeClr val="accent2">
-        <a:tint val="60000"/>
+        <a:tint val="40000"/>
+        <a:alpha val="90000"/>
+      </a:schemeClr>
+      <a:schemeClr val="accent3">
+        <a:tint val="40000"/>
+        <a:alpha val="90000"/>
+      </a:schemeClr>
+      <a:schemeClr val="accent4">
+        <a:tint val="40000"/>
+        <a:alpha val="90000"/>
+      </a:schemeClr>
+      <a:schemeClr val="accent5">
+        <a:tint val="40000"/>
+        <a:alpha val="90000"/>
+      </a:schemeClr>
+      <a:schemeClr val="accent6">
+        <a:tint val="40000"/>
+        <a:alpha val="90000"/>
       </a:schemeClr>
     </dgm:linClrLst>
     <dgm:effectClrLst/>
     <dgm:txLinClrLst/>
-    <dgm:txFillClrLst/>
+    <dgm:txFillClrLst meth="repeat">
+      <a:schemeClr val="dk1"/>
+    </dgm:txFillClrLst>
     <dgm:txEffectClrLst/>
   </dgm:styleLbl>
-  <dgm:styleLbl name="parChTrans2D2">
+  <dgm:styleLbl name="alignAccFollowNode1">
     <dgm:fillClrLst meth="repeat">
-      <a:schemeClr val="accent2"/>
+      <a:schemeClr val="accent2">
+        <a:tint val="40000"/>
+        <a:alpha val="90000"/>
+      </a:schemeClr>
+      <a:schemeClr val="accent3">
+        <a:tint val="40000"/>
+        <a:alpha val="90000"/>
+      </a:schemeClr>
+      <a:schemeClr val="accent4">
+        <a:tint val="40000"/>
+        <a:alpha val="90000"/>
+      </a:schemeClr>
+      <a:schemeClr val="accent5">
+        <a:tint val="40000"/>
+        <a:alpha val="90000"/>
+      </a:schemeClr>
+      <a:schemeClr val="accent6">
+        <a:tint val="40000"/>
+        <a:alpha val="90000"/>
+      </a:schemeClr>
     </dgm:fillClrLst>
     <dgm:linClrLst meth="repeat">
+      <a:schemeClr val="accent2">
+        <a:tint val="40000"/>
+        <a:alpha val="90000"/>
+      </a:schemeClr>
+      <a:schemeClr val="accent3">
+        <a:tint val="40000"/>
+        <a:alpha val="90000"/>
+      </a:schemeClr>
+      <a:schemeClr val="accent4">
+        <a:tint val="40000"/>
+        <a:alpha val="90000"/>
+      </a:schemeClr>
+      <a:schemeClr val="accent5">
+        <a:tint val="40000"/>
+        <a:alpha val="90000"/>
+      </a:schemeClr>
+      <a:schemeClr val="accent6">
+        <a:tint val="40000"/>
+        <a:alpha val="90000"/>
+      </a:schemeClr>
+    </dgm:linClrLst>
+    <dgm:effectClrLst/>
+    <dgm:txLinClrLst/>
+    <dgm:txFillClrLst meth="repeat">
+      <a:schemeClr val="dk1"/>
+    </dgm:txFillClrLst>
+    <dgm:txEffectClrLst/>
+  </dgm:styleLbl>
+  <dgm:styleLbl name="bgAccFollowNode1">
+    <dgm:fillClrLst meth="repeat">
+      <a:schemeClr val="accent2">
+        <a:tint val="40000"/>
+        <a:alpha val="90000"/>
+      </a:schemeClr>
+      <a:schemeClr val="accent3">
+        <a:tint val="40000"/>
+        <a:alpha val="90000"/>
+      </a:schemeClr>
+      <a:schemeClr val="accent4">
+        <a:tint val="40000"/>
+        <a:alpha val="90000"/>
+      </a:schemeClr>
+      <a:schemeClr val="accent5">
+        <a:tint val="40000"/>
+        <a:alpha val="90000"/>
+      </a:schemeClr>
+      <a:schemeClr val="accent6">
+        <a:tint val="40000"/>
+        <a:alpha val="90000"/>
+      </a:schemeClr>
+    </dgm:fillClrLst>
+    <dgm:linClrLst meth="repeat">
+      <a:schemeClr val="accent2">
+        <a:tint val="40000"/>
+        <a:alpha val="90000"/>
+      </a:schemeClr>
+      <a:schemeClr val="accent3">
+        <a:tint val="40000"/>
+        <a:alpha val="90000"/>
+      </a:schemeClr>
+      <a:schemeClr val="accent4">
+        <a:tint val="40000"/>
+        <a:alpha val="90000"/>
+      </a:schemeClr>
+      <a:schemeClr val="accent5">
+        <a:tint val="40000"/>
+        <a:alpha val="90000"/>
+      </a:schemeClr>
+      <a:schemeClr val="accent6">
+        <a:tint val="40000"/>
+        <a:alpha val="90000"/>
+      </a:schemeClr>
+    </dgm:linClrLst>
+    <dgm:effectClrLst/>
+    <dgm:txLinClrLst/>
+    <dgm:txFillClrLst meth="repeat">
+      <a:schemeClr val="dk1"/>
+    </dgm:txFillClrLst>
+    <dgm:txEffectClrLst/>
+  </dgm:styleLbl>
+  <dgm:styleLbl name="fgAcc0">
+    <dgm:fillClrLst meth="repeat">
+      <a:schemeClr val="lt1">
+        <a:alpha val="90000"/>
+      </a:schemeClr>
+    </dgm:fillClrLst>
+    <dgm:linClrLst>
+      <a:schemeClr val="accent1"/>
+    </dgm:linClrLst>
+    <dgm:effectClrLst/>
+    <dgm:txLinClrLst/>
+    <dgm:txFillClrLst meth="repeat">
+      <a:schemeClr val="dk1"/>
+    </dgm:txFillClrLst>
+    <dgm:txEffectClrLst/>
+  </dgm:styleLbl>
+  <dgm:styleLbl name="fgAcc2">
+    <dgm:fillClrLst meth="repeat">
+      <a:schemeClr val="lt1">
+        <a:alpha val="90000"/>
+      </a:schemeClr>
+    </dgm:fillClrLst>
+    <dgm:linClrLst>
       <a:schemeClr val="accent2"/>
     </dgm:linClrLst>
     <dgm:effectClrLst/>
     <dgm:txLinClrLst/>
-    <dgm:txFillClrLst/>
+    <dgm:txFillClrLst meth="repeat">
+      <a:schemeClr val="dk1"/>
+    </dgm:txFillClrLst>
     <dgm:txEffectClrLst/>
   </dgm:styleLbl>
-  <dgm:styleLbl name="parChTrans2D3">
+  <dgm:styleLbl name="fgAcc3">
     <dgm:fillClrLst meth="repeat">
-      <a:schemeClr val="accent2"/>
+      <a:schemeClr val="lt1">
+        <a:alpha val="90000"/>
+      </a:schemeClr>
     </dgm:fillClrLst>
-    <dgm:linClrLst meth="repeat">
-      <a:schemeClr val="accent2"/>
+    <dgm:linClrLst>
+      <a:schemeClr val="accent3"/>
     </dgm:linClrLst>
     <dgm:effectClrLst/>
     <dgm:txLinClrLst/>
-    <dgm:txFillClrLst/>
+    <dgm:txFillClrLst meth="repeat">
+      <a:schemeClr val="dk1"/>
+    </dgm:txFillClrLst>
     <dgm:txEffectClrLst/>
   </dgm:styleLbl>
-  <dgm:styleLbl name="parChTrans2D4">
+  <dgm:styleLbl name="fgAcc4">
     <dgm:fillClrLst meth="repeat">
-      <a:schemeClr val="accent2"/>
+      <a:schemeClr val="lt1">
+        <a:alpha val="90000"/>
+      </a:schemeClr>
+    </dgm:fillClrLst>
+    <dgm:linClrLst>
+      <a:schemeClr val="accent4"/>
+    </dgm:linClrLst>
+    <dgm:effectClrLst/>
+    <dgm:txLinClrLst/>
+    <dgm:txFillClrLst meth="repeat">
+      <a:schemeClr val="dk1"/>
+    </dgm:txFillClrLst>
+    <dgm:txEffectClrLst/>
+  </dgm:styleLbl>
+  <dgm:styleLbl name="bgShp">
+    <dgm:fillClrLst meth="repeat">
+      <a:schemeClr val="accent2">
+        <a:tint val="40000"/>
+      </a:schemeClr>
+    </dgm:fillClrLst>
+    <dgm:linClrLst meth="repeat">
+      <a:schemeClr val="dk1"/>
+    </dgm:linClrLst>
+    <dgm:effectClrLst/>
+    <dgm:txLinClrLst/>
+    <dgm:txFillClrLst meth="repeat">
+      <a:schemeClr val="dk1"/>
+    </dgm:txFillClrLst>
+    <dgm:txEffectClrLst/>
+  </dgm:styleLbl>
+  <dgm:styleLbl name="dkBgShp">
+    <dgm:fillClrLst meth="repeat">
+      <a:schemeClr val="accent2">
+        <a:shade val="90000"/>
+      </a:schemeClr>
+    </dgm:fillClrLst>
+    <dgm:linClrLst meth="repeat">
+      <a:schemeClr val="dk1"/>
+    </dgm:linClrLst>
+    <dgm:effectClrLst/>
+    <dgm:txLinClrLst/>
+    <dgm:txFillClrLst meth="repeat">
+      <a:schemeClr val="lt1"/>
+    </dgm:txFillClrLst>
+    <dgm:txEffectClrLst/>
+  </dgm:styleLbl>
+  <dgm:styleLbl name="trBgShp">
+    <dgm:fillClrLst meth="repeat">
+      <a:schemeClr val="accent1">
+        <a:tint val="50000"/>
+        <a:alpha val="40000"/>
+      </a:schemeClr>
     </dgm:fillClrLst>
     <dgm:linClrLst meth="repeat">
       <a:schemeClr val="accent2"/>
@@ -4195,375 +4672,10 @@
     </dgm:txFillClrLst>
     <dgm:txEffectClrLst/>
   </dgm:styleLbl>
-  <dgm:styleLbl name="parChTrans1D1">
-    <dgm:fillClrLst meth="repeat">
-      <a:schemeClr val="accent2"/>
-    </dgm:fillClrLst>
-    <dgm:linClrLst meth="repeat">
-      <a:schemeClr val="accent2">
-        <a:shade val="60000"/>
-      </a:schemeClr>
-    </dgm:linClrLst>
-    <dgm:effectClrLst/>
-    <dgm:txLinClrLst/>
-    <dgm:txFillClrLst meth="repeat">
-      <a:schemeClr val="tx1"/>
-    </dgm:txFillClrLst>
-    <dgm:txEffectClrLst/>
-  </dgm:styleLbl>
-  <dgm:styleLbl name="parChTrans1D2">
-    <dgm:fillClrLst meth="repeat">
-      <a:schemeClr val="accent2"/>
-    </dgm:fillClrLst>
-    <dgm:linClrLst meth="repeat">
-      <a:schemeClr val="accent2">
-        <a:shade val="60000"/>
-      </a:schemeClr>
-    </dgm:linClrLst>
-    <dgm:effectClrLst/>
-    <dgm:txLinClrLst/>
-    <dgm:txFillClrLst meth="repeat">
-      <a:schemeClr val="tx1"/>
-    </dgm:txFillClrLst>
-    <dgm:txEffectClrLst/>
-  </dgm:styleLbl>
-  <dgm:styleLbl name="parChTrans1D3">
-    <dgm:fillClrLst meth="repeat">
-      <a:schemeClr val="accent2"/>
-    </dgm:fillClrLst>
-    <dgm:linClrLst meth="repeat">
-      <a:schemeClr val="accent2">
-        <a:shade val="80000"/>
-      </a:schemeClr>
-    </dgm:linClrLst>
-    <dgm:effectClrLst/>
-    <dgm:txLinClrLst/>
-    <dgm:txFillClrLst meth="repeat">
-      <a:schemeClr val="tx1"/>
-    </dgm:txFillClrLst>
-    <dgm:txEffectClrLst/>
-  </dgm:styleLbl>
-  <dgm:styleLbl name="parChTrans1D4">
-    <dgm:fillClrLst meth="repeat">
-      <a:schemeClr val="accent2"/>
-    </dgm:fillClrLst>
-    <dgm:linClrLst meth="repeat">
-      <a:schemeClr val="accent2">
-        <a:shade val="80000"/>
-      </a:schemeClr>
-    </dgm:linClrLst>
-    <dgm:effectClrLst/>
-    <dgm:txLinClrLst/>
-    <dgm:txFillClrLst meth="repeat">
-      <a:schemeClr val="tx1"/>
-    </dgm:txFillClrLst>
-    <dgm:txEffectClrLst/>
-  </dgm:styleLbl>
-  <dgm:styleLbl name="fgAcc1">
-    <dgm:fillClrLst meth="repeat">
-      <a:schemeClr val="accent2">
-        <a:alpha val="90000"/>
-        <a:tint val="40000"/>
-      </a:schemeClr>
-    </dgm:fillClrLst>
-    <dgm:linClrLst meth="repeat">
-      <a:schemeClr val="accent2"/>
-    </dgm:linClrLst>
-    <dgm:effectClrLst/>
-    <dgm:txLinClrLst/>
-    <dgm:txFillClrLst meth="repeat">
-      <a:schemeClr val="dk1"/>
-    </dgm:txFillClrLst>
-    <dgm:txEffectClrLst/>
-  </dgm:styleLbl>
-  <dgm:styleLbl name="conFgAcc1">
-    <dgm:fillClrLst meth="repeat">
-      <a:schemeClr val="accent2">
-        <a:alpha val="90000"/>
-        <a:tint val="40000"/>
-      </a:schemeClr>
-    </dgm:fillClrLst>
-    <dgm:linClrLst meth="repeat">
-      <a:schemeClr val="accent2"/>
-    </dgm:linClrLst>
-    <dgm:effectClrLst/>
-    <dgm:txLinClrLst/>
-    <dgm:txFillClrLst meth="repeat">
-      <a:schemeClr val="dk1"/>
-    </dgm:txFillClrLst>
-    <dgm:txEffectClrLst/>
-  </dgm:styleLbl>
-  <dgm:styleLbl name="alignAcc1">
-    <dgm:fillClrLst meth="repeat">
-      <a:schemeClr val="accent2">
-        <a:alpha val="90000"/>
-        <a:tint val="40000"/>
-      </a:schemeClr>
-    </dgm:fillClrLst>
-    <dgm:linClrLst meth="repeat">
-      <a:schemeClr val="accent2"/>
-    </dgm:linClrLst>
-    <dgm:effectClrLst/>
-    <dgm:txLinClrLst/>
-    <dgm:txFillClrLst meth="repeat">
-      <a:schemeClr val="dk1"/>
-    </dgm:txFillClrLst>
-    <dgm:txEffectClrLst/>
-  </dgm:styleLbl>
-  <dgm:styleLbl name="trAlignAcc1">
-    <dgm:fillClrLst meth="repeat">
-      <a:schemeClr val="accent2">
-        <a:alpha val="40000"/>
-        <a:tint val="40000"/>
-      </a:schemeClr>
-    </dgm:fillClrLst>
-    <dgm:linClrLst meth="repeat">
-      <a:schemeClr val="accent2"/>
-    </dgm:linClrLst>
-    <dgm:effectClrLst/>
-    <dgm:txLinClrLst/>
-    <dgm:txFillClrLst meth="repeat">
-      <a:schemeClr val="dk1"/>
-    </dgm:txFillClrLst>
-    <dgm:txEffectClrLst/>
-  </dgm:styleLbl>
-  <dgm:styleLbl name="bgAcc1">
-    <dgm:fillClrLst meth="repeat">
-      <a:schemeClr val="accent2">
-        <a:alpha val="90000"/>
-        <a:tint val="40000"/>
-      </a:schemeClr>
-    </dgm:fillClrLst>
-    <dgm:linClrLst meth="repeat">
-      <a:schemeClr val="accent2"/>
-    </dgm:linClrLst>
-    <dgm:effectClrLst/>
-    <dgm:txLinClrLst/>
-    <dgm:txFillClrLst meth="repeat">
-      <a:schemeClr val="dk1"/>
-    </dgm:txFillClrLst>
-    <dgm:txEffectClrLst/>
-  </dgm:styleLbl>
-  <dgm:styleLbl name="solidFgAcc1">
-    <dgm:fillClrLst meth="repeat">
-      <a:schemeClr val="lt1"/>
-    </dgm:fillClrLst>
-    <dgm:linClrLst meth="repeat">
-      <a:schemeClr val="accent2"/>
-    </dgm:linClrLst>
-    <dgm:effectClrLst/>
-    <dgm:txLinClrLst/>
-    <dgm:txFillClrLst meth="repeat">
-      <a:schemeClr val="dk1"/>
-    </dgm:txFillClrLst>
-    <dgm:txEffectClrLst/>
-  </dgm:styleLbl>
-  <dgm:styleLbl name="solidAlignAcc1">
-    <dgm:fillClrLst meth="repeat">
-      <a:schemeClr val="lt1"/>
-    </dgm:fillClrLst>
-    <dgm:linClrLst meth="repeat">
-      <a:schemeClr val="accent2"/>
-    </dgm:linClrLst>
-    <dgm:effectClrLst/>
-    <dgm:txLinClrLst/>
-    <dgm:txFillClrLst meth="repeat">
-      <a:schemeClr val="dk1"/>
-    </dgm:txFillClrLst>
-    <dgm:txEffectClrLst/>
-  </dgm:styleLbl>
-  <dgm:styleLbl name="solidBgAcc1">
-    <dgm:fillClrLst meth="repeat">
-      <a:schemeClr val="lt1"/>
-    </dgm:fillClrLst>
-    <dgm:linClrLst meth="repeat">
-      <a:schemeClr val="accent2"/>
-    </dgm:linClrLst>
-    <dgm:effectClrLst/>
-    <dgm:txLinClrLst/>
-    <dgm:txFillClrLst meth="repeat">
-      <a:schemeClr val="dk1"/>
-    </dgm:txFillClrLst>
-    <dgm:txEffectClrLst/>
-  </dgm:styleLbl>
-  <dgm:styleLbl name="fgAccFollowNode1">
-    <dgm:fillClrLst meth="repeat">
-      <a:schemeClr val="lt1">
-        <a:alpha val="90000"/>
-        <a:tint val="40000"/>
-      </a:schemeClr>
-    </dgm:fillClrLst>
-    <dgm:linClrLst meth="repeat">
-      <a:schemeClr val="accent2">
-        <a:alpha val="90000"/>
-      </a:schemeClr>
-    </dgm:linClrLst>
-    <dgm:effectClrLst/>
-    <dgm:txLinClrLst/>
-    <dgm:txFillClrLst meth="repeat">
-      <a:schemeClr val="dk1"/>
-    </dgm:txFillClrLst>
-    <dgm:txEffectClrLst/>
-  </dgm:styleLbl>
-  <dgm:styleLbl name="alignAccFollowNode1">
-    <dgm:fillClrLst meth="repeat">
-      <a:schemeClr val="lt1">
-        <a:alpha val="90000"/>
-        <a:tint val="40000"/>
-      </a:schemeClr>
-    </dgm:fillClrLst>
-    <dgm:linClrLst meth="repeat">
-      <a:schemeClr val="accent2">
-        <a:alpha val="90000"/>
-      </a:schemeClr>
-    </dgm:linClrLst>
-    <dgm:effectClrLst/>
-    <dgm:txLinClrLst/>
-    <dgm:txFillClrLst meth="repeat">
-      <a:schemeClr val="dk1"/>
-    </dgm:txFillClrLst>
-    <dgm:txEffectClrLst/>
-  </dgm:styleLbl>
-  <dgm:styleLbl name="bgAccFollowNode1">
-    <dgm:fillClrLst meth="repeat">
-      <a:schemeClr val="lt1">
-        <a:alpha val="90000"/>
-        <a:tint val="40000"/>
-      </a:schemeClr>
-    </dgm:fillClrLst>
-    <dgm:linClrLst meth="repeat">
-      <a:schemeClr val="accent2">
-        <a:alpha val="90000"/>
-      </a:schemeClr>
-    </dgm:linClrLst>
-    <dgm:effectClrLst/>
-    <dgm:txLinClrLst/>
-    <dgm:txFillClrLst meth="repeat">
-      <a:schemeClr val="dk1"/>
-    </dgm:txFillClrLst>
-    <dgm:txEffectClrLst/>
-  </dgm:styleLbl>
-  <dgm:styleLbl name="fgAcc0">
-    <dgm:fillClrLst meth="repeat">
-      <a:schemeClr val="accent2">
-        <a:alpha val="90000"/>
-        <a:tint val="40000"/>
-      </a:schemeClr>
-    </dgm:fillClrLst>
-    <dgm:linClrLst meth="repeat">
-      <a:schemeClr val="accent2"/>
-    </dgm:linClrLst>
-    <dgm:effectClrLst/>
-    <dgm:txLinClrLst/>
-    <dgm:txFillClrLst meth="repeat">
-      <a:schemeClr val="dk1"/>
-    </dgm:txFillClrLst>
-    <dgm:txEffectClrLst/>
-  </dgm:styleLbl>
-  <dgm:styleLbl name="fgAcc2">
-    <dgm:fillClrLst meth="repeat">
-      <a:schemeClr val="accent2">
-        <a:alpha val="90000"/>
-        <a:tint val="40000"/>
-      </a:schemeClr>
-    </dgm:fillClrLst>
-    <dgm:linClrLst meth="repeat">
-      <a:schemeClr val="accent2"/>
-    </dgm:linClrLst>
-    <dgm:effectClrLst/>
-    <dgm:txLinClrLst/>
-    <dgm:txFillClrLst meth="repeat">
-      <a:schemeClr val="dk1"/>
-    </dgm:txFillClrLst>
-    <dgm:txEffectClrLst/>
-  </dgm:styleLbl>
-  <dgm:styleLbl name="fgAcc3">
-    <dgm:fillClrLst meth="repeat">
-      <a:schemeClr val="accent2">
-        <a:alpha val="90000"/>
-        <a:tint val="40000"/>
-      </a:schemeClr>
-    </dgm:fillClrLst>
-    <dgm:linClrLst meth="repeat">
-      <a:schemeClr val="accent2"/>
-    </dgm:linClrLst>
-    <dgm:effectClrLst/>
-    <dgm:txLinClrLst/>
-    <dgm:txFillClrLst meth="repeat">
-      <a:schemeClr val="dk1"/>
-    </dgm:txFillClrLst>
-    <dgm:txEffectClrLst/>
-  </dgm:styleLbl>
-  <dgm:styleLbl name="fgAcc4">
-    <dgm:fillClrLst meth="repeat">
-      <a:schemeClr val="accent2">
-        <a:alpha val="90000"/>
-        <a:tint val="40000"/>
-      </a:schemeClr>
-    </dgm:fillClrLst>
-    <dgm:linClrLst meth="repeat">
-      <a:schemeClr val="accent2"/>
-    </dgm:linClrLst>
-    <dgm:effectClrLst/>
-    <dgm:txLinClrLst/>
-    <dgm:txFillClrLst meth="repeat">
-      <a:schemeClr val="dk1"/>
-    </dgm:txFillClrLst>
-    <dgm:txEffectClrLst/>
-  </dgm:styleLbl>
-  <dgm:styleLbl name="bgShp">
+  <dgm:styleLbl name="fgShp">
     <dgm:fillClrLst meth="repeat">
       <a:schemeClr val="accent2">
         <a:tint val="40000"/>
-      </a:schemeClr>
-    </dgm:fillClrLst>
-    <dgm:linClrLst meth="repeat">
-      <a:schemeClr val="accent2"/>
-    </dgm:linClrLst>
-    <dgm:effectClrLst/>
-    <dgm:txLinClrLst/>
-    <dgm:txFillClrLst meth="repeat">
-      <a:schemeClr val="dk1"/>
-    </dgm:txFillClrLst>
-    <dgm:txEffectClrLst/>
-  </dgm:styleLbl>
-  <dgm:styleLbl name="dkBgShp">
-    <dgm:fillClrLst meth="repeat">
-      <a:schemeClr val="accent2">
-        <a:shade val="80000"/>
-      </a:schemeClr>
-    </dgm:fillClrLst>
-    <dgm:linClrLst meth="repeat">
-      <a:schemeClr val="accent2"/>
-    </dgm:linClrLst>
-    <dgm:effectClrLst/>
-    <dgm:txLinClrLst/>
-    <dgm:txFillClrLst meth="repeat">
-      <a:schemeClr val="lt1"/>
-    </dgm:txFillClrLst>
-    <dgm:txEffectClrLst/>
-  </dgm:styleLbl>
-  <dgm:styleLbl name="trBgShp">
-    <dgm:fillClrLst meth="repeat">
-      <a:schemeClr val="accent2">
-        <a:tint val="50000"/>
-        <a:alpha val="40000"/>
-      </a:schemeClr>
-    </dgm:fillClrLst>
-    <dgm:linClrLst meth="repeat">
-      <a:schemeClr val="accent2"/>
-    </dgm:linClrLst>
-    <dgm:effectClrLst/>
-    <dgm:txLinClrLst/>
-    <dgm:txFillClrLst meth="repeat">
-      <a:schemeClr val="lt1"/>
-    </dgm:txFillClrLst>
-    <dgm:txEffectClrLst/>
-  </dgm:styleLbl>
-  <dgm:styleLbl name="fgShp">
-    <dgm:fillClrLst meth="repeat">
-      <a:schemeClr val="accent2">
-        <a:tint val="60000"/>
       </a:schemeClr>
     </dgm:fillClrLst>
     <dgm:linClrLst meth="repeat">
@@ -5316,31 +5428,31 @@
     </dgm:pt>
   </dgm:ptLst>
   <dgm:cxnLst>
+    <dgm:cxn modelId="{C710263C-A0AD-4EEA-B413-66407596DE78}" srcId="{373A95AD-8651-49D1-9C6D-D0522859B904}" destId="{190D2D77-951B-47FB-AF03-C5EBC03C020A}" srcOrd="1" destOrd="0" parTransId="{EB6F1C15-3721-4CAF-82F3-B9CE40F26055}" sibTransId="{76A64321-FD6D-4FD1-8307-04639F009FB3}"/>
     <dgm:cxn modelId="{EE3BC4FB-AF29-43BE-8FFF-752DC5DD025A}" type="presOf" srcId="{AFC2F98E-68E5-49F9-BB35-0F2BE0502E91}" destId="{30B80190-5B25-41F4-809F-C2C6C36A0D74}" srcOrd="1" destOrd="0" presId="urn:microsoft.com/office/officeart/2005/8/layout/cycle2"/>
+    <dgm:cxn modelId="{0DBC5625-7A15-4D42-826E-BCB1BE914335}" type="presOf" srcId="{5B54F67F-3620-4EF1-AE33-D80DA4DA1A22}" destId="{0A459F09-CEB9-4F43-A984-4A7EECE53EF0}" srcOrd="0" destOrd="0" presId="urn:microsoft.com/office/officeart/2005/8/layout/cycle2"/>
+    <dgm:cxn modelId="{C178ED8B-8811-4EB7-B165-3B2D2B842BB0}" type="presOf" srcId="{11F21FCF-3899-483D-9001-052421D196AE}" destId="{34ED343E-8026-45FC-9465-361FF751BE06}" srcOrd="1" destOrd="0" presId="urn:microsoft.com/office/officeart/2005/8/layout/cycle2"/>
+    <dgm:cxn modelId="{ECA618CE-AC50-4472-B570-1D616E406780}" type="presOf" srcId="{5CC04077-0D0E-4333-8667-08FDBE396E42}" destId="{C18DF143-5BE2-45E3-91E7-19A412EDDA4C}" srcOrd="0" destOrd="0" presId="urn:microsoft.com/office/officeart/2005/8/layout/cycle2"/>
+    <dgm:cxn modelId="{0E6226C0-4836-46C4-A5E6-FE31B6157563}" type="presOf" srcId="{190D2D77-951B-47FB-AF03-C5EBC03C020A}" destId="{7F96307D-491E-48C8-B5B0-41EED41BAAB8}" srcOrd="0" destOrd="0" presId="urn:microsoft.com/office/officeart/2005/8/layout/cycle2"/>
+    <dgm:cxn modelId="{537FD934-512B-44A4-9514-3F51C547BABF}" type="presOf" srcId="{76A64321-FD6D-4FD1-8307-04639F009FB3}" destId="{0A7A086E-6363-4412-9191-7BEA44A56FF0}" srcOrd="0" destOrd="0" presId="urn:microsoft.com/office/officeart/2005/8/layout/cycle2"/>
     <dgm:cxn modelId="{6DE919EB-619D-4256-BF0E-68E4C032A857}" type="presOf" srcId="{0E4839F9-F128-4F4F-A3BF-88B15231B93F}" destId="{6D96EF14-C466-4955-83EA-9A07BAB0A161}" srcOrd="0" destOrd="0" presId="urn:microsoft.com/office/officeart/2005/8/layout/cycle2"/>
-    <dgm:cxn modelId="{04AA84F8-8C9B-48E3-A5EE-E5C905048EB4}" type="presOf" srcId="{5CC04077-0D0E-4333-8667-08FDBE396E42}" destId="{FDE9E828-6CDF-4D6E-8EE3-4CACC6AE3B2B}" srcOrd="1" destOrd="0" presId="urn:microsoft.com/office/officeart/2005/8/layout/cycle2"/>
-    <dgm:cxn modelId="{C178ED8B-8811-4EB7-B165-3B2D2B842BB0}" type="presOf" srcId="{11F21FCF-3899-483D-9001-052421D196AE}" destId="{34ED343E-8026-45FC-9465-361FF751BE06}" srcOrd="1" destOrd="0" presId="urn:microsoft.com/office/officeart/2005/8/layout/cycle2"/>
+    <dgm:cxn modelId="{7946E392-6788-4E7E-8630-CDAF04503C40}" type="presOf" srcId="{B0EEE06D-9352-4C73-BB2B-81C96AF011EB}" destId="{398A3B7B-60DC-4EA3-9A5F-34BA4706F225}" srcOrd="0" destOrd="0" presId="urn:microsoft.com/office/officeart/2005/8/layout/cycle2"/>
+    <dgm:cxn modelId="{BAC55E9D-2EF0-4DF2-8445-8A100CD8956D}" type="presOf" srcId="{76A64321-FD6D-4FD1-8307-04639F009FB3}" destId="{F3030B4A-BA4A-4224-BFC0-85894E02782B}" srcOrd="1" destOrd="0" presId="urn:microsoft.com/office/officeart/2005/8/layout/cycle2"/>
     <dgm:cxn modelId="{C571F637-A4F6-4E77-9766-23B62F7A7773}" type="presOf" srcId="{11F21FCF-3899-483D-9001-052421D196AE}" destId="{492712EC-E3E5-4145-AD7D-7EA22D95B992}" srcOrd="0" destOrd="0" presId="urn:microsoft.com/office/officeart/2005/8/layout/cycle2"/>
-    <dgm:cxn modelId="{0E6226C0-4836-46C4-A5E6-FE31B6157563}" type="presOf" srcId="{190D2D77-951B-47FB-AF03-C5EBC03C020A}" destId="{7F96307D-491E-48C8-B5B0-41EED41BAAB8}" srcOrd="0" destOrd="0" presId="urn:microsoft.com/office/officeart/2005/8/layout/cycle2"/>
-    <dgm:cxn modelId="{E3F6F4A8-6CF9-4DB1-AEF3-5692E24C6D29}" type="presOf" srcId="{8CEC66FF-9DEC-4840-B387-07859C247235}" destId="{BC9201E3-91CC-4827-9F07-CA929A728425}" srcOrd="1" destOrd="0" presId="urn:microsoft.com/office/officeart/2005/8/layout/cycle2"/>
     <dgm:cxn modelId="{8BA3F032-CBCE-4ADB-9E03-F9D22A981CEC}" srcId="{373A95AD-8651-49D1-9C6D-D0522859B904}" destId="{9D427DDB-022D-470E-9D58-EE40886559D5}" srcOrd="0" destOrd="0" parTransId="{0B22ACFC-2594-4172-80B2-79DC4DE77EE4}" sibTransId="{A82BC04C-E6C2-4B1B-BEF5-1F979631D76D}"/>
-    <dgm:cxn modelId="{ECA618CE-AC50-4472-B570-1D616E406780}" type="presOf" srcId="{5CC04077-0D0E-4333-8667-08FDBE396E42}" destId="{C18DF143-5BE2-45E3-91E7-19A412EDDA4C}" srcOrd="0" destOrd="0" presId="urn:microsoft.com/office/officeart/2005/8/layout/cycle2"/>
+    <dgm:cxn modelId="{E8BFD778-F1AE-4C80-9B41-7B7489B36D27}" type="presOf" srcId="{8CEC66FF-9DEC-4840-B387-07859C247235}" destId="{E6C0F717-9BE1-412D-B419-5DE9D94CF0B6}" srcOrd="0" destOrd="0" presId="urn:microsoft.com/office/officeart/2005/8/layout/cycle2"/>
+    <dgm:cxn modelId="{ED36127B-9674-478A-B715-C44FEC21CEE5}" srcId="{373A95AD-8651-49D1-9C6D-D0522859B904}" destId="{0E4839F9-F128-4F4F-A3BF-88B15231B93F}" srcOrd="5" destOrd="0" parTransId="{B9CCC9F4-B5F1-48FE-847E-EBB88F06BF10}" sibTransId="{11F21FCF-3899-483D-9001-052421D196AE}"/>
+    <dgm:cxn modelId="{B2063B9B-3304-44D2-9938-0E34F4FD5E92}" srcId="{373A95AD-8651-49D1-9C6D-D0522859B904}" destId="{5B54F67F-3620-4EF1-AE33-D80DA4DA1A22}" srcOrd="2" destOrd="0" parTransId="{F44D26C2-BE09-4655-9F6F-55C7F9824D2F}" sibTransId="{5CC04077-0D0E-4333-8667-08FDBE396E42}"/>
+    <dgm:cxn modelId="{9EB10856-C72C-417B-BB48-55998185322E}" srcId="{373A95AD-8651-49D1-9C6D-D0522859B904}" destId="{7DAEEAD7-688B-404E-BEA3-65BEF271C626}" srcOrd="3" destOrd="0" parTransId="{F334B9D6-E926-4DEB-8D23-A1789FC76711}" sibTransId="{8CEC66FF-9DEC-4840-B387-07859C247235}"/>
     <dgm:cxn modelId="{462649BE-A96F-4992-A915-FABAAB84BE3D}" type="presOf" srcId="{A82BC04C-E6C2-4B1B-BEF5-1F979631D76D}" destId="{FB0BCADF-94EE-4341-AFE5-E02113DEC334}" srcOrd="0" destOrd="0" presId="urn:microsoft.com/office/officeart/2005/8/layout/cycle2"/>
-    <dgm:cxn modelId="{36482ED2-52B4-4386-B7FF-4354A85AA248}" srcId="{373A95AD-8651-49D1-9C6D-D0522859B904}" destId="{B0EEE06D-9352-4C73-BB2B-81C96AF011EB}" srcOrd="4" destOrd="0" parTransId="{13A7455A-CD1B-46B6-9F1F-0605D4C77C12}" sibTransId="{AFC2F98E-68E5-49F9-BB35-0F2BE0502E91}"/>
-    <dgm:cxn modelId="{FB7A8DE7-C084-48FD-A892-BED97D141DE2}" type="presOf" srcId="{373A95AD-8651-49D1-9C6D-D0522859B904}" destId="{26A8E1E0-F959-41A1-9D9A-19D7EA7D1C83}" srcOrd="0" destOrd="0" presId="urn:microsoft.com/office/officeart/2005/8/layout/cycle2"/>
-    <dgm:cxn modelId="{9EB10856-C72C-417B-BB48-55998185322E}" srcId="{373A95AD-8651-49D1-9C6D-D0522859B904}" destId="{7DAEEAD7-688B-404E-BEA3-65BEF271C626}" srcOrd="3" destOrd="0" parTransId="{F334B9D6-E926-4DEB-8D23-A1789FC76711}" sibTransId="{8CEC66FF-9DEC-4840-B387-07859C247235}"/>
-    <dgm:cxn modelId="{E8BFD778-F1AE-4C80-9B41-7B7489B36D27}" type="presOf" srcId="{8CEC66FF-9DEC-4840-B387-07859C247235}" destId="{E6C0F717-9BE1-412D-B419-5DE9D94CF0B6}" srcOrd="0" destOrd="0" presId="urn:microsoft.com/office/officeart/2005/8/layout/cycle2"/>
-    <dgm:cxn modelId="{537FD934-512B-44A4-9514-3F51C547BABF}" type="presOf" srcId="{76A64321-FD6D-4FD1-8307-04639F009FB3}" destId="{0A7A086E-6363-4412-9191-7BEA44A56FF0}" srcOrd="0" destOrd="0" presId="urn:microsoft.com/office/officeart/2005/8/layout/cycle2"/>
-    <dgm:cxn modelId="{0DBC5625-7A15-4D42-826E-BCB1BE914335}" type="presOf" srcId="{5B54F67F-3620-4EF1-AE33-D80DA4DA1A22}" destId="{0A459F09-CEB9-4F43-A984-4A7EECE53EF0}" srcOrd="0" destOrd="0" presId="urn:microsoft.com/office/officeart/2005/8/layout/cycle2"/>
-    <dgm:cxn modelId="{83A722A1-7E0C-47BC-BF21-5DE46E17F414}" type="presOf" srcId="{A82BC04C-E6C2-4B1B-BEF5-1F979631D76D}" destId="{2249D66E-AB71-4960-93C1-29ACBC47F170}" srcOrd="1" destOrd="0" presId="urn:microsoft.com/office/officeart/2005/8/layout/cycle2"/>
-    <dgm:cxn modelId="{9398E150-A229-46DD-BED0-3D35EF88C411}" type="presOf" srcId="{7DAEEAD7-688B-404E-BEA3-65BEF271C626}" destId="{9F649EF1-D8DC-46DD-B9AD-5857994A138E}" srcOrd="0" destOrd="0" presId="urn:microsoft.com/office/officeart/2005/8/layout/cycle2"/>
-    <dgm:cxn modelId="{BAC55E9D-2EF0-4DF2-8445-8A100CD8956D}" type="presOf" srcId="{76A64321-FD6D-4FD1-8307-04639F009FB3}" destId="{F3030B4A-BA4A-4224-BFC0-85894E02782B}" srcOrd="1" destOrd="0" presId="urn:microsoft.com/office/officeart/2005/8/layout/cycle2"/>
-    <dgm:cxn modelId="{B2063B9B-3304-44D2-9938-0E34F4FD5E92}" srcId="{373A95AD-8651-49D1-9C6D-D0522859B904}" destId="{5B54F67F-3620-4EF1-AE33-D80DA4DA1A22}" srcOrd="2" destOrd="0" parTransId="{F44D26C2-BE09-4655-9F6F-55C7F9824D2F}" sibTransId="{5CC04077-0D0E-4333-8667-08FDBE396E42}"/>
-    <dgm:cxn modelId="{7946E392-6788-4E7E-8630-CDAF04503C40}" type="presOf" srcId="{B0EEE06D-9352-4C73-BB2B-81C96AF011EB}" destId="{398A3B7B-60DC-4EA3-9A5F-34BA4706F225}" srcOrd="0" destOrd="0" presId="urn:microsoft.com/office/officeart/2005/8/layout/cycle2"/>
-    <dgm:cxn modelId="{ED36127B-9674-478A-B715-C44FEC21CEE5}" srcId="{373A95AD-8651-49D1-9C6D-D0522859B904}" destId="{0E4839F9-F128-4F4F-A3BF-88B15231B93F}" srcOrd="5" destOrd="0" parTransId="{B9CCC9F4-B5F1-48FE-847E-EBB88F06BF10}" sibTransId="{11F21FCF-3899-483D-9001-052421D196AE}"/>
-    <dgm:cxn modelId="{C710263C-A0AD-4EEA-B413-66407596DE78}" srcId="{373A95AD-8651-49D1-9C6D-D0522859B904}" destId="{190D2D77-951B-47FB-AF03-C5EBC03C020A}" srcOrd="1" destOrd="0" parTransId="{EB6F1C15-3721-4CAF-82F3-B9CE40F26055}" sibTransId="{76A64321-FD6D-4FD1-8307-04639F009FB3}"/>
     <dgm:cxn modelId="{7A51BEBA-899B-41A4-B4D8-8DBC4A986B3F}" type="presOf" srcId="{9D427DDB-022D-470E-9D58-EE40886559D5}" destId="{67000C64-BDB0-489A-A930-02BB18171916}" srcOrd="0" destOrd="0" presId="urn:microsoft.com/office/officeart/2005/8/layout/cycle2"/>
     <dgm:cxn modelId="{2CD40FC6-7090-43BE-BB58-8D35956F36B9}" type="presOf" srcId="{AFC2F98E-68E5-49F9-BB35-0F2BE0502E91}" destId="{84B0F0E4-57DA-4F0C-A191-4F2F46AD1212}" srcOrd="0" destOrd="0" presId="urn:microsoft.com/office/officeart/2005/8/layout/cycle2"/>
+    <dgm:cxn modelId="{FB7A8DE7-C084-48FD-A892-BED97D141DE2}" type="presOf" srcId="{373A95AD-8651-49D1-9C6D-D0522859B904}" destId="{26A8E1E0-F959-41A1-9D9A-19D7EA7D1C83}" srcOrd="0" destOrd="0" presId="urn:microsoft.com/office/officeart/2005/8/layout/cycle2"/>
+    <dgm:cxn modelId="{04AA84F8-8C9B-48E3-A5EE-E5C905048EB4}" type="presOf" srcId="{5CC04077-0D0E-4333-8667-08FDBE396E42}" destId="{FDE9E828-6CDF-4D6E-8EE3-4CACC6AE3B2B}" srcOrd="1" destOrd="0" presId="urn:microsoft.com/office/officeart/2005/8/layout/cycle2"/>
+    <dgm:cxn modelId="{9398E150-A229-46DD-BED0-3D35EF88C411}" type="presOf" srcId="{7DAEEAD7-688B-404E-BEA3-65BEF271C626}" destId="{9F649EF1-D8DC-46DD-B9AD-5857994A138E}" srcOrd="0" destOrd="0" presId="urn:microsoft.com/office/officeart/2005/8/layout/cycle2"/>
+    <dgm:cxn modelId="{83A722A1-7E0C-47BC-BF21-5DE46E17F414}" type="presOf" srcId="{A82BC04C-E6C2-4B1B-BEF5-1F979631D76D}" destId="{2249D66E-AB71-4960-93C1-29ACBC47F170}" srcOrd="1" destOrd="0" presId="urn:microsoft.com/office/officeart/2005/8/layout/cycle2"/>
+    <dgm:cxn modelId="{E3F6F4A8-6CF9-4DB1-AEF3-5692E24C6D29}" type="presOf" srcId="{8CEC66FF-9DEC-4840-B387-07859C247235}" destId="{BC9201E3-91CC-4827-9F07-CA929A728425}" srcOrd="1" destOrd="0" presId="urn:microsoft.com/office/officeart/2005/8/layout/cycle2"/>
+    <dgm:cxn modelId="{36482ED2-52B4-4386-B7FF-4354A85AA248}" srcId="{373A95AD-8651-49D1-9C6D-D0522859B904}" destId="{B0EEE06D-9352-4C73-BB2B-81C96AF011EB}" srcOrd="4" destOrd="0" parTransId="{13A7455A-CD1B-46B6-9F1F-0605D4C77C12}" sibTransId="{AFC2F98E-68E5-49F9-BB35-0F2BE0502E91}"/>
     <dgm:cxn modelId="{42376FAC-C5A3-41F5-8D95-80DE21305086}" type="presParOf" srcId="{26A8E1E0-F959-41A1-9D9A-19D7EA7D1C83}" destId="{67000C64-BDB0-489A-A930-02BB18171916}" srcOrd="0" destOrd="0" presId="urn:microsoft.com/office/officeart/2005/8/layout/cycle2"/>
     <dgm:cxn modelId="{3658C394-FE91-4BC3-BA49-AF43FDEA9B61}" type="presParOf" srcId="{26A8E1E0-F959-41A1-9D9A-19D7EA7D1C83}" destId="{FB0BCADF-94EE-4341-AFE5-E02113DEC334}" srcOrd="1" destOrd="0" presId="urn:microsoft.com/office/officeart/2005/8/layout/cycle2"/>
     <dgm:cxn modelId="{B189B6DA-F013-452B-8819-8F0A0CC8FFB4}" type="presParOf" srcId="{FB0BCADF-94EE-4341-AFE5-E02113DEC334}" destId="{2249D66E-AB71-4960-93C1-29ACBC47F170}" srcOrd="0" destOrd="0" presId="urn:microsoft.com/office/officeart/2005/8/layout/cycle2"/>
@@ -6060,33 +6172,26 @@
 <file path=ppt/diagrams/data5.xml><?xml version="1.0" encoding="utf-8"?>
 <dgm:dataModel xmlns:dgm="http://schemas.openxmlformats.org/drawingml/2006/diagram" xmlns:a="http://schemas.openxmlformats.org/drawingml/2006/main">
   <dgm:ptLst>
-    <dgm:pt modelId="{373A95AD-8651-49D1-9C6D-D0522859B904}" type="doc">
-      <dgm:prSet loTypeId="urn:microsoft.com/office/officeart/2008/layout/CaptionedPictures" loCatId="picture" qsTypeId="urn:microsoft.com/office/officeart/2005/8/quickstyle/simple3" qsCatId="simple" csTypeId="urn:microsoft.com/office/officeart/2005/8/colors/accent2_1" csCatId="accent2" phldr="1"/>
+    <dgm:pt modelId="{CA8A986C-C7BB-4DC1-B3AB-516737DC7D35}" type="doc">
+      <dgm:prSet loTypeId="urn:microsoft.com/office/officeart/2005/8/layout/equation2" loCatId="relationship" qsTypeId="urn:microsoft.com/office/officeart/2005/8/quickstyle/simple5" qsCatId="simple" csTypeId="urn:microsoft.com/office/officeart/2005/8/colors/colorful1" csCatId="colorful" phldr="1"/>
       <dgm:spPr/>
-      <dgm:t>
-        <a:bodyPr/>
-        <a:lstStyle/>
-        <a:p>
-          <a:endParaRPr lang="en-US"/>
-        </a:p>
-      </dgm:t>
     </dgm:pt>
-    <dgm:pt modelId="{9D427DDB-022D-470E-9D58-EE40886559D5}">
-      <dgm:prSet phldrT="[Text]" custT="1"/>
+    <dgm:pt modelId="{B5C48993-20F8-4A74-BF02-C02A82D7301B}">
+      <dgm:prSet phldrT="[Text]"/>
       <dgm:spPr/>
       <dgm:t>
         <a:bodyPr/>
         <a:lstStyle/>
         <a:p>
           <a:r>
-            <a:rPr lang="en-US" sz="1600" dirty="0" smtClean="0"/>
+            <a:rPr lang="en-US" dirty="0" smtClean="0"/>
             <a:t> </a:t>
           </a:r>
-          <a:endParaRPr lang="en-US" sz="1600" dirty="0"/>
+          <a:endParaRPr lang="en-US" dirty="0"/>
         </a:p>
       </dgm:t>
     </dgm:pt>
-    <dgm:pt modelId="{0B22ACFC-2594-4172-80B2-79DC4DE77EE4}" type="parTrans" cxnId="{8BA3F032-CBCE-4ADB-9E03-F9D22A981CEC}">
+    <dgm:pt modelId="{F26765A0-945D-4924-BB9C-D616EBFC7374}" type="parTrans" cxnId="{A72113A3-8FBB-4A43-9BE7-C0EBB6ACCAE2}">
       <dgm:prSet/>
       <dgm:spPr/>
       <dgm:t>
@@ -6097,7 +6202,7 @@
         </a:p>
       </dgm:t>
     </dgm:pt>
-    <dgm:pt modelId="{A82BC04C-E6C2-4B1B-BEF5-1F979631D76D}" type="sibTrans" cxnId="{8BA3F032-CBCE-4ADB-9E03-F9D22A981CEC}">
+    <dgm:pt modelId="{812CEEF4-D338-4A47-BEC4-7C11DBA0F48F}" type="sibTrans" cxnId="{A72113A3-8FBB-4A43-9BE7-C0EBB6ACCAE2}">
       <dgm:prSet/>
       <dgm:spPr/>
       <dgm:t>
@@ -6108,14 +6213,23 @@
         </a:p>
       </dgm:t>
     </dgm:pt>
-    <dgm:pt modelId="{A7F7F0AA-2966-4FF7-8732-B6640CF22F68}" type="pres">
-      <dgm:prSet presAssocID="{373A95AD-8651-49D1-9C6D-D0522859B904}" presName="Name0" presStyleCnt="0">
-        <dgm:presLayoutVars>
-          <dgm:chMax/>
-          <dgm:chPref/>
-          <dgm:dir/>
-        </dgm:presLayoutVars>
-      </dgm:prSet>
+    <dgm:pt modelId="{B38546DD-032C-4766-95AF-865E6335A94E}">
+      <dgm:prSet phldrT="[Text]"/>
+      <dgm:spPr/>
+      <dgm:t>
+        <a:bodyPr/>
+        <a:lstStyle/>
+        <a:p>
+          <a:r>
+            <a:rPr lang="en-US" dirty="0" smtClean="0"/>
+            <a:t> </a:t>
+          </a:r>
+          <a:endParaRPr lang="en-US" dirty="0"/>
+        </a:p>
+      </dgm:t>
+    </dgm:pt>
+    <dgm:pt modelId="{285AD2CA-934E-4BD7-8562-AD0FD535307B}" type="parTrans" cxnId="{AF8BCC53-BD3F-4D65-A05F-507ACAD3D6A8}">
+      <dgm:prSet/>
       <dgm:spPr/>
       <dgm:t>
         <a:bodyPr/>
@@ -6125,55 +6239,8 @@
         </a:p>
       </dgm:t>
     </dgm:pt>
-    <dgm:pt modelId="{2AFF3B5A-4F05-4100-8BD2-5B48AC960E1D}" type="pres">
-      <dgm:prSet presAssocID="{9D427DDB-022D-470E-9D58-EE40886559D5}" presName="composite" presStyleCnt="0">
-        <dgm:presLayoutVars>
-          <dgm:chMax val="1"/>
-          <dgm:chPref val="1"/>
-        </dgm:presLayoutVars>
-      </dgm:prSet>
-      <dgm:spPr/>
-    </dgm:pt>
-    <dgm:pt modelId="{77C87452-E8DB-496F-B69C-B6DE37D28F18}" type="pres">
-      <dgm:prSet presAssocID="{9D427DDB-022D-470E-9D58-EE40886559D5}" presName="Accent" presStyleLbl="trAlignAcc1" presStyleIdx="0" presStyleCnt="1">
-        <dgm:presLayoutVars>
-          <dgm:chMax val="0"/>
-          <dgm:chPref val="0"/>
-        </dgm:presLayoutVars>
-      </dgm:prSet>
-      <dgm:spPr/>
-    </dgm:pt>
-    <dgm:pt modelId="{F209E5C1-4445-4553-B252-D64D994709F4}" type="pres">
-      <dgm:prSet presAssocID="{9D427DDB-022D-470E-9D58-EE40886559D5}" presName="Image" presStyleLbl="alignImgPlace1" presStyleIdx="0" presStyleCnt="1">
-        <dgm:presLayoutVars>
-          <dgm:chMax val="0"/>
-          <dgm:chPref val="0"/>
-        </dgm:presLayoutVars>
-      </dgm:prSet>
-      <dgm:spPr/>
-    </dgm:pt>
-    <dgm:pt modelId="{A4F72FCD-8F05-4A43-BE47-DDA6B2CA3FF7}" type="pres">
-      <dgm:prSet presAssocID="{9D427DDB-022D-470E-9D58-EE40886559D5}" presName="ChildComposite" presStyleCnt="0"/>
-      <dgm:spPr/>
-    </dgm:pt>
-    <dgm:pt modelId="{6C3B6D9C-7F2E-40C5-8934-2DE0716820F8}" type="pres">
-      <dgm:prSet presAssocID="{9D427DDB-022D-470E-9D58-EE40886559D5}" presName="Child" presStyleLbl="node1" presStyleIdx="0" presStyleCnt="0">
-        <dgm:presLayoutVars>
-          <dgm:chMax val="0"/>
-          <dgm:chPref val="0"/>
-          <dgm:bulletEnabled val="1"/>
-        </dgm:presLayoutVars>
-      </dgm:prSet>
-      <dgm:spPr/>
-    </dgm:pt>
-    <dgm:pt modelId="{93BB3CE7-DA2F-4A11-B996-AFA715DEB9EA}" type="pres">
-      <dgm:prSet presAssocID="{9D427DDB-022D-470E-9D58-EE40886559D5}" presName="Parent" presStyleLbl="revTx" presStyleIdx="0" presStyleCnt="1">
-        <dgm:presLayoutVars>
-          <dgm:chMax val="1"/>
-          <dgm:chPref val="0"/>
-          <dgm:bulletEnabled val="1"/>
-        </dgm:presLayoutVars>
-      </dgm:prSet>
+    <dgm:pt modelId="{BCB5FC7C-47DA-4D00-B3A1-FA73E78A8E25}" type="sibTrans" cxnId="{AF8BCC53-BD3F-4D65-A05F-507ACAD3D6A8}">
+      <dgm:prSet/>
       <dgm:spPr/>
       <dgm:t>
         <a:bodyPr/>
@@ -6183,17 +6250,121 @@
         </a:p>
       </dgm:t>
     </dgm:pt>
+    <dgm:pt modelId="{8C6E309E-9F5F-48EA-8B3A-80526EB18C8E}">
+      <dgm:prSet phldrT="[Text]"/>
+      <dgm:spPr/>
+      <dgm:t>
+        <a:bodyPr/>
+        <a:lstStyle/>
+        <a:p>
+          <a:r>
+            <a:rPr lang="en-US" dirty="0" smtClean="0"/>
+            <a:t> </a:t>
+          </a:r>
+          <a:endParaRPr lang="en-US" dirty="0"/>
+        </a:p>
+      </dgm:t>
+    </dgm:pt>
+    <dgm:pt modelId="{ACE94DD4-9DA6-43DE-AA53-D6CC76C95D64}" type="parTrans" cxnId="{50E1BA82-6AF2-46F5-9947-090D6AF9CEE4}">
+      <dgm:prSet/>
+      <dgm:spPr/>
+      <dgm:t>
+        <a:bodyPr/>
+        <a:lstStyle/>
+        <a:p>
+          <a:endParaRPr lang="en-US"/>
+        </a:p>
+      </dgm:t>
+    </dgm:pt>
+    <dgm:pt modelId="{F1EE8137-7716-4A03-BD45-7DABC010ECE7}" type="sibTrans" cxnId="{50E1BA82-6AF2-46F5-9947-090D6AF9CEE4}">
+      <dgm:prSet/>
+      <dgm:spPr/>
+      <dgm:t>
+        <a:bodyPr/>
+        <a:lstStyle/>
+        <a:p>
+          <a:endParaRPr lang="en-US"/>
+        </a:p>
+      </dgm:t>
+    </dgm:pt>
+    <dgm:pt modelId="{36BBAB77-E2FD-470A-84F8-129311066E6C}" type="pres">
+      <dgm:prSet presAssocID="{CA8A986C-C7BB-4DC1-B3AB-516737DC7D35}" presName="Name0" presStyleCnt="0">
+        <dgm:presLayoutVars>
+          <dgm:dir/>
+          <dgm:resizeHandles val="exact"/>
+        </dgm:presLayoutVars>
+      </dgm:prSet>
+      <dgm:spPr/>
+    </dgm:pt>
+    <dgm:pt modelId="{FA7F38D9-77EA-4EFD-ACB1-33ACCEB1C372}" type="pres">
+      <dgm:prSet presAssocID="{CA8A986C-C7BB-4DC1-B3AB-516737DC7D35}" presName="vNodes" presStyleCnt="0"/>
+      <dgm:spPr/>
+    </dgm:pt>
+    <dgm:pt modelId="{2E4C88A1-26F4-4F95-AF53-8EAA0A806F61}" type="pres">
+      <dgm:prSet presAssocID="{B5C48993-20F8-4A74-BF02-C02A82D7301B}" presName="node" presStyleLbl="node1" presStyleIdx="0" presStyleCnt="3">
+        <dgm:presLayoutVars>
+          <dgm:bulletEnabled val="1"/>
+        </dgm:presLayoutVars>
+      </dgm:prSet>
+      <dgm:spPr/>
+    </dgm:pt>
+    <dgm:pt modelId="{DBC4C0B2-6243-43A6-A9A8-8C34C9A1A1C6}" type="pres">
+      <dgm:prSet presAssocID="{812CEEF4-D338-4A47-BEC4-7C11DBA0F48F}" presName="spacerT" presStyleCnt="0"/>
+      <dgm:spPr/>
+    </dgm:pt>
+    <dgm:pt modelId="{536455A6-88A7-4B1F-8414-C49DAD71BC02}" type="pres">
+      <dgm:prSet presAssocID="{812CEEF4-D338-4A47-BEC4-7C11DBA0F48F}" presName="sibTrans" presStyleLbl="sibTrans2D1" presStyleIdx="0" presStyleCnt="2"/>
+      <dgm:spPr/>
+    </dgm:pt>
+    <dgm:pt modelId="{3E4227C0-4980-42D0-ABDA-31615CE79F6E}" type="pres">
+      <dgm:prSet presAssocID="{812CEEF4-D338-4A47-BEC4-7C11DBA0F48F}" presName="spacerB" presStyleCnt="0"/>
+      <dgm:spPr/>
+    </dgm:pt>
+    <dgm:pt modelId="{DD8990EF-CAB1-4857-AF6E-C3A3BB7D097B}" type="pres">
+      <dgm:prSet presAssocID="{B38546DD-032C-4766-95AF-865E6335A94E}" presName="node" presStyleLbl="node1" presStyleIdx="1" presStyleCnt="3">
+        <dgm:presLayoutVars>
+          <dgm:bulletEnabled val="1"/>
+        </dgm:presLayoutVars>
+      </dgm:prSet>
+      <dgm:spPr/>
+    </dgm:pt>
+    <dgm:pt modelId="{C562497D-F186-4A77-A1D3-A4C4DA72DB47}" type="pres">
+      <dgm:prSet presAssocID="{CA8A986C-C7BB-4DC1-B3AB-516737DC7D35}" presName="sibTransLast" presStyleLbl="sibTrans2D1" presStyleIdx="1" presStyleCnt="2"/>
+      <dgm:spPr/>
+    </dgm:pt>
+    <dgm:pt modelId="{5096CE0D-CEAE-4460-8DD1-DB64AAABBA82}" type="pres">
+      <dgm:prSet presAssocID="{CA8A986C-C7BB-4DC1-B3AB-516737DC7D35}" presName="connectorText" presStyleLbl="sibTrans2D1" presStyleIdx="1" presStyleCnt="2"/>
+      <dgm:spPr/>
+    </dgm:pt>
+    <dgm:pt modelId="{A4138743-2217-43EB-BD8F-4DB3663DE82F}" type="pres">
+      <dgm:prSet presAssocID="{CA8A986C-C7BB-4DC1-B3AB-516737DC7D35}" presName="lastNode" presStyleLbl="node1" presStyleIdx="2" presStyleCnt="3">
+        <dgm:presLayoutVars>
+          <dgm:bulletEnabled val="1"/>
+        </dgm:presLayoutVars>
+      </dgm:prSet>
+      <dgm:spPr/>
+    </dgm:pt>
   </dgm:ptLst>
   <dgm:cxnLst>
-    <dgm:cxn modelId="{2C9D4079-390F-40D9-B807-592BD5726B01}" type="presOf" srcId="{373A95AD-8651-49D1-9C6D-D0522859B904}" destId="{A7F7F0AA-2966-4FF7-8732-B6640CF22F68}" srcOrd="0" destOrd="0" presId="urn:microsoft.com/office/officeart/2008/layout/CaptionedPictures"/>
-    <dgm:cxn modelId="{FA8D673A-26FE-4BE5-845B-FCC53ACFF307}" type="presOf" srcId="{9D427DDB-022D-470E-9D58-EE40886559D5}" destId="{93BB3CE7-DA2F-4A11-B996-AFA715DEB9EA}" srcOrd="0" destOrd="0" presId="urn:microsoft.com/office/officeart/2008/layout/CaptionedPictures"/>
-    <dgm:cxn modelId="{8BA3F032-CBCE-4ADB-9E03-F9D22A981CEC}" srcId="{373A95AD-8651-49D1-9C6D-D0522859B904}" destId="{9D427DDB-022D-470E-9D58-EE40886559D5}" srcOrd="0" destOrd="0" parTransId="{0B22ACFC-2594-4172-80B2-79DC4DE77EE4}" sibTransId="{A82BC04C-E6C2-4B1B-BEF5-1F979631D76D}"/>
-    <dgm:cxn modelId="{8201A912-FD26-46D2-B9B9-F63B5E4C656E}" type="presParOf" srcId="{A7F7F0AA-2966-4FF7-8732-B6640CF22F68}" destId="{2AFF3B5A-4F05-4100-8BD2-5B48AC960E1D}" srcOrd="0" destOrd="0" presId="urn:microsoft.com/office/officeart/2008/layout/CaptionedPictures"/>
-    <dgm:cxn modelId="{346EA3DD-F80E-4CA2-A6C0-ACB704DFB2CB}" type="presParOf" srcId="{2AFF3B5A-4F05-4100-8BD2-5B48AC960E1D}" destId="{77C87452-E8DB-496F-B69C-B6DE37D28F18}" srcOrd="0" destOrd="0" presId="urn:microsoft.com/office/officeart/2008/layout/CaptionedPictures"/>
-    <dgm:cxn modelId="{0D25726E-95C3-49D4-8B37-4AAB57E85AD0}" type="presParOf" srcId="{2AFF3B5A-4F05-4100-8BD2-5B48AC960E1D}" destId="{F209E5C1-4445-4553-B252-D64D994709F4}" srcOrd="1" destOrd="0" presId="urn:microsoft.com/office/officeart/2008/layout/CaptionedPictures"/>
-    <dgm:cxn modelId="{3DE7C354-A61A-491D-975E-E65BCF28AFA3}" type="presParOf" srcId="{2AFF3B5A-4F05-4100-8BD2-5B48AC960E1D}" destId="{A4F72FCD-8F05-4A43-BE47-DDA6B2CA3FF7}" srcOrd="2" destOrd="0" presId="urn:microsoft.com/office/officeart/2008/layout/CaptionedPictures"/>
-    <dgm:cxn modelId="{D153D66A-E112-4EB1-85CD-979B8446BA6F}" type="presParOf" srcId="{A4F72FCD-8F05-4A43-BE47-DDA6B2CA3FF7}" destId="{6C3B6D9C-7F2E-40C5-8934-2DE0716820F8}" srcOrd="0" destOrd="0" presId="urn:microsoft.com/office/officeart/2008/layout/CaptionedPictures"/>
-    <dgm:cxn modelId="{70FCAC6E-1D0C-405A-9FE2-BFE44A7E5747}" type="presParOf" srcId="{A4F72FCD-8F05-4A43-BE47-DDA6B2CA3FF7}" destId="{93BB3CE7-DA2F-4A11-B996-AFA715DEB9EA}" srcOrd="1" destOrd="0" presId="urn:microsoft.com/office/officeart/2008/layout/CaptionedPictures"/>
+    <dgm:cxn modelId="{9B750509-5038-47EF-A8B4-5943A9E3EED1}" type="presOf" srcId="{8C6E309E-9F5F-48EA-8B3A-80526EB18C8E}" destId="{A4138743-2217-43EB-BD8F-4DB3663DE82F}" srcOrd="0" destOrd="0" presId="urn:microsoft.com/office/officeart/2005/8/layout/equation2"/>
+    <dgm:cxn modelId="{7898DA11-D68F-4FB9-A101-CEC95DDCCB25}" type="presOf" srcId="{BCB5FC7C-47DA-4D00-B3A1-FA73E78A8E25}" destId="{C562497D-F186-4A77-A1D3-A4C4DA72DB47}" srcOrd="0" destOrd="0" presId="urn:microsoft.com/office/officeart/2005/8/layout/equation2"/>
+    <dgm:cxn modelId="{48E49103-B72B-4CA7-BFFA-4ABD6235BA3F}" type="presOf" srcId="{CA8A986C-C7BB-4DC1-B3AB-516737DC7D35}" destId="{36BBAB77-E2FD-470A-84F8-129311066E6C}" srcOrd="0" destOrd="0" presId="urn:microsoft.com/office/officeart/2005/8/layout/equation2"/>
+    <dgm:cxn modelId="{4CB984E8-5F40-4022-A9AB-55909620EE1B}" type="presOf" srcId="{BCB5FC7C-47DA-4D00-B3A1-FA73E78A8E25}" destId="{5096CE0D-CEAE-4460-8DD1-DB64AAABBA82}" srcOrd="1" destOrd="0" presId="urn:microsoft.com/office/officeart/2005/8/layout/equation2"/>
+    <dgm:cxn modelId="{50E1BA82-6AF2-46F5-9947-090D6AF9CEE4}" srcId="{CA8A986C-C7BB-4DC1-B3AB-516737DC7D35}" destId="{8C6E309E-9F5F-48EA-8B3A-80526EB18C8E}" srcOrd="2" destOrd="0" parTransId="{ACE94DD4-9DA6-43DE-AA53-D6CC76C95D64}" sibTransId="{F1EE8137-7716-4A03-BD45-7DABC010ECE7}"/>
+    <dgm:cxn modelId="{748628EC-4805-4881-B2E7-870528206504}" type="presOf" srcId="{B5C48993-20F8-4A74-BF02-C02A82D7301B}" destId="{2E4C88A1-26F4-4F95-AF53-8EAA0A806F61}" srcOrd="0" destOrd="0" presId="urn:microsoft.com/office/officeart/2005/8/layout/equation2"/>
+    <dgm:cxn modelId="{C5EF6A7D-C798-413D-9CD2-9656BE9D4AEC}" type="presOf" srcId="{B38546DD-032C-4766-95AF-865E6335A94E}" destId="{DD8990EF-CAB1-4857-AF6E-C3A3BB7D097B}" srcOrd="0" destOrd="0" presId="urn:microsoft.com/office/officeart/2005/8/layout/equation2"/>
+    <dgm:cxn modelId="{AF8BCC53-BD3F-4D65-A05F-507ACAD3D6A8}" srcId="{CA8A986C-C7BB-4DC1-B3AB-516737DC7D35}" destId="{B38546DD-032C-4766-95AF-865E6335A94E}" srcOrd="1" destOrd="0" parTransId="{285AD2CA-934E-4BD7-8562-AD0FD535307B}" sibTransId="{BCB5FC7C-47DA-4D00-B3A1-FA73E78A8E25}"/>
+    <dgm:cxn modelId="{A72113A3-8FBB-4A43-9BE7-C0EBB6ACCAE2}" srcId="{CA8A986C-C7BB-4DC1-B3AB-516737DC7D35}" destId="{B5C48993-20F8-4A74-BF02-C02A82D7301B}" srcOrd="0" destOrd="0" parTransId="{F26765A0-945D-4924-BB9C-D616EBFC7374}" sibTransId="{812CEEF4-D338-4A47-BEC4-7C11DBA0F48F}"/>
+    <dgm:cxn modelId="{F91E372C-D4E1-41B7-8B07-2EA5C11EA56E}" type="presOf" srcId="{812CEEF4-D338-4A47-BEC4-7C11DBA0F48F}" destId="{536455A6-88A7-4B1F-8414-C49DAD71BC02}" srcOrd="0" destOrd="0" presId="urn:microsoft.com/office/officeart/2005/8/layout/equation2"/>
+    <dgm:cxn modelId="{D96FBF25-57D4-4A0A-A2EF-572649117F29}" type="presParOf" srcId="{36BBAB77-E2FD-470A-84F8-129311066E6C}" destId="{FA7F38D9-77EA-4EFD-ACB1-33ACCEB1C372}" srcOrd="0" destOrd="0" presId="urn:microsoft.com/office/officeart/2005/8/layout/equation2"/>
+    <dgm:cxn modelId="{FBD88FC7-AB1F-406D-BE83-834455147831}" type="presParOf" srcId="{FA7F38D9-77EA-4EFD-ACB1-33ACCEB1C372}" destId="{2E4C88A1-26F4-4F95-AF53-8EAA0A806F61}" srcOrd="0" destOrd="0" presId="urn:microsoft.com/office/officeart/2005/8/layout/equation2"/>
+    <dgm:cxn modelId="{9E80EC40-89F7-42A8-A80E-803B884D4FEC}" type="presParOf" srcId="{FA7F38D9-77EA-4EFD-ACB1-33ACCEB1C372}" destId="{DBC4C0B2-6243-43A6-A9A8-8C34C9A1A1C6}" srcOrd="1" destOrd="0" presId="urn:microsoft.com/office/officeart/2005/8/layout/equation2"/>
+    <dgm:cxn modelId="{0DF81B33-8ACA-41F8-8F0C-EED345603EB3}" type="presParOf" srcId="{FA7F38D9-77EA-4EFD-ACB1-33ACCEB1C372}" destId="{536455A6-88A7-4B1F-8414-C49DAD71BC02}" srcOrd="2" destOrd="0" presId="urn:microsoft.com/office/officeart/2005/8/layout/equation2"/>
+    <dgm:cxn modelId="{B2C87986-3CD6-4014-BD66-8F78B8D89D50}" type="presParOf" srcId="{FA7F38D9-77EA-4EFD-ACB1-33ACCEB1C372}" destId="{3E4227C0-4980-42D0-ABDA-31615CE79F6E}" srcOrd="3" destOrd="0" presId="urn:microsoft.com/office/officeart/2005/8/layout/equation2"/>
+    <dgm:cxn modelId="{2C46011C-7306-4438-B7F8-47849FD45C28}" type="presParOf" srcId="{FA7F38D9-77EA-4EFD-ACB1-33ACCEB1C372}" destId="{DD8990EF-CAB1-4857-AF6E-C3A3BB7D097B}" srcOrd="4" destOrd="0" presId="urn:microsoft.com/office/officeart/2005/8/layout/equation2"/>
+    <dgm:cxn modelId="{CFEE47C2-49CB-4FFD-A178-EBF0366CF702}" type="presParOf" srcId="{36BBAB77-E2FD-470A-84F8-129311066E6C}" destId="{C562497D-F186-4A77-A1D3-A4C4DA72DB47}" srcOrd="1" destOrd="0" presId="urn:microsoft.com/office/officeart/2005/8/layout/equation2"/>
+    <dgm:cxn modelId="{1BAA6D94-3CF1-4CEA-8AA1-A3AA186E9D6D}" type="presParOf" srcId="{C562497D-F186-4A77-A1D3-A4C4DA72DB47}" destId="{5096CE0D-CEAE-4460-8DD1-DB64AAABBA82}" srcOrd="0" destOrd="0" presId="urn:microsoft.com/office/officeart/2005/8/layout/equation2"/>
+    <dgm:cxn modelId="{91B72A9D-C7B4-4D0C-A425-8C7CE3BADD88}" type="presParOf" srcId="{36BBAB77-E2FD-470A-84F8-129311066E6C}" destId="{A4138743-2217-43EB-BD8F-4DB3663DE82F}" srcOrd="2" destOrd="0" presId="urn:microsoft.com/office/officeart/2005/8/layout/equation2"/>
   </dgm:cxnLst>
   <dgm:bg/>
   <dgm:whole/>
@@ -9195,148 +9366,97 @@
       <dsp:cNvGrpSpPr/>
     </dsp:nvGrpSpPr>
     <dsp:grpSpPr/>
-    <dsp:sp modelId="{77C87452-E8DB-496F-B69C-B6DE37D28F18}">
+    <dsp:sp modelId="{2E4C88A1-26F4-4F95-AF53-8EAA0A806F61}">
       <dsp:nvSpPr>
         <dsp:cNvPr id="0" name=""/>
         <dsp:cNvSpPr/>
       </dsp:nvSpPr>
       <dsp:spPr>
         <a:xfrm>
-          <a:off x="678559" y="446"/>
-          <a:ext cx="776480" cy="913507"/>
+          <a:off x="276325" y="152"/>
+          <a:ext cx="333319" cy="333319"/>
         </a:xfrm>
-        <a:prstGeom prst="rect">
+        <a:prstGeom prst="ellipse">
           <a:avLst/>
         </a:prstGeom>
-        <a:solidFill>
-          <a:schemeClr val="accent2">
-            <a:alpha val="40000"/>
-            <a:tint val="40000"/>
-            <a:hueOff val="0"/>
-            <a:satOff val="0"/>
-            <a:lumOff val="0"/>
-            <a:alphaOff val="0"/>
-          </a:schemeClr>
-        </a:solidFill>
-        <a:ln w="9525" cap="flat" cmpd="sng" algn="ctr">
-          <a:solidFill>
-            <a:schemeClr val="accent2">
-              <a:hueOff val="0"/>
-              <a:satOff val="0"/>
-              <a:lumOff val="0"/>
-              <a:alphaOff val="0"/>
-            </a:schemeClr>
-          </a:solidFill>
-          <a:prstDash val="solid"/>
-        </a:ln>
-        <a:effectLst/>
-      </dsp:spPr>
-      <dsp:style>
-        <a:lnRef idx="1">
-          <a:scrgbClr r="0" g="0" b="0"/>
-        </a:lnRef>
-        <a:fillRef idx="1">
-          <a:scrgbClr r="0" g="0" b="0"/>
-        </a:fillRef>
-        <a:effectRef idx="0">
-          <a:scrgbClr r="0" g="0" b="0"/>
-        </a:effectRef>
-        <a:fontRef idx="minor"/>
-      </dsp:style>
-    </dsp:sp>
-    <dsp:sp modelId="{F209E5C1-4445-4553-B252-D64D994709F4}">
-      <dsp:nvSpPr>
-        <dsp:cNvPr id="0" name=""/>
-        <dsp:cNvSpPr/>
-      </dsp:nvSpPr>
-      <dsp:spPr>
-        <a:xfrm>
-          <a:off x="717383" y="36986"/>
-          <a:ext cx="698832" cy="593779"/>
-        </a:xfrm>
-        <a:prstGeom prst="rect">
-          <a:avLst/>
-        </a:prstGeom>
-        <a:solidFill>
-          <a:schemeClr val="accent2">
-            <a:tint val="40000"/>
-            <a:hueOff val="0"/>
-            <a:satOff val="0"/>
-            <a:lumOff val="0"/>
-            <a:alphaOff val="0"/>
-          </a:schemeClr>
-        </a:solidFill>
-        <a:ln w="9525" cap="flat" cmpd="sng" algn="ctr">
-          <a:solidFill>
-            <a:schemeClr val="accent2">
-              <a:shade val="80000"/>
-              <a:hueOff val="0"/>
-              <a:satOff val="0"/>
-              <a:lumOff val="0"/>
-              <a:alphaOff val="0"/>
-            </a:schemeClr>
-          </a:solidFill>
-          <a:prstDash val="solid"/>
+        <a:gradFill rotWithShape="0">
+          <a:gsLst>
+            <a:gs pos="0">
+              <a:schemeClr val="accent2">
+                <a:hueOff val="0"/>
+                <a:satOff val="0"/>
+                <a:lumOff val="0"/>
+                <a:alphaOff val="0"/>
+                <a:shade val="51000"/>
+                <a:satMod val="130000"/>
+              </a:schemeClr>
+            </a:gs>
+            <a:gs pos="80000">
+              <a:schemeClr val="accent2">
+                <a:hueOff val="0"/>
+                <a:satOff val="0"/>
+                <a:lumOff val="0"/>
+                <a:alphaOff val="0"/>
+                <a:shade val="93000"/>
+                <a:satMod val="130000"/>
+              </a:schemeClr>
+            </a:gs>
+            <a:gs pos="100000">
+              <a:schemeClr val="accent2">
+                <a:hueOff val="0"/>
+                <a:satOff val="0"/>
+                <a:lumOff val="0"/>
+                <a:alphaOff val="0"/>
+                <a:shade val="94000"/>
+                <a:satMod val="135000"/>
+              </a:schemeClr>
+            </a:gs>
+          </a:gsLst>
+          <a:lin ang="16200000" scaled="0"/>
+        </a:gradFill>
+        <a:ln>
+          <a:noFill/>
         </a:ln>
         <a:effectLst>
-          <a:outerShdw blurRad="40000" dist="20000" dir="5400000" rotWithShape="0">
+          <a:outerShdw blurRad="40000" dist="23000" dir="5400000" rotWithShape="0">
             <a:srgbClr val="000000">
-              <a:alpha val="38000"/>
+              <a:alpha val="35000"/>
             </a:srgbClr>
           </a:outerShdw>
         </a:effectLst>
-      </dsp:spPr>
-      <dsp:style>
-        <a:lnRef idx="1">
-          <a:scrgbClr r="0" g="0" b="0"/>
-        </a:lnRef>
-        <a:fillRef idx="1">
-          <a:scrgbClr r="0" g="0" b="0"/>
-        </a:fillRef>
-        <a:effectRef idx="1">
-          <a:scrgbClr r="0" g="0" b="0"/>
-        </a:effectRef>
-        <a:fontRef idx="minor"/>
-      </dsp:style>
-    </dsp:sp>
-    <dsp:sp modelId="{93BB3CE7-DA2F-4A11-B996-AFA715DEB9EA}">
-      <dsp:nvSpPr>
-        <dsp:cNvPr id="0" name=""/>
-        <dsp:cNvSpPr/>
-      </dsp:nvSpPr>
-      <dsp:spPr>
-        <a:xfrm>
-          <a:off x="717383" y="630766"/>
-          <a:ext cx="698832" cy="246646"/>
-        </a:xfrm>
-        <a:prstGeom prst="rect">
-          <a:avLst/>
-        </a:prstGeom>
-        <a:noFill/>
-        <a:ln>
-          <a:noFill/>
-        </a:ln>
-        <a:effectLst/>
+        <a:scene3d>
+          <a:camera prst="orthographicFront">
+            <a:rot lat="0" lon="0" rev="0"/>
+          </a:camera>
+          <a:lightRig rig="threePt" dir="t">
+            <a:rot lat="0" lon="0" rev="1200000"/>
+          </a:lightRig>
+        </a:scene3d>
+        <a:sp3d>
+          <a:bevelT w="63500" h="25400"/>
+        </a:sp3d>
       </dsp:spPr>
       <dsp:style>
         <a:lnRef idx="0">
           <a:scrgbClr r="0" g="0" b="0"/>
         </a:lnRef>
-        <a:fillRef idx="0">
+        <a:fillRef idx="3">
           <a:scrgbClr r="0" g="0" b="0"/>
         </a:fillRef>
-        <a:effectRef idx="0">
+        <a:effectRef idx="3">
           <a:scrgbClr r="0" g="0" b="0"/>
         </a:effectRef>
-        <a:fontRef idx="minor"/>
+        <a:fontRef idx="minor">
+          <a:schemeClr val="lt1"/>
+        </a:fontRef>
       </dsp:style>
       <dsp:txBody>
-        <a:bodyPr spcFirstLastPara="0" vert="horz" wrap="square" lIns="60960" tIns="60960" rIns="60960" bIns="60960" numCol="1" spcCol="1270" anchor="ctr" anchorCtr="0">
+        <a:bodyPr spcFirstLastPara="0" vert="horz" wrap="square" lIns="17780" tIns="17780" rIns="17780" bIns="17780" numCol="1" spcCol="1270" anchor="ctr" anchorCtr="0">
           <a:noAutofit/>
         </a:bodyPr>
         <a:lstStyle/>
         <a:p>
-          <a:pPr lvl="0" algn="ctr" defTabSz="711200">
+          <a:pPr lvl="0" algn="ctr" defTabSz="622300">
             <a:lnSpc>
               <a:spcPct val="90000"/>
             </a:lnSpc>
@@ -9348,15 +9468,462 @@
             </a:spcAft>
           </a:pPr>
           <a:r>
-            <a:rPr lang="en-US" sz="1600" kern="1200" dirty="0" smtClean="0"/>
+            <a:rPr lang="en-US" sz="1400" kern="1200" dirty="0" smtClean="0"/>
             <a:t> </a:t>
           </a:r>
-          <a:endParaRPr lang="en-US" sz="1600" kern="1200" dirty="0"/>
+          <a:endParaRPr lang="en-US" sz="1400" kern="1200" dirty="0"/>
         </a:p>
       </dsp:txBody>
       <dsp:txXfrm>
-        <a:off x="717383" y="630766"/>
-        <a:ext cx="698832" cy="246646"/>
+        <a:off x="325138" y="48965"/>
+        <a:ext cx="235693" cy="235693"/>
+      </dsp:txXfrm>
+    </dsp:sp>
+    <dsp:sp modelId="{536455A6-88A7-4B1F-8414-C49DAD71BC02}">
+      <dsp:nvSpPr>
+        <dsp:cNvPr id="0" name=""/>
+        <dsp:cNvSpPr/>
+      </dsp:nvSpPr>
+      <dsp:spPr>
+        <a:xfrm>
+          <a:off x="346322" y="360537"/>
+          <a:ext cx="193325" cy="193325"/>
+        </a:xfrm>
+        <a:prstGeom prst="mathPlus">
+          <a:avLst/>
+        </a:prstGeom>
+        <a:gradFill rotWithShape="0">
+          <a:gsLst>
+            <a:gs pos="0">
+              <a:schemeClr val="accent2">
+                <a:hueOff val="0"/>
+                <a:satOff val="0"/>
+                <a:lumOff val="0"/>
+                <a:alphaOff val="0"/>
+                <a:shade val="51000"/>
+                <a:satMod val="130000"/>
+              </a:schemeClr>
+            </a:gs>
+            <a:gs pos="80000">
+              <a:schemeClr val="accent2">
+                <a:hueOff val="0"/>
+                <a:satOff val="0"/>
+                <a:lumOff val="0"/>
+                <a:alphaOff val="0"/>
+                <a:shade val="93000"/>
+                <a:satMod val="130000"/>
+              </a:schemeClr>
+            </a:gs>
+            <a:gs pos="100000">
+              <a:schemeClr val="accent2">
+                <a:hueOff val="0"/>
+                <a:satOff val="0"/>
+                <a:lumOff val="0"/>
+                <a:alphaOff val="0"/>
+                <a:shade val="94000"/>
+                <a:satMod val="135000"/>
+              </a:schemeClr>
+            </a:gs>
+          </a:gsLst>
+          <a:lin ang="16200000" scaled="0"/>
+        </a:gradFill>
+        <a:ln>
+          <a:noFill/>
+        </a:ln>
+        <a:effectLst>
+          <a:outerShdw blurRad="40000" dist="23000" dir="5400000" rotWithShape="0">
+            <a:srgbClr val="000000">
+              <a:alpha val="35000"/>
+            </a:srgbClr>
+          </a:outerShdw>
+        </a:effectLst>
+        <a:scene3d>
+          <a:camera prst="orthographicFront">
+            <a:rot lat="0" lon="0" rev="0"/>
+          </a:camera>
+          <a:lightRig rig="threePt" dir="t">
+            <a:rot lat="0" lon="0" rev="1200000"/>
+          </a:lightRig>
+        </a:scene3d>
+        <a:sp3d>
+          <a:bevelT w="63500" h="25400"/>
+        </a:sp3d>
+      </dsp:spPr>
+      <dsp:style>
+        <a:lnRef idx="0">
+          <a:scrgbClr r="0" g="0" b="0"/>
+        </a:lnRef>
+        <a:fillRef idx="3">
+          <a:scrgbClr r="0" g="0" b="0"/>
+        </a:fillRef>
+        <a:effectRef idx="3">
+          <a:scrgbClr r="0" g="0" b="0"/>
+        </a:effectRef>
+        <a:fontRef idx="minor">
+          <a:schemeClr val="lt1"/>
+        </a:fontRef>
+      </dsp:style>
+      <dsp:txBody>
+        <a:bodyPr spcFirstLastPara="0" vert="horz" wrap="square" lIns="0" tIns="0" rIns="0" bIns="0" numCol="1" spcCol="1270" anchor="ctr" anchorCtr="0">
+          <a:noAutofit/>
+        </a:bodyPr>
+        <a:lstStyle/>
+        <a:p>
+          <a:pPr lvl="0" algn="ctr" defTabSz="222250">
+            <a:lnSpc>
+              <a:spcPct val="90000"/>
+            </a:lnSpc>
+            <a:spcBef>
+              <a:spcPct val="0"/>
+            </a:spcBef>
+            <a:spcAft>
+              <a:spcPct val="35000"/>
+            </a:spcAft>
+          </a:pPr>
+          <a:endParaRPr lang="en-US" sz="500" kern="1200"/>
+        </a:p>
+      </dsp:txBody>
+      <dsp:txXfrm>
+        <a:off x="371947" y="434464"/>
+        <a:ext cx="142075" cy="45471"/>
+      </dsp:txXfrm>
+    </dsp:sp>
+    <dsp:sp modelId="{DD8990EF-CAB1-4857-AF6E-C3A3BB7D097B}">
+      <dsp:nvSpPr>
+        <dsp:cNvPr id="0" name=""/>
+        <dsp:cNvSpPr/>
+      </dsp:nvSpPr>
+      <dsp:spPr>
+        <a:xfrm>
+          <a:off x="276325" y="580928"/>
+          <a:ext cx="333319" cy="333319"/>
+        </a:xfrm>
+        <a:prstGeom prst="ellipse">
+          <a:avLst/>
+        </a:prstGeom>
+        <a:gradFill rotWithShape="0">
+          <a:gsLst>
+            <a:gs pos="0">
+              <a:schemeClr val="accent3">
+                <a:hueOff val="0"/>
+                <a:satOff val="0"/>
+                <a:lumOff val="0"/>
+                <a:alphaOff val="0"/>
+                <a:shade val="51000"/>
+                <a:satMod val="130000"/>
+              </a:schemeClr>
+            </a:gs>
+            <a:gs pos="80000">
+              <a:schemeClr val="accent3">
+                <a:hueOff val="0"/>
+                <a:satOff val="0"/>
+                <a:lumOff val="0"/>
+                <a:alphaOff val="0"/>
+                <a:shade val="93000"/>
+                <a:satMod val="130000"/>
+              </a:schemeClr>
+            </a:gs>
+            <a:gs pos="100000">
+              <a:schemeClr val="accent3">
+                <a:hueOff val="0"/>
+                <a:satOff val="0"/>
+                <a:lumOff val="0"/>
+                <a:alphaOff val="0"/>
+                <a:shade val="94000"/>
+                <a:satMod val="135000"/>
+              </a:schemeClr>
+            </a:gs>
+          </a:gsLst>
+          <a:lin ang="16200000" scaled="0"/>
+        </a:gradFill>
+        <a:ln>
+          <a:noFill/>
+        </a:ln>
+        <a:effectLst>
+          <a:outerShdw blurRad="40000" dist="23000" dir="5400000" rotWithShape="0">
+            <a:srgbClr val="000000">
+              <a:alpha val="35000"/>
+            </a:srgbClr>
+          </a:outerShdw>
+        </a:effectLst>
+        <a:scene3d>
+          <a:camera prst="orthographicFront">
+            <a:rot lat="0" lon="0" rev="0"/>
+          </a:camera>
+          <a:lightRig rig="threePt" dir="t">
+            <a:rot lat="0" lon="0" rev="1200000"/>
+          </a:lightRig>
+        </a:scene3d>
+        <a:sp3d>
+          <a:bevelT w="63500" h="25400"/>
+        </a:sp3d>
+      </dsp:spPr>
+      <dsp:style>
+        <a:lnRef idx="0">
+          <a:scrgbClr r="0" g="0" b="0"/>
+        </a:lnRef>
+        <a:fillRef idx="3">
+          <a:scrgbClr r="0" g="0" b="0"/>
+        </a:fillRef>
+        <a:effectRef idx="3">
+          <a:scrgbClr r="0" g="0" b="0"/>
+        </a:effectRef>
+        <a:fontRef idx="minor">
+          <a:schemeClr val="lt1"/>
+        </a:fontRef>
+      </dsp:style>
+      <dsp:txBody>
+        <a:bodyPr spcFirstLastPara="0" vert="horz" wrap="square" lIns="17780" tIns="17780" rIns="17780" bIns="17780" numCol="1" spcCol="1270" anchor="ctr" anchorCtr="0">
+          <a:noAutofit/>
+        </a:bodyPr>
+        <a:lstStyle/>
+        <a:p>
+          <a:pPr lvl="0" algn="ctr" defTabSz="622300">
+            <a:lnSpc>
+              <a:spcPct val="90000"/>
+            </a:lnSpc>
+            <a:spcBef>
+              <a:spcPct val="0"/>
+            </a:spcBef>
+            <a:spcAft>
+              <a:spcPct val="35000"/>
+            </a:spcAft>
+          </a:pPr>
+          <a:r>
+            <a:rPr lang="en-US" sz="1400" kern="1200" dirty="0" smtClean="0"/>
+            <a:t> </a:t>
+          </a:r>
+          <a:endParaRPr lang="en-US" sz="1400" kern="1200" dirty="0"/>
+        </a:p>
+      </dsp:txBody>
+      <dsp:txXfrm>
+        <a:off x="325138" y="629741"/>
+        <a:ext cx="235693" cy="235693"/>
+      </dsp:txXfrm>
+    </dsp:sp>
+    <dsp:sp modelId="{C562497D-F186-4A77-A1D3-A4C4DA72DB47}">
+      <dsp:nvSpPr>
+        <dsp:cNvPr id="0" name=""/>
+        <dsp:cNvSpPr/>
+      </dsp:nvSpPr>
+      <dsp:spPr>
+        <a:xfrm>
+          <a:off x="659642" y="395202"/>
+          <a:ext cx="105995" cy="123994"/>
+        </a:xfrm>
+        <a:prstGeom prst="rightArrow">
+          <a:avLst>
+            <a:gd name="adj1" fmla="val 60000"/>
+            <a:gd name="adj2" fmla="val 50000"/>
+          </a:avLst>
+        </a:prstGeom>
+        <a:gradFill rotWithShape="0">
+          <a:gsLst>
+            <a:gs pos="0">
+              <a:schemeClr val="accent3">
+                <a:hueOff val="0"/>
+                <a:satOff val="0"/>
+                <a:lumOff val="0"/>
+                <a:alphaOff val="0"/>
+                <a:shade val="51000"/>
+                <a:satMod val="130000"/>
+              </a:schemeClr>
+            </a:gs>
+            <a:gs pos="80000">
+              <a:schemeClr val="accent3">
+                <a:hueOff val="0"/>
+                <a:satOff val="0"/>
+                <a:lumOff val="0"/>
+                <a:alphaOff val="0"/>
+                <a:shade val="93000"/>
+                <a:satMod val="130000"/>
+              </a:schemeClr>
+            </a:gs>
+            <a:gs pos="100000">
+              <a:schemeClr val="accent3">
+                <a:hueOff val="0"/>
+                <a:satOff val="0"/>
+                <a:lumOff val="0"/>
+                <a:alphaOff val="0"/>
+                <a:shade val="94000"/>
+                <a:satMod val="135000"/>
+              </a:schemeClr>
+            </a:gs>
+          </a:gsLst>
+          <a:lin ang="16200000" scaled="0"/>
+        </a:gradFill>
+        <a:ln>
+          <a:noFill/>
+        </a:ln>
+        <a:effectLst>
+          <a:outerShdw blurRad="40000" dist="23000" dir="5400000" rotWithShape="0">
+            <a:srgbClr val="000000">
+              <a:alpha val="35000"/>
+            </a:srgbClr>
+          </a:outerShdw>
+        </a:effectLst>
+        <a:scene3d>
+          <a:camera prst="orthographicFront">
+            <a:rot lat="0" lon="0" rev="0"/>
+          </a:camera>
+          <a:lightRig rig="threePt" dir="t">
+            <a:rot lat="0" lon="0" rev="1200000"/>
+          </a:lightRig>
+        </a:scene3d>
+        <a:sp3d>
+          <a:bevelT w="63500" h="25400"/>
+        </a:sp3d>
+      </dsp:spPr>
+      <dsp:style>
+        <a:lnRef idx="0">
+          <a:scrgbClr r="0" g="0" b="0"/>
+        </a:lnRef>
+        <a:fillRef idx="3">
+          <a:scrgbClr r="0" g="0" b="0"/>
+        </a:fillRef>
+        <a:effectRef idx="3">
+          <a:scrgbClr r="0" g="0" b="0"/>
+        </a:effectRef>
+        <a:fontRef idx="minor">
+          <a:schemeClr val="lt1"/>
+        </a:fontRef>
+      </dsp:style>
+      <dsp:txBody>
+        <a:bodyPr spcFirstLastPara="0" vert="horz" wrap="square" lIns="0" tIns="0" rIns="0" bIns="0" numCol="1" spcCol="1270" anchor="ctr" anchorCtr="0">
+          <a:noAutofit/>
+        </a:bodyPr>
+        <a:lstStyle/>
+        <a:p>
+          <a:pPr lvl="0" algn="ctr" defTabSz="222250">
+            <a:lnSpc>
+              <a:spcPct val="90000"/>
+            </a:lnSpc>
+            <a:spcBef>
+              <a:spcPct val="0"/>
+            </a:spcBef>
+            <a:spcAft>
+              <a:spcPct val="35000"/>
+            </a:spcAft>
+          </a:pPr>
+          <a:endParaRPr lang="en-US" sz="500" kern="1200"/>
+        </a:p>
+      </dsp:txBody>
+      <dsp:txXfrm>
+        <a:off x="659642" y="420001"/>
+        <a:ext cx="74197" cy="74396"/>
+      </dsp:txXfrm>
+    </dsp:sp>
+    <dsp:sp modelId="{A4138743-2217-43EB-BD8F-4DB3663DE82F}">
+      <dsp:nvSpPr>
+        <dsp:cNvPr id="0" name=""/>
+        <dsp:cNvSpPr/>
+      </dsp:nvSpPr>
+      <dsp:spPr>
+        <a:xfrm>
+          <a:off x="809636" y="123880"/>
+          <a:ext cx="666638" cy="666638"/>
+        </a:xfrm>
+        <a:prstGeom prst="ellipse">
+          <a:avLst/>
+        </a:prstGeom>
+        <a:gradFill rotWithShape="0">
+          <a:gsLst>
+            <a:gs pos="0">
+              <a:schemeClr val="accent4">
+                <a:hueOff val="0"/>
+                <a:satOff val="0"/>
+                <a:lumOff val="0"/>
+                <a:alphaOff val="0"/>
+                <a:shade val="51000"/>
+                <a:satMod val="130000"/>
+              </a:schemeClr>
+            </a:gs>
+            <a:gs pos="80000">
+              <a:schemeClr val="accent4">
+                <a:hueOff val="0"/>
+                <a:satOff val="0"/>
+                <a:lumOff val="0"/>
+                <a:alphaOff val="0"/>
+                <a:shade val="93000"/>
+                <a:satMod val="130000"/>
+              </a:schemeClr>
+            </a:gs>
+            <a:gs pos="100000">
+              <a:schemeClr val="accent4">
+                <a:hueOff val="0"/>
+                <a:satOff val="0"/>
+                <a:lumOff val="0"/>
+                <a:alphaOff val="0"/>
+                <a:shade val="94000"/>
+                <a:satMod val="135000"/>
+              </a:schemeClr>
+            </a:gs>
+          </a:gsLst>
+          <a:lin ang="16200000" scaled="0"/>
+        </a:gradFill>
+        <a:ln>
+          <a:noFill/>
+        </a:ln>
+        <a:effectLst>
+          <a:outerShdw blurRad="40000" dist="23000" dir="5400000" rotWithShape="0">
+            <a:srgbClr val="000000">
+              <a:alpha val="35000"/>
+            </a:srgbClr>
+          </a:outerShdw>
+        </a:effectLst>
+        <a:scene3d>
+          <a:camera prst="orthographicFront">
+            <a:rot lat="0" lon="0" rev="0"/>
+          </a:camera>
+          <a:lightRig rig="threePt" dir="t">
+            <a:rot lat="0" lon="0" rev="1200000"/>
+          </a:lightRig>
+        </a:scene3d>
+        <a:sp3d>
+          <a:bevelT w="63500" h="25400"/>
+        </a:sp3d>
+      </dsp:spPr>
+      <dsp:style>
+        <a:lnRef idx="0">
+          <a:scrgbClr r="0" g="0" b="0"/>
+        </a:lnRef>
+        <a:fillRef idx="3">
+          <a:scrgbClr r="0" g="0" b="0"/>
+        </a:fillRef>
+        <a:effectRef idx="3">
+          <a:scrgbClr r="0" g="0" b="0"/>
+        </a:effectRef>
+        <a:fontRef idx="minor">
+          <a:schemeClr val="lt1"/>
+        </a:fontRef>
+      </dsp:style>
+      <dsp:txBody>
+        <a:bodyPr spcFirstLastPara="0" vert="horz" wrap="square" lIns="35560" tIns="35560" rIns="35560" bIns="35560" numCol="1" spcCol="1270" anchor="ctr" anchorCtr="0">
+          <a:noAutofit/>
+        </a:bodyPr>
+        <a:lstStyle/>
+        <a:p>
+          <a:pPr lvl="0" algn="ctr" defTabSz="1244600">
+            <a:lnSpc>
+              <a:spcPct val="90000"/>
+            </a:lnSpc>
+            <a:spcBef>
+              <a:spcPct val="0"/>
+            </a:spcBef>
+            <a:spcAft>
+              <a:spcPct val="35000"/>
+            </a:spcAft>
+          </a:pPr>
+          <a:r>
+            <a:rPr lang="en-US" sz="2800" kern="1200" dirty="0" smtClean="0"/>
+            <a:t> </a:t>
+          </a:r>
+          <a:endParaRPr lang="en-US" sz="2800" kern="1200" dirty="0"/>
+        </a:p>
+      </dsp:txBody>
+      <dsp:txXfrm>
+        <a:off x="907263" y="221507"/>
+        <a:ext cx="471384" cy="471384"/>
       </dsp:txXfrm>
     </dsp:sp>
   </dsp:spTree>
@@ -14094,44 +14661,16 @@
 </file>
 
 <file path=ppt/diagrams/layout5.xml><?xml version="1.0" encoding="utf-8"?>
-<dgm:layoutDef xmlns:dgm="http://schemas.openxmlformats.org/drawingml/2006/diagram" xmlns:a="http://schemas.openxmlformats.org/drawingml/2006/main" uniqueId="urn:microsoft.com/office/officeart/2008/layout/CaptionedPictures">
+<dgm:layoutDef xmlns:dgm="http://schemas.openxmlformats.org/drawingml/2006/diagram" xmlns:a="http://schemas.openxmlformats.org/drawingml/2006/main" uniqueId="urn:microsoft.com/office/officeart/2005/8/layout/equation2">
   <dgm:title val=""/>
   <dgm:desc val=""/>
   <dgm:catLst>
-    <dgm:cat type="picture" pri="5000"/>
-    <dgm:cat type="pictureconvert" pri="5000"/>
+    <dgm:cat type="relationship" pri="18000"/>
+    <dgm:cat type="process" pri="26000"/>
   </dgm:catLst>
-  <dgm:sampData>
+  <dgm:sampData useDef="1">
     <dgm:dataModel>
-      <dgm:ptLst>
-        <dgm:pt modelId="0" type="doc"/>
-        <dgm:pt modelId="10">
-          <dgm:prSet phldr="1"/>
-        </dgm:pt>
-        <dgm:pt modelId="11">
-          <dgm:prSet phldr="1"/>
-        </dgm:pt>
-        <dgm:pt modelId="20">
-          <dgm:prSet phldr="1"/>
-        </dgm:pt>
-        <dgm:pt modelId="21">
-          <dgm:prSet phldr="1"/>
-        </dgm:pt>
-        <dgm:pt modelId="30">
-          <dgm:prSet phldr="1"/>
-        </dgm:pt>
-        <dgm:pt modelId="31">
-          <dgm:prSet phldr="1"/>
-        </dgm:pt>
-      </dgm:ptLst>
-      <dgm:cxnLst>
-        <dgm:cxn modelId="60" srcId="0" destId="10" srcOrd="0" destOrd="0"/>
-        <dgm:cxn modelId="12" srcId="10" destId="11" srcOrd="0" destOrd="0"/>
-        <dgm:cxn modelId="70" srcId="0" destId="20" srcOrd="1" destOrd="0"/>
-        <dgm:cxn modelId="22" srcId="20" destId="21" srcOrd="0" destOrd="0"/>
-        <dgm:cxn modelId="80" srcId="0" destId="30" srcOrd="2" destOrd="0"/>
-        <dgm:cxn modelId="32" srcId="30" destId="31" srcOrd="0" destOrd="0"/>
-      </dgm:cxnLst>
+      <dgm:ptLst/>
       <dgm:bg/>
       <dgm:whole/>
     </dgm:dataModel>
@@ -14140,24 +14679,12 @@
     <dgm:dataModel>
       <dgm:ptLst>
         <dgm:pt modelId="0" type="doc"/>
-        <dgm:pt modelId="10">
-          <dgm:prSet phldr="1"/>
-        </dgm:pt>
-        <dgm:pt modelId="11">
-          <dgm:prSet phldr="1"/>
-        </dgm:pt>
-        <dgm:pt modelId="20">
-          <dgm:prSet phldr="1"/>
-        </dgm:pt>
-        <dgm:pt modelId="21">
-          <dgm:prSet phldr="1"/>
-        </dgm:pt>
+        <dgm:pt modelId="1"/>
+        <dgm:pt modelId="2"/>
       </dgm:ptLst>
       <dgm:cxnLst>
-        <dgm:cxn modelId="60" srcId="0" destId="10" srcOrd="0" destOrd="0"/>
-        <dgm:cxn modelId="12" srcId="10" destId="11" srcOrd="0" destOrd="0"/>
-        <dgm:cxn modelId="70" srcId="0" destId="20" srcOrd="1" destOrd="0"/>
-        <dgm:cxn modelId="22" srcId="20" destId="21" srcOrd="0" destOrd="0"/>
+        <dgm:cxn modelId="3" srcId="0" destId="1" srcOrd="0" destOrd="0"/>
+        <dgm:cxn modelId="4" srcId="0" destId="2" srcOrd="1" destOrd="0"/>
       </dgm:cxnLst>
       <dgm:bg/>
       <dgm:whole/>
@@ -14167,40 +14694,16 @@
     <dgm:dataModel>
       <dgm:ptLst>
         <dgm:pt modelId="0" type="doc"/>
-        <dgm:pt modelId="10">
-          <dgm:prSet phldr="1"/>
-        </dgm:pt>
-        <dgm:pt modelId="11">
-          <dgm:prSet phldr="1"/>
-        </dgm:pt>
-        <dgm:pt modelId="20">
-          <dgm:prSet phldr="1"/>
-        </dgm:pt>
-        <dgm:pt modelId="21">
-          <dgm:prSet phldr="1"/>
-        </dgm:pt>
-        <dgm:pt modelId="30">
-          <dgm:prSet phldr="1"/>
-        </dgm:pt>
-        <dgm:pt modelId="31">
-          <dgm:prSet phldr="1"/>
-        </dgm:pt>
-        <dgm:pt modelId="40">
-          <dgm:prSet phldr="1"/>
-        </dgm:pt>
-        <dgm:pt modelId="41">
-          <dgm:prSet phldr="1"/>
-        </dgm:pt>
+        <dgm:pt modelId="1"/>
+        <dgm:pt modelId="2"/>
+        <dgm:pt modelId="3"/>
+        <dgm:pt modelId="4"/>
       </dgm:ptLst>
       <dgm:cxnLst>
-        <dgm:cxn modelId="60" srcId="0" destId="10" srcOrd="0" destOrd="0"/>
-        <dgm:cxn modelId="12" srcId="10" destId="11" srcOrd="0" destOrd="0"/>
-        <dgm:cxn modelId="70" srcId="0" destId="20" srcOrd="1" destOrd="0"/>
-        <dgm:cxn modelId="22" srcId="20" destId="21" srcOrd="0" destOrd="0"/>
-        <dgm:cxn modelId="80" srcId="0" destId="30" srcOrd="2" destOrd="0"/>
-        <dgm:cxn modelId="32" srcId="30" destId="31" srcOrd="0" destOrd="0"/>
-        <dgm:cxn modelId="90" srcId="0" destId="40" srcOrd="3" destOrd="0"/>
-        <dgm:cxn modelId="42" srcId="40" destId="41" srcOrd="0" destOrd="0"/>
+        <dgm:cxn modelId="5" srcId="0" destId="1" srcOrd="0" destOrd="0"/>
+        <dgm:cxn modelId="6" srcId="0" destId="2" srcOrd="1" destOrd="0"/>
+        <dgm:cxn modelId="7" srcId="0" destId="3" srcOrd="2" destOrd="0"/>
+        <dgm:cxn modelId="8" srcId="0" destId="4" srcOrd="3" destOrd="0"/>
       </dgm:cxnLst>
       <dgm:bg/>
       <dgm:whole/>
@@ -14208,205 +14711,216 @@
   </dgm:clrData>
   <dgm:layoutNode name="Name0">
     <dgm:varLst>
-      <dgm:chMax/>
-      <dgm:chPref/>
       <dgm:dir/>
+      <dgm:resizeHandles val="exact"/>
     </dgm:varLst>
     <dgm:choose name="Name1">
       <dgm:if name="Name2" func="var" arg="dir" op="equ" val="norm">
-        <dgm:alg type="snake">
-          <dgm:param type="off" val="ctr"/>
+        <dgm:alg type="lin">
+          <dgm:param type="linDir" val="fromL"/>
+          <dgm:param type="fallback" val="2D"/>
         </dgm:alg>
       </dgm:if>
       <dgm:else name="Name3">
-        <dgm:alg type="snake">
-          <dgm:param type="grDir" val="tR"/>
-          <dgm:param type="off" val="ctr"/>
+        <dgm:alg type="lin">
+          <dgm:param type="linDir" val="fromR"/>
+          <dgm:param type="fallback" val="2D"/>
         </dgm:alg>
       </dgm:else>
     </dgm:choose>
     <dgm:shape xmlns:r="http://schemas.openxmlformats.org/officeDocument/2006/relationships" r:blip="">
       <dgm:adjLst/>
     </dgm:shape>
-    <dgm:constrLst>
-      <dgm:constr type="primFontSz" for="des" forName="Parent" op="equ"/>
-      <dgm:constr type="primFontSz" for="des" forName="Child" refType="primFontSz" refFor="des" refForName="Parent" op="lte"/>
-      <dgm:constr type="w" for="ch" forName="composite" refType="w"/>
-      <dgm:constr type="h" for="ch" forName="composite" refType="h"/>
-      <dgm:constr type="sp" refType="w" refFor="ch" refForName="composite" op="equ" fact="0.1"/>
-      <dgm:constr type="w" for="ch" forName="sibTrans" refType="w" refFor="ch" refForName="composite" op="equ" fact="0.1"/>
-      <dgm:constr type="h" for="ch" forName="sibTrans" refType="w" refFor="ch" refForName="sibTrans" op="equ"/>
-    </dgm:constrLst>
-    <dgm:forEach name="nodesForEach" axis="ch" ptType="node">
-      <dgm:layoutNode name="composite">
-        <dgm:varLst>
-          <dgm:chMax val="1"/>
-          <dgm:chPref val="1"/>
-        </dgm:varLst>
-        <dgm:alg type="composite">
-          <dgm:param type="ar" val="0.85"/>
-        </dgm:alg>
-        <dgm:shape xmlns:r="http://schemas.openxmlformats.org/officeDocument/2006/relationships" r:blip="">
-          <dgm:adjLst/>
-        </dgm:shape>
+    <dgm:presOf/>
+    <dgm:choose name="Name4">
+      <dgm:if name="Name5" axis="ch" ptType="node" func="cnt" op="gte" val="3">
         <dgm:constrLst>
-          <dgm:constr type="l" for="ch" forName="Accent" refType="w" fact="0"/>
-          <dgm:constr type="t" for="ch" forName="Accent" refType="h" fact="0"/>
-          <dgm:constr type="w" for="ch" forName="Accent" refType="w"/>
-          <dgm:constr type="h" for="ch" forName="Accent" refType="h"/>
-          <dgm:constr type="l" for="ch" forName="Image" refType="w" fact="0.05"/>
-          <dgm:constr type="t" for="ch" forName="Image" refType="h" fact="0.04"/>
-          <dgm:constr type="w" for="ch" forName="Image" refType="w" fact="0.9"/>
-          <dgm:constr type="h" for="ch" forName="Image" refType="h" fact="0.65"/>
-          <dgm:constr type="l" for="ch" forName="ChildComposite" refType="w" fact="0.05"/>
-          <dgm:constr type="t" for="ch" forName="ChildComposite" refType="h" fact="0.69"/>
-          <dgm:constr type="w" for="ch" forName="ChildComposite" refType="w" fact="0.9"/>
-          <dgm:constr type="h" for="ch" forName="ChildComposite" refType="h" fact="0.27"/>
+          <dgm:constr type="h" for="des" forName="node" refType="w" fact="0.5"/>
+          <dgm:constr type="w" for="ch" forName="lastNode" refType="w"/>
+          <dgm:constr type="w" for="des" forName="node" refType="h" refFor="des" refForName="node"/>
+          <dgm:constr type="w" for="ch" forName="sibTransLast" refType="h" refFor="des" refForName="node" fact="0.6"/>
+          <dgm:constr type="h" for="des" forName="sibTrans" refType="h" refFor="des" refForName="node" op="equ" fact="0.58"/>
+          <dgm:constr type="w" for="des" forName="sibTrans" refType="h" refFor="des" refForName="sibTrans" op="equ"/>
+          <dgm:constr type="primFontSz" for="ch" forName="lastNode" op="equ" val="65"/>
+          <dgm:constr type="primFontSz" for="des" forName="node" op="equ" val="65"/>
+          <dgm:constr type="primFontSz" for="des" forName="sibTrans" val="55"/>
+          <dgm:constr type="primFontSz" for="des" forName="sibTrans" refType="primFontSz" refFor="des" refForName="node" op="lte" fact="0.8"/>
+          <dgm:constr type="primFontSz" for="des" forName="connectorText" refType="primFontSz" refFor="des" refForName="node" op="lte" fact="0.8"/>
+          <dgm:constr type="primFontSz" for="des" forName="connectorText" refType="primFontSz" refFor="des" refForName="sibTrans" op="equ"/>
+          <dgm:constr type="h" for="des" forName="spacerT" refType="h" refFor="des" refForName="sibTrans" fact="0.14"/>
+          <dgm:constr type="h" for="des" forName="spacerB" refType="h" refFor="des" refForName="sibTrans" fact="0.14"/>
         </dgm:constrLst>
-        <dgm:layoutNode name="Accent" styleLbl="trAlignAcc1">
-          <dgm:varLst>
-            <dgm:chMax val="0"/>
-            <dgm:chPref val="0"/>
-          </dgm:varLst>
-          <dgm:alg type="sp"/>
-          <dgm:shape xmlns:r="http://schemas.openxmlformats.org/officeDocument/2006/relationships" type="rect" r:blip="">
+      </dgm:if>
+      <dgm:else name="Name6">
+        <dgm:constrLst>
+          <dgm:constr type="h" for="des" forName="node" refType="w"/>
+          <dgm:constr type="w" for="ch" forName="lastNode" refType="w"/>
+          <dgm:constr type="w" for="des" forName="node" refType="h" refFor="des" refForName="node"/>
+          <dgm:constr type="w" for="ch" forName="sibTransLast" refType="h" refFor="des" refForName="node" fact="0.6"/>
+          <dgm:constr type="h" for="des" forName="sibTrans" refType="h" refFor="des" refForName="node" op="equ" fact="0.58"/>
+          <dgm:constr type="w" for="des" forName="sibTrans" refType="h" refFor="des" refForName="sibTrans" op="equ"/>
+          <dgm:constr type="primFontSz" for="des" forName="node" val="65"/>
+          <dgm:constr type="primFontSz" for="ch" forName="lastNode" refType="primFontSz" refFor="des" refForName="node" op="equ"/>
+          <dgm:constr type="primFontSz" for="des" forName="sibTrans" val="55"/>
+          <dgm:constr type="primFontSz" for="des" forName="connectorText" refType="primFontSz" refFor="des" refForName="node" op="lte" fact="0.8"/>
+          <dgm:constr type="primFontSz" for="des" forName="connectorText" refType="primFontSz" refFor="des" refForName="sibTrans" op="equ"/>
+          <dgm:constr type="h" for="des" forName="spacerT" refType="h" refFor="des" refForName="sibTrans" fact="0.14"/>
+          <dgm:constr type="h" for="des" forName="spacerB" refType="h" refFor="des" refForName="sibTrans" fact="0.14"/>
+        </dgm:constrLst>
+      </dgm:else>
+    </dgm:choose>
+    <dgm:ruleLst/>
+    <dgm:choose name="Name7">
+      <dgm:if name="Name8" axis="ch" ptType="node" func="cnt" op="gte" val="1">
+        <dgm:layoutNode name="vNodes">
+          <dgm:alg type="lin">
+            <dgm:param type="linDir" val="fromT"/>
+            <dgm:param type="fallback" val="2D"/>
+          </dgm:alg>
+          <dgm:shape xmlns:r="http://schemas.openxmlformats.org/officeDocument/2006/relationships" r:blip="">
             <dgm:adjLst/>
           </dgm:shape>
           <dgm:presOf/>
+          <dgm:constrLst/>
+          <dgm:ruleLst/>
+          <dgm:forEach name="Name9" axis="ch" ptType="node">
+            <dgm:choose name="Name10">
+              <dgm:if name="Name11" axis="self" func="revPos" op="neq" val="1">
+                <dgm:layoutNode name="node">
+                  <dgm:varLst>
+                    <dgm:bulletEnabled val="1"/>
+                  </dgm:varLst>
+                  <dgm:alg type="tx">
+                    <dgm:param type="txAnchorVertCh" val="mid"/>
+                  </dgm:alg>
+                  <dgm:shape xmlns:r="http://schemas.openxmlformats.org/officeDocument/2006/relationships" type="ellipse" r:blip="">
+                    <dgm:adjLst/>
+                  </dgm:shape>
+                  <dgm:presOf axis="desOrSelf" ptType="node"/>
+                  <dgm:constrLst>
+                    <dgm:constr type="tMarg" refType="primFontSz" fact="0.1"/>
+                    <dgm:constr type="bMarg" refType="primFontSz" fact="0.1"/>
+                    <dgm:constr type="lMarg" refType="primFontSz" fact="0.1"/>
+                    <dgm:constr type="rMarg" refType="primFontSz" fact="0.1"/>
+                  </dgm:constrLst>
+                  <dgm:ruleLst>
+                    <dgm:rule type="primFontSz" val="5" fact="NaN" max="NaN"/>
+                  </dgm:ruleLst>
+                </dgm:layoutNode>
+                <dgm:choose name="Name12">
+                  <dgm:if name="Name13" axis="self" ptType="node" func="revPos" op="gt" val="2">
+                    <dgm:forEach name="sibTransForEach" axis="followSib" ptType="sibTrans" cnt="1">
+                      <dgm:layoutNode name="spacerT">
+                        <dgm:alg type="sp"/>
+                        <dgm:shape xmlns:r="http://schemas.openxmlformats.org/officeDocument/2006/relationships" r:blip="">
+                          <dgm:adjLst/>
+                        </dgm:shape>
+                        <dgm:presOf axis="self"/>
+                        <dgm:constrLst/>
+                        <dgm:ruleLst/>
+                      </dgm:layoutNode>
+                      <dgm:layoutNode name="sibTrans">
+                        <dgm:alg type="tx"/>
+                        <dgm:shape xmlns:r="http://schemas.openxmlformats.org/officeDocument/2006/relationships" type="mathPlus" r:blip="">
+                          <dgm:adjLst/>
+                        </dgm:shape>
+                        <dgm:presOf axis="self"/>
+                        <dgm:constrLst>
+                          <dgm:constr type="h" refType="w"/>
+                          <dgm:constr type="lMarg"/>
+                          <dgm:constr type="rMarg"/>
+                          <dgm:constr type="tMarg"/>
+                          <dgm:constr type="bMarg"/>
+                        </dgm:constrLst>
+                        <dgm:ruleLst>
+                          <dgm:rule type="primFontSz" val="5" fact="NaN" max="NaN"/>
+                        </dgm:ruleLst>
+                      </dgm:layoutNode>
+                      <dgm:layoutNode name="spacerB">
+                        <dgm:alg type="sp"/>
+                        <dgm:shape xmlns:r="http://schemas.openxmlformats.org/officeDocument/2006/relationships" r:blip="">
+                          <dgm:adjLst/>
+                        </dgm:shape>
+                        <dgm:presOf axis="self"/>
+                        <dgm:constrLst/>
+                        <dgm:ruleLst/>
+                      </dgm:layoutNode>
+                    </dgm:forEach>
+                  </dgm:if>
+                  <dgm:else name="Name14"/>
+                </dgm:choose>
+              </dgm:if>
+              <dgm:else name="Name15"/>
+            </dgm:choose>
+          </dgm:forEach>
         </dgm:layoutNode>
-        <dgm:layoutNode name="Image" styleLbl="alignImgPlace1">
+        <dgm:choose name="Name16">
+          <dgm:if name="Name17" axis="ch" ptType="node" func="cnt" op="gt" val="1">
+            <dgm:layoutNode name="sibTransLast">
+              <dgm:alg type="conn">
+                <dgm:param type="begPts" val="auto"/>
+                <dgm:param type="endPts" val="auto"/>
+                <dgm:param type="srcNode" val="vNodes"/>
+                <dgm:param type="dstNode" val="lastNode"/>
+              </dgm:alg>
+              <dgm:shape xmlns:r="http://schemas.openxmlformats.org/officeDocument/2006/relationships" type="conn" r:blip="">
+                <dgm:adjLst/>
+              </dgm:shape>
+              <dgm:presOf axis="ch" ptType="sibTrans" st="-1" cnt="1"/>
+              <dgm:constrLst>
+                <dgm:constr type="h" refType="w" fact="0.62"/>
+                <dgm:constr type="connDist"/>
+                <dgm:constr type="begPad" refType="connDist" fact="0.25"/>
+                <dgm:constr type="endPad" refType="connDist" fact="0.22"/>
+              </dgm:constrLst>
+              <dgm:ruleLst/>
+              <dgm:layoutNode name="connectorText">
+                <dgm:alg type="tx">
+                  <dgm:param type="autoTxRot" val="grav"/>
+                </dgm:alg>
+                <dgm:shape xmlns:r="http://schemas.openxmlformats.org/officeDocument/2006/relationships" type="conn" r:blip="" hideGeom="1">
+                  <dgm:adjLst/>
+                </dgm:shape>
+                <dgm:presOf axis="ch desOrSelf" ptType="sibTrans sibTrans" st="-1 1" cnt="1 0"/>
+                <dgm:constrLst>
+                  <dgm:constr type="lMarg"/>
+                  <dgm:constr type="rMarg"/>
+                  <dgm:constr type="tMarg"/>
+                  <dgm:constr type="bMarg"/>
+                </dgm:constrLst>
+                <dgm:ruleLst>
+                  <dgm:rule type="primFontSz" val="5" fact="NaN" max="NaN"/>
+                </dgm:ruleLst>
+              </dgm:layoutNode>
+            </dgm:layoutNode>
+          </dgm:if>
+          <dgm:else name="Name18"/>
+        </dgm:choose>
+        <dgm:layoutNode name="lastNode">
           <dgm:varLst>
-            <dgm:chMax val="0"/>
-            <dgm:chPref val="0"/>
+            <dgm:bulletEnabled val="1"/>
           </dgm:varLst>
-          <dgm:alg type="sp"/>
-          <dgm:shape xmlns:r="http://schemas.openxmlformats.org/officeDocument/2006/relationships" type="rect" r:blip="" blipPhldr="1">
+          <dgm:alg type="tx">
+            <dgm:param type="txAnchorVertCh" val="mid"/>
+          </dgm:alg>
+          <dgm:shape xmlns:r="http://schemas.openxmlformats.org/officeDocument/2006/relationships" type="ellipse" r:blip="">
             <dgm:adjLst/>
           </dgm:shape>
-          <dgm:presOf/>
+          <dgm:presOf axis="ch desOrSelf" ptType="node node" st="-1 1" cnt="1 0"/>
+          <dgm:constrLst>
+            <dgm:constr type="h" refType="w"/>
+            <dgm:constr type="tMarg" refType="primFontSz" fact="0.1"/>
+            <dgm:constr type="bMarg" refType="primFontSz" fact="0.1"/>
+            <dgm:constr type="lMarg" refType="primFontSz" fact="0.1"/>
+            <dgm:constr type="rMarg" refType="primFontSz" fact="0.1"/>
+          </dgm:constrLst>
+          <dgm:ruleLst>
+            <dgm:rule type="primFontSz" val="5" fact="NaN" max="NaN"/>
+          </dgm:ruleLst>
         </dgm:layoutNode>
-        <dgm:layoutNode name="ChildComposite">
-          <dgm:alg type="composite"/>
-          <dgm:shape xmlns:r="http://schemas.openxmlformats.org/officeDocument/2006/relationships" r:blip="">
-            <dgm:adjLst/>
-          </dgm:shape>
-          <dgm:choose name="Name4">
-            <dgm:if name="Name5" axis="ch" ptType="node" func="cnt" op="gte" val="1">
-              <dgm:constrLst>
-                <dgm:constr type="l" for="ch" forName="Parent" refType="w" fact="0"/>
-                <dgm:constr type="t" for="ch" forName="Parent" refType="h" fact="0"/>
-                <dgm:constr type="w" for="ch" forName="Parent" refType="w"/>
-                <dgm:constr type="h" for="ch" forName="Parent" refType="h" fact="0.3704"/>
-                <dgm:constr type="l" for="ch" forName="Child" refType="w" fact="0"/>
-                <dgm:constr type="t" for="ch" forName="Child" refType="h" fact="0.3704"/>
-                <dgm:constr type="w" for="ch" forName="Child" refType="w"/>
-                <dgm:constr type="h" for="ch" forName="Child" refType="h" fact="0.6296"/>
-              </dgm:constrLst>
-            </dgm:if>
-            <dgm:else name="Name6">
-              <dgm:constrLst>
-                <dgm:constr type="l" for="ch" forName="Parent" refType="w" fact="0"/>
-                <dgm:constr type="t" for="ch" forName="Parent" refType="h" fact="0"/>
-                <dgm:constr type="w" for="ch" forName="Parent" refType="w"/>
-                <dgm:constr type="h" for="ch" forName="Parent" refType="h"/>
-                <dgm:constr type="l" for="ch" forName="Child" refType="w" fact="0"/>
-                <dgm:constr type="t" for="ch" forName="Child" refType="h" fact="0"/>
-                <dgm:constr type="w" for="ch" forName="Child" refType="w" fact="0"/>
-                <dgm:constr type="h" for="ch" forName="Child" refType="h" fact="0"/>
-              </dgm:constrLst>
-            </dgm:else>
-          </dgm:choose>
-          <dgm:layoutNode name="Child" styleLbl="node1">
-            <dgm:varLst>
-              <dgm:chMax val="0"/>
-              <dgm:chPref val="0"/>
-              <dgm:bulletEnabled val="1"/>
-            </dgm:varLst>
-            <dgm:choose name="Name7">
-              <dgm:if name="Name8" axis="ch" ptType="node" func="cnt" op="gt" val="1">
-                <dgm:alg type="tx">
-                  <dgm:param type="parTxLTRAlign" val="l"/>
-                  <dgm:param type="parTxRTLAlign" val="r"/>
-                  <dgm:param type="txAnchorVert" val="mid"/>
-                  <dgm:param type="txAnchorVertCh" val="mid"/>
-                </dgm:alg>
-              </dgm:if>
-              <dgm:else name="Name9">
-                <dgm:alg type="tx">
-                  <dgm:param type="parTxLTRAlign" val="ctr"/>
-                  <dgm:param type="parTxRTLAlign" val="ctr"/>
-                  <dgm:param type="shpTxLTRAlignCh" val="l"/>
-                  <dgm:param type="shpTxRTLAlignCh" val="r"/>
-                  <dgm:param type="txAnchorVert" val="mid"/>
-                  <dgm:param type="txAnchorVertCh" val="mid"/>
-                </dgm:alg>
-              </dgm:else>
-            </dgm:choose>
-            <dgm:choose name="Name10">
-              <dgm:if name="Name11" axis="ch" ptType="node" func="cnt" op="gte" val="1">
-                <dgm:shape xmlns:r="http://schemas.openxmlformats.org/officeDocument/2006/relationships" type="rect" r:blip="">
-                  <dgm:adjLst/>
-                </dgm:shape>
-              </dgm:if>
-              <dgm:else name="Name12">
-                <dgm:shape xmlns:r="http://schemas.openxmlformats.org/officeDocument/2006/relationships" type="rect" r:blip="" hideGeom="1">
-                  <dgm:adjLst/>
-                </dgm:shape>
-              </dgm:else>
-            </dgm:choose>
-            <dgm:choose name="Name13">
-              <dgm:if name="Name14" axis="ch" ptType="node" func="cnt" op="gte" val="1">
-                <dgm:presOf axis="des" ptType="node"/>
-              </dgm:if>
-              <dgm:else name="Name15">
-                <dgm:presOf/>
-              </dgm:else>
-            </dgm:choose>
-            <dgm:constrLst>
-              <dgm:constr type="lMarg" refType="primFontSz" fact="0.3"/>
-              <dgm:constr type="rMarg" refType="primFontSz" fact="0.3"/>
-              <dgm:constr type="tMarg" refType="primFontSz" fact="0.3"/>
-              <dgm:constr type="bMarg" refType="primFontSz" fact="0.3"/>
-            </dgm:constrLst>
-            <dgm:ruleLst>
-              <dgm:rule type="primFontSz" val="5" fact="NaN" max="NaN"/>
-            </dgm:ruleLst>
-          </dgm:layoutNode>
-          <dgm:layoutNode name="Parent" styleLbl="revTx">
-            <dgm:varLst>
-              <dgm:chMax val="1"/>
-              <dgm:chPref val="0"/>
-              <dgm:bulletEnabled val="1"/>
-            </dgm:varLst>
-            <dgm:alg type="tx">
-              <dgm:param type="shpTxLTRAlignCh" val="ctr"/>
-              <dgm:param type="txAnchorVert" val="mid"/>
-            </dgm:alg>
-            <dgm:shape xmlns:r="http://schemas.openxmlformats.org/officeDocument/2006/relationships" type="rect" r:blip="">
-              <dgm:adjLst/>
-            </dgm:shape>
-            <dgm:presOf axis="self" ptType="node"/>
-            <dgm:constrLst>
-              <dgm:constr type="lMarg" refType="primFontSz" fact="0.3"/>
-              <dgm:constr type="rMarg" refType="primFontSz" fact="0.3"/>
-              <dgm:constr type="tMarg" refType="primFontSz" fact="0.3"/>
-              <dgm:constr type="bMarg" refType="primFontSz" fact="0.3"/>
-            </dgm:constrLst>
-            <dgm:ruleLst>
-              <dgm:rule type="primFontSz" val="5" fact="NaN" max="NaN"/>
-            </dgm:ruleLst>
-          </dgm:layoutNode>
-        </dgm:layoutNode>
-      </dgm:layoutNode>
-      <dgm:forEach name="sibTransForEach" axis="followSib" ptType="sibTrans" cnt="1">
-        <dgm:layoutNode name="sibTrans">
-          <dgm:alg type="sp"/>
-          <dgm:shape xmlns:r="http://schemas.openxmlformats.org/officeDocument/2006/relationships" r:blip="">
-            <dgm:adjLst/>
-          </dgm:shape>
-        </dgm:layoutNode>
-      </dgm:forEach>
-    </dgm:forEach>
+      </dgm:if>
+      <dgm:else name="Name19"/>
+    </dgm:choose>
   </dgm:layoutNode>
 </dgm:layoutDef>
 </file>
@@ -18776,11 +19290,11 @@
 </file>
 
 <file path=ppt/diagrams/quickStyle5.xml><?xml version="1.0" encoding="utf-8"?>
-<dgm:styleDef xmlns:dgm="http://schemas.openxmlformats.org/drawingml/2006/diagram" xmlns:a="http://schemas.openxmlformats.org/drawingml/2006/main" uniqueId="urn:microsoft.com/office/officeart/2005/8/quickstyle/simple3">
+<dgm:styleDef xmlns:dgm="http://schemas.openxmlformats.org/drawingml/2006/diagram" xmlns:a="http://schemas.openxmlformats.org/drawingml/2006/main" uniqueId="urn:microsoft.com/office/officeart/2005/8/quickstyle/simple5">
   <dgm:title val=""/>
   <dgm:desc val=""/>
   <dgm:catLst>
-    <dgm:cat type="simple" pri="10300"/>
+    <dgm:cat type="simple" pri="10500"/>
   </dgm:catLst>
   <dgm:scene3d>
     <a:camera prst="orthographicFront"/>
@@ -18789,68 +19303,62 @@
   <dgm:styleLbl name="node0">
     <dgm:scene3d>
       <a:camera prst="orthographicFront"/>
-      <a:lightRig rig="flat" dir="t"/>
+      <a:lightRig rig="threePt" dir="t"/>
     </dgm:scene3d>
-    <dgm:sp3d prstMaterial="dkEdge">
-      <a:bevelT w="8200" h="38100"/>
-    </dgm:sp3d>
+    <dgm:sp3d/>
     <dgm:txPr/>
     <dgm:style>
       <a:lnRef idx="0">
         <a:scrgbClr r="0" g="0" b="0"/>
       </a:lnRef>
-      <a:fillRef idx="2">
+      <a:fillRef idx="3">
         <a:scrgbClr r="0" g="0" b="0"/>
       </a:fillRef>
-      <a:effectRef idx="1">
+      <a:effectRef idx="3">
         <a:scrgbClr r="0" g="0" b="0"/>
       </a:effectRef>
       <a:fontRef idx="minor">
-        <a:schemeClr val="dk1"/>
+        <a:schemeClr val="lt1"/>
       </a:fontRef>
     </dgm:style>
   </dgm:styleLbl>
   <dgm:styleLbl name="lnNode1">
     <dgm:scene3d>
       <a:camera prst="orthographicFront"/>
-      <a:lightRig rig="flat" dir="t"/>
+      <a:lightRig rig="threePt" dir="t"/>
     </dgm:scene3d>
-    <dgm:sp3d prstMaterial="dkEdge">
-      <a:bevelT w="8200" h="38100"/>
-    </dgm:sp3d>
+    <dgm:sp3d/>
     <dgm:txPr/>
     <dgm:style>
-      <a:lnRef idx="1">
+      <a:lnRef idx="0">
         <a:scrgbClr r="0" g="0" b="0"/>
       </a:lnRef>
-      <a:fillRef idx="2">
+      <a:fillRef idx="3">
         <a:scrgbClr r="0" g="0" b="0"/>
       </a:fillRef>
-      <a:effectRef idx="0">
+      <a:effectRef idx="3">
         <a:scrgbClr r="0" g="0" b="0"/>
       </a:effectRef>
       <a:fontRef idx="minor">
-        <a:schemeClr val="dk1"/>
+        <a:schemeClr val="lt1"/>
       </a:fontRef>
     </dgm:style>
   </dgm:styleLbl>
   <dgm:styleLbl name="vennNode1">
     <dgm:scene3d>
       <a:camera prst="orthographicFront"/>
-      <a:lightRig rig="flat" dir="t"/>
+      <a:lightRig rig="threePt" dir="t"/>
     </dgm:scene3d>
-    <dgm:sp3d prstMaterial="dkEdge">
-      <a:bevelT w="8200" h="38100"/>
-    </dgm:sp3d>
+    <dgm:sp3d/>
     <dgm:txPr/>
     <dgm:style>
       <a:lnRef idx="0">
         <a:scrgbClr r="0" g="0" b="0"/>
       </a:lnRef>
-      <a:fillRef idx="2">
+      <a:fillRef idx="3">
         <a:scrgbClr r="0" g="0" b="0"/>
       </a:fillRef>
-      <a:effectRef idx="0">
+      <a:effectRef idx="3">
         <a:scrgbClr r="0" g="0" b="0"/>
       </a:effectRef>
       <a:fontRef idx="minor">
@@ -18869,110 +19377,102 @@
       <a:lnRef idx="1">
         <a:scrgbClr r="0" g="0" b="0"/>
       </a:lnRef>
-      <a:fillRef idx="2">
+      <a:fillRef idx="3">
         <a:scrgbClr r="0" g="0" b="0"/>
       </a:fillRef>
-      <a:effectRef idx="1">
+      <a:effectRef idx="3">
         <a:scrgbClr r="0" g="0" b="0"/>
       </a:effectRef>
       <a:fontRef idx="minor">
-        <a:schemeClr val="dk1"/>
+        <a:schemeClr val="lt1"/>
       </a:fontRef>
     </dgm:style>
   </dgm:styleLbl>
   <dgm:styleLbl name="node1">
     <dgm:scene3d>
       <a:camera prst="orthographicFront"/>
-      <a:lightRig rig="flat" dir="t"/>
+      <a:lightRig rig="threePt" dir="t"/>
     </dgm:scene3d>
-    <dgm:sp3d prstMaterial="dkEdge">
-      <a:bevelT w="8200" h="38100"/>
-    </dgm:sp3d>
+    <dgm:sp3d/>
     <dgm:txPr/>
     <dgm:style>
       <a:lnRef idx="0">
         <a:scrgbClr r="0" g="0" b="0"/>
       </a:lnRef>
-      <a:fillRef idx="2">
+      <a:fillRef idx="3">
         <a:scrgbClr r="0" g="0" b="0"/>
       </a:fillRef>
-      <a:effectRef idx="1">
+      <a:effectRef idx="3">
         <a:scrgbClr r="0" g="0" b="0"/>
       </a:effectRef>
       <a:fontRef idx="minor">
-        <a:schemeClr val="dk1"/>
+        <a:schemeClr val="lt1"/>
       </a:fontRef>
     </dgm:style>
   </dgm:styleLbl>
   <dgm:styleLbl name="node2">
     <dgm:scene3d>
       <a:camera prst="orthographicFront"/>
-      <a:lightRig rig="flat" dir="t"/>
+      <a:lightRig rig="threePt" dir="t"/>
     </dgm:scene3d>
-    <dgm:sp3d prstMaterial="dkEdge">
-      <a:bevelT w="8200" h="38100"/>
-    </dgm:sp3d>
+    <dgm:sp3d/>
     <dgm:txPr/>
     <dgm:style>
       <a:lnRef idx="0">
         <a:scrgbClr r="0" g="0" b="0"/>
       </a:lnRef>
-      <a:fillRef idx="2">
+      <a:fillRef idx="3">
         <a:scrgbClr r="0" g="0" b="0"/>
       </a:fillRef>
-      <a:effectRef idx="1">
+      <a:effectRef idx="3">
         <a:scrgbClr r="0" g="0" b="0"/>
       </a:effectRef>
       <a:fontRef idx="minor">
-        <a:schemeClr val="dk1"/>
+        <a:schemeClr val="lt1"/>
       </a:fontRef>
     </dgm:style>
   </dgm:styleLbl>
   <dgm:styleLbl name="node3">
     <dgm:scene3d>
       <a:camera prst="orthographicFront"/>
-      <a:lightRig rig="flat" dir="t"/>
+      <a:lightRig rig="threePt" dir="t"/>
     </dgm:scene3d>
-    <dgm:sp3d prstMaterial="dkEdge">
-      <a:bevelT w="8200" h="38100"/>
-    </dgm:sp3d>
+    <dgm:sp3d/>
     <dgm:txPr/>
     <dgm:style>
       <a:lnRef idx="0">
         <a:scrgbClr r="0" g="0" b="0"/>
       </a:lnRef>
-      <a:fillRef idx="2">
+      <a:fillRef idx="3">
         <a:scrgbClr r="0" g="0" b="0"/>
       </a:fillRef>
-      <a:effectRef idx="1">
+      <a:effectRef idx="3">
         <a:scrgbClr r="0" g="0" b="0"/>
       </a:effectRef>
       <a:fontRef idx="minor">
-        <a:schemeClr val="dk1"/>
+        <a:schemeClr val="lt1"/>
       </a:fontRef>
     </dgm:style>
   </dgm:styleLbl>
   <dgm:styleLbl name="node4">
     <dgm:scene3d>
       <a:camera prst="orthographicFront"/>
-      <a:lightRig rig="flat" dir="t"/>
+      <a:lightRig rig="threePt" dir="t"/>
     </dgm:scene3d>
-    <dgm:sp3d prstMaterial="dkEdge">
-      <a:bevelT w="8200" h="38100"/>
-    </dgm:sp3d>
+    <dgm:sp3d/>
     <dgm:txPr/>
     <dgm:style>
       <a:lnRef idx="0">
         <a:scrgbClr r="0" g="0" b="0"/>
       </a:lnRef>
-      <a:fillRef idx="2">
+      <a:fillRef idx="3">
         <a:scrgbClr r="0" g="0" b="0"/>
       </a:fillRef>
-      <a:effectRef idx="1">
+      <a:effectRef idx="3">
         <a:scrgbClr r="0" g="0" b="0"/>
       </a:effectRef>
       <a:fontRef idx="minor">
-        <a:schemeClr val="dk1"/>
+        <a:schemeClr val="lt1"/>
       </a:fontRef>
     </dgm:style>
   </dgm:styleLbl>
@@ -18984,13 +19484,13 @@
     <dgm:sp3d/>
     <dgm:txPr/>
     <dgm:style>
-      <a:lnRef idx="1">
+      <a:lnRef idx="0">
         <a:scrgbClr r="0" g="0" b="0"/>
       </a:lnRef>
       <a:fillRef idx="1">
         <a:scrgbClr r="0" g="0" b="0"/>
       </a:fillRef>
-      <a:effectRef idx="1">
+      <a:effectRef idx="3">
         <a:scrgbClr r="0" g="0" b="0"/>
       </a:effectRef>
       <a:fontRef idx="minor"/>
@@ -19004,13 +19504,13 @@
     <dgm:sp3d/>
     <dgm:txPr/>
     <dgm:style>
-      <a:lnRef idx="1">
+      <a:lnRef idx="0">
         <a:scrgbClr r="0" g="0" b="0"/>
       </a:lnRef>
       <a:fillRef idx="1">
         <a:scrgbClr r="0" g="0" b="0"/>
       </a:fillRef>
-      <a:effectRef idx="1">
+      <a:effectRef idx="3">
         <a:scrgbClr r="0" g="0" b="0"/>
       </a:effectRef>
       <a:fontRef idx="minor"/>
@@ -19024,13 +19524,13 @@
     <dgm:sp3d/>
     <dgm:txPr/>
     <dgm:style>
-      <a:lnRef idx="1">
+      <a:lnRef idx="0">
         <a:scrgbClr r="0" g="0" b="0"/>
       </a:lnRef>
       <a:fillRef idx="1">
         <a:scrgbClr r="0" g="0" b="0"/>
       </a:fillRef>
-      <a:effectRef idx="1">
+      <a:effectRef idx="3">
         <a:scrgbClr r="0" g="0" b="0"/>
       </a:effectRef>
       <a:fontRef idx="minor"/>
@@ -19047,14 +19547,14 @@
       <a:lnRef idx="0">
         <a:scrgbClr r="0" g="0" b="0"/>
       </a:lnRef>
-      <a:fillRef idx="2">
+      <a:fillRef idx="3">
         <a:scrgbClr r="0" g="0" b="0"/>
       </a:fillRef>
-      <a:effectRef idx="1">
+      <a:effectRef idx="3">
         <a:scrgbClr r="0" g="0" b="0"/>
       </a:effectRef>
       <a:fontRef idx="minor">
-        <a:schemeClr val="dk1"/>
+        <a:schemeClr val="lt1"/>
       </a:fontRef>
     </dgm:style>
   </dgm:styleLbl>
@@ -19069,14 +19569,14 @@
       <a:lnRef idx="0">
         <a:scrgbClr r="0" g="0" b="0"/>
       </a:lnRef>
-      <a:fillRef idx="2">
+      <a:fillRef idx="3">
         <a:scrgbClr r="0" g="0" b="0"/>
       </a:fillRef>
-      <a:effectRef idx="1">
+      <a:effectRef idx="3">
         <a:scrgbClr r="0" g="0" b="0"/>
       </a:effectRef>
       <a:fontRef idx="minor">
-        <a:schemeClr val="dk1"/>
+        <a:schemeClr val="lt1"/>
       </a:fontRef>
     </dgm:style>
   </dgm:styleLbl>
@@ -19091,14 +19591,14 @@
       <a:lnRef idx="0">
         <a:scrgbClr r="0" g="0" b="0"/>
       </a:lnRef>
-      <a:fillRef idx="2">
+      <a:fillRef idx="3">
         <a:scrgbClr r="0" g="0" b="0"/>
       </a:fillRef>
-      <a:effectRef idx="1">
+      <a:effectRef idx="3">
         <a:scrgbClr r="0" g="0" b="0"/>
       </a:effectRef>
       <a:fontRef idx="minor">
-        <a:schemeClr val="dk1"/>
+        <a:schemeClr val="lt1"/>
       </a:fontRef>
     </dgm:style>
   </dgm:styleLbl>
@@ -19133,7 +19633,7 @@
       <a:lnRef idx="1">
         <a:scrgbClr r="0" g="0" b="0"/>
       </a:lnRef>
-      <a:fillRef idx="2">
+      <a:fillRef idx="0">
         <a:scrgbClr r="0" g="0" b="0"/>
       </a:fillRef>
       <a:effectRef idx="1">
@@ -19145,120 +19645,110 @@
   <dgm:styleLbl name="asst0">
     <dgm:scene3d>
       <a:camera prst="orthographicFront"/>
-      <a:lightRig rig="flat" dir="t"/>
+      <a:lightRig rig="threePt" dir="t"/>
     </dgm:scene3d>
-    <dgm:sp3d prstMaterial="dkEdge">
-      <a:bevelT w="8200" h="38100"/>
-    </dgm:sp3d>
+    <dgm:sp3d/>
     <dgm:txPr/>
     <dgm:style>
       <a:lnRef idx="0">
         <a:scrgbClr r="0" g="0" b="0"/>
       </a:lnRef>
-      <a:fillRef idx="2">
+      <a:fillRef idx="3">
         <a:scrgbClr r="0" g="0" b="0"/>
       </a:fillRef>
-      <a:effectRef idx="1">
+      <a:effectRef idx="3">
         <a:scrgbClr r="0" g="0" b="0"/>
       </a:effectRef>
       <a:fontRef idx="minor">
-        <a:schemeClr val="dk1"/>
+        <a:schemeClr val="lt1"/>
       </a:fontRef>
     </dgm:style>
   </dgm:styleLbl>
   <dgm:styleLbl name="asst1">
     <dgm:scene3d>
       <a:camera prst="orthographicFront"/>
-      <a:lightRig rig="flat" dir="t"/>
+      <a:lightRig rig="threePt" dir="t"/>
     </dgm:scene3d>
-    <dgm:sp3d prstMaterial="dkEdge">
-      <a:bevelT w="8200" h="38100"/>
-    </dgm:sp3d>
+    <dgm:sp3d/>
     <dgm:txPr/>
     <dgm:style>
       <a:lnRef idx="0">
         <a:scrgbClr r="0" g="0" b="0"/>
       </a:lnRef>
-      <a:fillRef idx="2">
+      <a:fillRef idx="3">
         <a:scrgbClr r="0" g="0" b="0"/>
       </a:fillRef>
-      <a:effectRef idx="1">
+      <a:effectRef idx="3">
         <a:scrgbClr r="0" g="0" b="0"/>
       </a:effectRef>
       <a:fontRef idx="minor">
-        <a:schemeClr val="dk1"/>
+        <a:schemeClr val="lt1"/>
       </a:fontRef>
     </dgm:style>
   </dgm:styleLbl>
   <dgm:styleLbl name="asst2">
     <dgm:scene3d>
       <a:camera prst="orthographicFront"/>
-      <a:lightRig rig="flat" dir="t"/>
+      <a:lightRig rig="threePt" dir="t"/>
     </dgm:scene3d>
-    <dgm:sp3d prstMaterial="dkEdge">
-      <a:bevelT w="8200" h="38100"/>
-    </dgm:sp3d>
+    <dgm:sp3d/>
     <dgm:txPr/>
     <dgm:style>
       <a:lnRef idx="0">
         <a:scrgbClr r="0" g="0" b="0"/>
       </a:lnRef>
-      <a:fillRef idx="2">
+      <a:fillRef idx="3">
         <a:scrgbClr r="0" g="0" b="0"/>
       </a:fillRef>
-      <a:effectRef idx="1">
+      <a:effectRef idx="3">
         <a:scrgbClr r="0" g="0" b="0"/>
       </a:effectRef>
       <a:fontRef idx="minor">
-        <a:schemeClr val="dk1"/>
+        <a:schemeClr val="lt1"/>
       </a:fontRef>
     </dgm:style>
   </dgm:styleLbl>
   <dgm:styleLbl name="asst3">
     <dgm:scene3d>
       <a:camera prst="orthographicFront"/>
-      <a:lightRig rig="flat" dir="t"/>
+      <a:lightRig rig="threePt" dir="t"/>
     </dgm:scene3d>
-    <dgm:sp3d prstMaterial="dkEdge">
-      <a:bevelT w="8200" h="38100"/>
-    </dgm:sp3d>
+    <dgm:sp3d/>
     <dgm:txPr/>
     <dgm:style>
       <a:lnRef idx="0">
         <a:scrgbClr r="0" g="0" b="0"/>
       </a:lnRef>
-      <a:fillRef idx="2">
+      <a:fillRef idx="3">
         <a:scrgbClr r="0" g="0" b="0"/>
       </a:fillRef>
-      <a:effectRef idx="1">
+      <a:effectRef idx="3">
         <a:scrgbClr r="0" g="0" b="0"/>
       </a:effectRef>
       <a:fontRef idx="minor">
-        <a:schemeClr val="dk1"/>
+        <a:schemeClr val="lt1"/>
       </a:fontRef>
     </dgm:style>
   </dgm:styleLbl>
   <dgm:styleLbl name="asst4">
     <dgm:scene3d>
       <a:camera prst="orthographicFront"/>
-      <a:lightRig rig="flat" dir="t"/>
+      <a:lightRig rig="threePt" dir="t"/>
     </dgm:scene3d>
-    <dgm:sp3d prstMaterial="dkEdge">
-      <a:bevelT w="8200" h="38100"/>
-    </dgm:sp3d>
+    <dgm:sp3d/>
     <dgm:txPr/>
     <dgm:style>
       <a:lnRef idx="0">
         <a:scrgbClr r="0" g="0" b="0"/>
       </a:lnRef>
-      <a:fillRef idx="2">
+      <a:fillRef idx="3">
         <a:scrgbClr r="0" g="0" b="0"/>
       </a:fillRef>
-      <a:effectRef idx="1">
+      <a:effectRef idx="3">
         <a:scrgbClr r="0" g="0" b="0"/>
       </a:effectRef>
       <a:fontRef idx="minor">
-        <a:schemeClr val="dk1"/>
+        <a:schemeClr val="lt1"/>
       </a:fontRef>
     </dgm:style>
   </dgm:styleLbl>
@@ -19270,17 +19760,17 @@
     <dgm:sp3d/>
     <dgm:txPr/>
     <dgm:style>
-      <a:lnRef idx="1">
+      <a:lnRef idx="0">
         <a:scrgbClr r="0" g="0" b="0"/>
       </a:lnRef>
-      <a:fillRef idx="2">
+      <a:fillRef idx="3">
         <a:scrgbClr r="0" g="0" b="0"/>
       </a:fillRef>
-      <a:effectRef idx="1">
+      <a:effectRef idx="3">
         <a:scrgbClr r="0" g="0" b="0"/>
       </a:effectRef>
       <a:fontRef idx="minor">
-        <a:schemeClr val="dk1"/>
+        <a:schemeClr val="lt1"/>
       </a:fontRef>
     </dgm:style>
   </dgm:styleLbl>
@@ -19292,17 +19782,17 @@
     <dgm:sp3d/>
     <dgm:txPr/>
     <dgm:style>
-      <a:lnRef idx="1">
+      <a:lnRef idx="0">
         <a:scrgbClr r="0" g="0" b="0"/>
       </a:lnRef>
-      <a:fillRef idx="2">
+      <a:fillRef idx="3">
         <a:scrgbClr r="0" g="0" b="0"/>
       </a:fillRef>
-      <a:effectRef idx="1">
+      <a:effectRef idx="3">
         <a:scrgbClr r="0" g="0" b="0"/>
       </a:effectRef>
       <a:fontRef idx="minor">
-        <a:schemeClr val="dk1"/>
+        <a:schemeClr val="lt1"/>
       </a:fontRef>
     </dgm:style>
   </dgm:styleLbl>
@@ -19314,17 +19804,17 @@
     <dgm:sp3d/>
     <dgm:txPr/>
     <dgm:style>
-      <a:lnRef idx="1">
+      <a:lnRef idx="0">
         <a:scrgbClr r="0" g="0" b="0"/>
       </a:lnRef>
-      <a:fillRef idx="2">
+      <a:fillRef idx="3">
         <a:scrgbClr r="0" g="0" b="0"/>
       </a:fillRef>
-      <a:effectRef idx="1">
+      <a:effectRef idx="3">
         <a:scrgbClr r="0" g="0" b="0"/>
       </a:effectRef>
       <a:fontRef idx="minor">
-        <a:schemeClr val="dk1"/>
+        <a:schemeClr val="lt1"/>
       </a:fontRef>
     </dgm:style>
   </dgm:styleLbl>
@@ -19336,17 +19826,17 @@
     <dgm:sp3d/>
     <dgm:txPr/>
     <dgm:style>
-      <a:lnRef idx="1">
+      <a:lnRef idx="0">
         <a:scrgbClr r="0" g="0" b="0"/>
       </a:lnRef>
-      <a:fillRef idx="2">
+      <a:fillRef idx="3">
         <a:scrgbClr r="0" g="0" b="0"/>
       </a:fillRef>
-      <a:effectRef idx="1">
+      <a:effectRef idx="3">
         <a:scrgbClr r="0" g="0" b="0"/>
       </a:effectRef>
       <a:fontRef idx="minor">
-        <a:schemeClr val="dk1"/>
+        <a:schemeClr val="lt1"/>
       </a:fontRef>
     </dgm:style>
   </dgm:styleLbl>
@@ -19444,7 +19934,7 @@
       <a:fillRef idx="1">
         <a:scrgbClr r="0" g="0" b="0"/>
       </a:fillRef>
-      <a:effectRef idx="0">
+      <a:effectRef idx="2">
         <a:scrgbClr r="0" g="0" b="0"/>
       </a:effectRef>
       <a:fontRef idx="minor"/>
@@ -19464,7 +19954,7 @@
       <a:fillRef idx="1">
         <a:scrgbClr r="0" g="0" b="0"/>
       </a:fillRef>
-      <a:effectRef idx="0">
+      <a:effectRef idx="2">
         <a:scrgbClr r="0" g="0" b="0"/>
       </a:effectRef>
       <a:fontRef idx="minor"/>
@@ -19484,7 +19974,7 @@
       <a:fillRef idx="1">
         <a:scrgbClr r="0" g="0" b="0"/>
       </a:fillRef>
-      <a:effectRef idx="0">
+      <a:effectRef idx="2">
         <a:scrgbClr r="0" g="0" b="0"/>
       </a:effectRef>
       <a:fontRef idx="minor"/>
@@ -19524,7 +20014,7 @@
       <a:fillRef idx="1">
         <a:scrgbClr r="0" g="0" b="0"/>
       </a:fillRef>
-      <a:effectRef idx="0">
+      <a:effectRef idx="2">
         <a:scrgbClr r="0" g="0" b="0"/>
       </a:effectRef>
       <a:fontRef idx="minor"/>
@@ -19541,10 +20031,10 @@
       <a:lnRef idx="1">
         <a:scrgbClr r="0" g="0" b="0"/>
       </a:lnRef>
-      <a:fillRef idx="2">
+      <a:fillRef idx="1">
         <a:scrgbClr r="0" g="0" b="0"/>
       </a:fillRef>
-      <a:effectRef idx="0">
+      <a:effectRef idx="2">
         <a:scrgbClr r="0" g="0" b="0"/>
       </a:effectRef>
       <a:fontRef idx="minor"/>
@@ -19564,7 +20054,7 @@
       <a:fillRef idx="1">
         <a:scrgbClr r="0" g="0" b="0"/>
       </a:fillRef>
-      <a:effectRef idx="0">
+      <a:effectRef idx="3">
         <a:scrgbClr r="0" g="0" b="0"/>
       </a:effectRef>
       <a:fontRef idx="minor"/>
@@ -19584,7 +20074,7 @@
       <a:fillRef idx="1">
         <a:scrgbClr r="0" g="0" b="0"/>
       </a:fillRef>
-      <a:effectRef idx="0">
+      <a:effectRef idx="3">
         <a:scrgbClr r="0" g="0" b="0"/>
       </a:effectRef>
       <a:fontRef idx="minor"/>
@@ -19604,7 +20094,7 @@
       <a:fillRef idx="1">
         <a:scrgbClr r="0" g="0" b="0"/>
       </a:fillRef>
-      <a:effectRef idx="0">
+      <a:effectRef idx="2">
         <a:scrgbClr r="0" g="0" b="0"/>
       </a:effectRef>
       <a:fontRef idx="minor"/>
@@ -19624,7 +20114,7 @@
       <a:fillRef idx="1">
         <a:scrgbClr r="0" g="0" b="0"/>
       </a:fillRef>
-      <a:effectRef idx="0">
+      <a:effectRef idx="2">
         <a:scrgbClr r="0" g="0" b="0"/>
       </a:effectRef>
       <a:fontRef idx="minor"/>
@@ -19644,7 +20134,7 @@
       <a:fillRef idx="1">
         <a:scrgbClr r="0" g="0" b="0"/>
       </a:fillRef>
-      <a:effectRef idx="0">
+      <a:effectRef idx="2">
         <a:scrgbClr r="0" g="0" b="0"/>
       </a:effectRef>
       <a:fontRef idx="minor"/>
@@ -19664,7 +20154,7 @@
       <a:fillRef idx="1">
         <a:scrgbClr r="0" g="0" b="0"/>
       </a:fillRef>
-      <a:effectRef idx="0">
+      <a:effectRef idx="2">
         <a:scrgbClr r="0" g="0" b="0"/>
       </a:effectRef>
       <a:fontRef idx="minor"/>
@@ -19684,7 +20174,7 @@
       <a:fillRef idx="1">
         <a:scrgbClr r="0" g="0" b="0"/>
       </a:fillRef>
-      <a:effectRef idx="0">
+      <a:effectRef idx="2">
         <a:scrgbClr r="0" g="0" b="0"/>
       </a:effectRef>
       <a:fontRef idx="minor"/>
@@ -19704,7 +20194,7 @@
       <a:fillRef idx="1">
         <a:scrgbClr r="0" g="0" b="0"/>
       </a:fillRef>
-      <a:effectRef idx="0">
+      <a:effectRef idx="2">
         <a:scrgbClr r="0" g="0" b="0"/>
       </a:effectRef>
       <a:fontRef idx="minor"/>
@@ -19724,7 +20214,7 @@
       <a:fillRef idx="1">
         <a:scrgbClr r="0" g="0" b="0"/>
       </a:fillRef>
-      <a:effectRef idx="0">
+      <a:effectRef idx="2">
         <a:scrgbClr r="0" g="0" b="0"/>
       </a:effectRef>
       <a:fontRef idx="minor"/>
@@ -19744,7 +20234,7 @@
       <a:fillRef idx="1">
         <a:scrgbClr r="0" g="0" b="0"/>
       </a:fillRef>
-      <a:effectRef idx="1">
+      <a:effectRef idx="2">
         <a:scrgbClr r="0" g="0" b="0"/>
       </a:effectRef>
       <a:fontRef idx="minor"/>
@@ -19764,7 +20254,7 @@
       <a:fillRef idx="1">
         <a:scrgbClr r="0" g="0" b="0"/>
       </a:fillRef>
-      <a:effectRef idx="1">
+      <a:effectRef idx="3">
         <a:scrgbClr r="0" g="0" b="0"/>
       </a:effectRef>
       <a:fontRef idx="minor"/>
@@ -19793,20 +20283,18 @@
   <dgm:styleLbl name="fgShp">
     <dgm:scene3d>
       <a:camera prst="orthographicFront"/>
-      <a:lightRig rig="flat" dir="t"/>
+      <a:lightRig rig="threePt" dir="t"/>
     </dgm:scene3d>
-    <dgm:sp3d prstMaterial="dkEdge">
-      <a:bevelT w="8200" h="38100"/>
-    </dgm:sp3d>
+    <dgm:sp3d/>
     <dgm:txPr/>
     <dgm:style>
-      <a:lnRef idx="1">
+      <a:lnRef idx="0">
         <a:scrgbClr r="0" g="0" b="0"/>
       </a:lnRef>
-      <a:fillRef idx="2">
+      <a:fillRef idx="3">
         <a:scrgbClr r="0" g="0" b="0"/>
       </a:fillRef>
-      <a:effectRef idx="1">
+      <a:effectRef idx="3">
         <a:scrgbClr r="0" g="0" b="0"/>
       </a:effectRef>
       <a:fontRef idx="minor"/>
@@ -23649,14 +24137,14 @@
           <p:nvPr>
             <p:extLst>
               <p:ext uri="{D42A27DB-BD31-4B8C-83A1-F6EECF244321}">
-                <p14:modId xmlns:p14="http://schemas.microsoft.com/office/powerpoint/2010/main" val="1565728087"/>
+                <p14:modId xmlns:p14="http://schemas.microsoft.com/office/powerpoint/2010/main" val="411328218"/>
               </p:ext>
             </p:extLst>
           </p:nvPr>
         </p:nvGraphicFramePr>
         <p:xfrm>
-          <a:off x="381000" y="0"/>
-          <a:ext cx="2133600" cy="914400"/>
+          <a:off x="533400" y="0"/>
+          <a:ext cx="1752600" cy="914400"/>
         </p:xfrm>
         <a:graphic>
           <a:graphicData uri="http://schemas.openxmlformats.org/drawingml/2006/diagram">
@@ -23666,14 +24154,14 @@
       </p:graphicFrame>
       <p:sp>
         <p:nvSpPr>
-          <p:cNvPr id="4" name="Rectangle 3"/>
+          <p:cNvPr id="3" name="Rectangle 2"/>
           <p:cNvSpPr/>
           <p:nvPr/>
         </p:nvSpPr>
         <p:spPr>
           <a:xfrm>
-            <a:off x="381000" y="-152400"/>
-            <a:ext cx="967370" cy="358382"/>
+            <a:off x="-129170" y="152400"/>
+            <a:ext cx="967370" cy="304800"/>
           </a:xfrm>
           <a:prstGeom prst="rect">
             <a:avLst/>
@@ -23681,31 +24169,13 @@
         </p:spPr>
         <p:style>
           <a:lnRef idx="0">
-            <a:schemeClr val="dk1">
-              <a:alpha val="0"/>
-              <a:hueOff val="0"/>
-              <a:satOff val="0"/>
-              <a:lumOff val="0"/>
-              <a:alphaOff val="0"/>
-            </a:schemeClr>
+            <a:scrgbClr r="0" g="0" b="0"/>
           </a:lnRef>
           <a:fillRef idx="0">
-            <a:schemeClr val="lt1">
-              <a:alpha val="0"/>
-              <a:hueOff val="0"/>
-              <a:satOff val="0"/>
-              <a:lumOff val="0"/>
-              <a:alphaOff val="0"/>
-            </a:schemeClr>
+            <a:scrgbClr r="0" g="0" b="0"/>
           </a:fillRef>
           <a:effectRef idx="0">
-            <a:schemeClr val="lt1">
-              <a:alpha val="0"/>
-              <a:hueOff val="0"/>
-              <a:satOff val="0"/>
-              <a:lumOff val="0"/>
-              <a:alphaOff val="0"/>
-            </a:schemeClr>
+            <a:scrgbClr r="0" g="0" b="0"/>
           </a:effectRef>
           <a:fontRef idx="minor">
             <a:schemeClr val="tx1">
@@ -23716,348 +24186,41 @@
             </a:schemeClr>
           </a:fontRef>
         </p:style>
-      </p:sp>
-      <p:grpSp>
-        <p:nvGrpSpPr>
-          <p:cNvPr id="6" name="Group 5"/>
-          <p:cNvGrpSpPr/>
-          <p:nvPr/>
-        </p:nvGrpSpPr>
-        <p:grpSpPr>
-          <a:xfrm>
-            <a:off x="838200" y="529227"/>
-            <a:ext cx="967370" cy="385173"/>
-            <a:chOff x="-52325" y="44306"/>
-            <a:chExt cx="967370" cy="385173"/>
-          </a:xfrm>
-        </p:grpSpPr>
-        <p:sp>
-          <p:nvSpPr>
-            <p:cNvPr id="7" name="Rectangle 6"/>
-            <p:cNvSpPr/>
-            <p:nvPr/>
-          </p:nvSpPr>
-          <p:spPr>
-            <a:xfrm>
-              <a:off x="-52325" y="71097"/>
-              <a:ext cx="967370" cy="358382"/>
-            </a:xfrm>
-            <a:prstGeom prst="rect">
-              <a:avLst/>
-            </a:prstGeom>
-          </p:spPr>
-          <p:style>
-            <a:lnRef idx="0">
-              <a:schemeClr val="dk1">
-                <a:alpha val="0"/>
-                <a:hueOff val="0"/>
-                <a:satOff val="0"/>
-                <a:lumOff val="0"/>
-                <a:alphaOff val="0"/>
-              </a:schemeClr>
-            </a:lnRef>
-            <a:fillRef idx="0">
-              <a:schemeClr val="lt1">
-                <a:alpha val="0"/>
-                <a:hueOff val="0"/>
-                <a:satOff val="0"/>
-                <a:lumOff val="0"/>
-                <a:alphaOff val="0"/>
-              </a:schemeClr>
-            </a:fillRef>
-            <a:effectRef idx="0">
-              <a:schemeClr val="lt1">
-                <a:alpha val="0"/>
-                <a:hueOff val="0"/>
-                <a:satOff val="0"/>
-                <a:lumOff val="0"/>
-                <a:alphaOff val="0"/>
-              </a:schemeClr>
-            </a:effectRef>
-            <a:fontRef idx="minor">
-              <a:schemeClr val="tx1">
-                <a:hueOff val="0"/>
-                <a:satOff val="0"/>
-                <a:lumOff val="0"/>
-                <a:alphaOff val="0"/>
-              </a:schemeClr>
-            </a:fontRef>
-          </p:style>
-        </p:sp>
-        <p:sp>
-          <p:nvSpPr>
-            <p:cNvPr id="8" name="Rectangle 7"/>
-            <p:cNvSpPr/>
-            <p:nvPr/>
-          </p:nvSpPr>
-          <p:spPr>
-            <a:xfrm>
-              <a:off x="202760" y="44306"/>
-              <a:ext cx="609600" cy="358382"/>
-            </a:xfrm>
-            <a:prstGeom prst="rect">
-              <a:avLst/>
-            </a:prstGeom>
-          </p:spPr>
-          <p:style>
-            <a:lnRef idx="0">
-              <a:scrgbClr r="0" g="0" b="0"/>
-            </a:lnRef>
-            <a:fillRef idx="0">
-              <a:scrgbClr r="0" g="0" b="0"/>
-            </a:fillRef>
-            <a:effectRef idx="0">
-              <a:scrgbClr r="0" g="0" b="0"/>
-            </a:effectRef>
-            <a:fontRef idx="minor">
-              <a:schemeClr val="tx1">
-                <a:hueOff val="0"/>
-                <a:satOff val="0"/>
-                <a:lumOff val="0"/>
-                <a:alphaOff val="0"/>
-              </a:schemeClr>
-            </a:fontRef>
-          </p:style>
-          <p:txBody>
-            <a:bodyPr spcFirstLastPara="0" vert="horz" wrap="square" lIns="20320" tIns="20320" rIns="20320" bIns="2032" numCol="1" spcCol="1270" anchor="b" anchorCtr="0">
-              <a:noAutofit/>
-            </a:bodyPr>
-            <a:lstStyle/>
-            <a:p>
-              <a:pPr lvl="0" algn="r" defTabSz="711200">
-                <a:lnSpc>
-                  <a:spcPct val="90000"/>
-                </a:lnSpc>
-                <a:spcBef>
-                  <a:spcPct val="0"/>
-                </a:spcBef>
-                <a:spcAft>
-                  <a:spcPct val="35000"/>
-                </a:spcAft>
-              </a:pPr>
-              <a:r>
-                <a:rPr lang="en-US" sz="1600" kern="1200" dirty="0" smtClean="0"/>
-                <a:t>Home</a:t>
-              </a:r>
-              <a:endParaRPr lang="en-US" sz="1600" kern="1200" dirty="0"/>
-            </a:p>
-          </p:txBody>
-        </p:sp>
-      </p:grpSp>
-      <p:sp>
-        <p:nvSpPr>
-          <p:cNvPr id="3" name="Homepage"/>
-          <p:cNvSpPr>
-            <a:spLocks noEditPoints="1" noChangeArrowheads="1"/>
-          </p:cNvSpPr>
-          <p:nvPr/>
-        </p:nvSpPr>
-        <p:spPr bwMode="auto">
-          <a:xfrm>
-            <a:off x="1219201" y="76201"/>
-            <a:ext cx="381000" cy="457200"/>
-          </a:xfrm>
-          <a:custGeom>
-            <a:avLst/>
-            <a:gdLst>
-              <a:gd name="T0" fmla="*/ 0 w 21600"/>
-              <a:gd name="T1" fmla="*/ 0 h 21600"/>
-              <a:gd name="T2" fmla="*/ 10800 w 21600"/>
-              <a:gd name="T3" fmla="*/ 0 h 21600"/>
-              <a:gd name="T4" fmla="*/ 21600 w 21600"/>
-              <a:gd name="T5" fmla="*/ 0 h 21600"/>
-              <a:gd name="T6" fmla="*/ 21600 w 21600"/>
-              <a:gd name="T7" fmla="*/ 10800 h 21600"/>
-              <a:gd name="T8" fmla="*/ 21600 w 21600"/>
-              <a:gd name="T9" fmla="*/ 21600 h 21600"/>
-              <a:gd name="T10" fmla="*/ 10800 w 21600"/>
-              <a:gd name="T11" fmla="*/ 21600 h 21600"/>
-              <a:gd name="T12" fmla="*/ 0 w 21600"/>
-              <a:gd name="T13" fmla="*/ 10800 h 21600"/>
-              <a:gd name="T14" fmla="*/ 999 w 21600"/>
-              <a:gd name="T15" fmla="*/ 12174 h 21600"/>
-              <a:gd name="T16" fmla="*/ 20813 w 21600"/>
-              <a:gd name="T17" fmla="*/ 17149 h 21600"/>
-            </a:gdLst>
-            <a:ahLst/>
-            <a:cxnLst>
-              <a:cxn ang="0">
-                <a:pos x="T0" y="T1"/>
-              </a:cxn>
-              <a:cxn ang="0">
-                <a:pos x="T2" y="T3"/>
-              </a:cxn>
-              <a:cxn ang="0">
-                <a:pos x="T4" y="T5"/>
-              </a:cxn>
-              <a:cxn ang="0">
-                <a:pos x="T6" y="T7"/>
-              </a:cxn>
-              <a:cxn ang="0">
-                <a:pos x="T8" y="T9"/>
-              </a:cxn>
-              <a:cxn ang="0">
-                <a:pos x="T10" y="T11"/>
-              </a:cxn>
-              <a:cxn ang="0">
-                <a:pos x="T12" y="T13"/>
-              </a:cxn>
-            </a:cxnLst>
-            <a:rect l="T14" t="T15" r="T16" b="T17"/>
-            <a:pathLst>
-              <a:path w="21600" h="21600" extrusionOk="0">
-                <a:moveTo>
-                  <a:pt x="10757" y="21632"/>
-                </a:moveTo>
-                <a:lnTo>
-                  <a:pt x="5187" y="21632"/>
-                </a:lnTo>
-                <a:lnTo>
-                  <a:pt x="85" y="17509"/>
-                </a:lnTo>
-                <a:lnTo>
-                  <a:pt x="85" y="10849"/>
-                </a:lnTo>
-                <a:lnTo>
-                  <a:pt x="85" y="81"/>
-                </a:lnTo>
-                <a:lnTo>
-                  <a:pt x="10757" y="81"/>
-                </a:lnTo>
-                <a:lnTo>
-                  <a:pt x="21706" y="81"/>
-                </a:lnTo>
-                <a:lnTo>
-                  <a:pt x="21706" y="10652"/>
-                </a:lnTo>
-                <a:lnTo>
-                  <a:pt x="21706" y="21632"/>
-                </a:lnTo>
-                <a:lnTo>
-                  <a:pt x="10757" y="21632"/>
-                </a:lnTo>
-                <a:close/>
-              </a:path>
-              <a:path w="21600" h="21600" extrusionOk="0">
-                <a:moveTo>
-                  <a:pt x="85" y="17509"/>
-                </a:moveTo>
-                <a:lnTo>
-                  <a:pt x="5187" y="17509"/>
-                </a:lnTo>
-                <a:lnTo>
-                  <a:pt x="5187" y="21632"/>
-                </a:lnTo>
-                <a:lnTo>
-                  <a:pt x="85" y="17509"/>
-                </a:lnTo>
-                <a:close/>
-              </a:path>
-              <a:path w="21600" h="21600" extrusionOk="0">
-                <a:moveTo>
-                  <a:pt x="5251" y="7101"/>
-                </a:moveTo>
-                <a:lnTo>
-                  <a:pt x="5251" y="11160"/>
-                </a:lnTo>
-                <a:lnTo>
-                  <a:pt x="16306" y="11160"/>
-                </a:lnTo>
-                <a:lnTo>
-                  <a:pt x="16306" y="7052"/>
-                </a:lnTo>
-                <a:lnTo>
-                  <a:pt x="16901" y="6561"/>
-                </a:lnTo>
-                <a:lnTo>
-                  <a:pt x="15264" y="5236"/>
-                </a:lnTo>
-                <a:lnTo>
-                  <a:pt x="15264" y="1636"/>
-                </a:lnTo>
-                <a:lnTo>
-                  <a:pt x="13478" y="1636"/>
-                </a:lnTo>
-                <a:lnTo>
-                  <a:pt x="13478" y="3698"/>
-                </a:lnTo>
-                <a:lnTo>
-                  <a:pt x="11182" y="1669"/>
-                </a:lnTo>
-                <a:lnTo>
-                  <a:pt x="4847" y="6561"/>
-                </a:lnTo>
-                <a:lnTo>
-                  <a:pt x="5251" y="7101"/>
-                </a:lnTo>
-                <a:close/>
-              </a:path>
-              <a:path w="21600" h="21600" extrusionOk="0">
-                <a:moveTo>
-                  <a:pt x="9396" y="11160"/>
-                </a:moveTo>
-                <a:lnTo>
-                  <a:pt x="9396" y="7772"/>
-                </a:lnTo>
-                <a:lnTo>
-                  <a:pt x="11820" y="7772"/>
-                </a:lnTo>
-                <a:lnTo>
-                  <a:pt x="11820" y="11160"/>
-                </a:lnTo>
-                <a:lnTo>
-                  <a:pt x="9396" y="11160"/>
-                </a:lnTo>
-                <a:close/>
-              </a:path>
-            </a:pathLst>
-          </a:custGeom>
-          <a:solidFill>
-            <a:srgbClr val="D8EBB3"/>
-          </a:solidFill>
-          <a:ln w="9525">
-            <a:solidFill>
-              <a:srgbClr val="000000"/>
-            </a:solidFill>
-            <a:miter lim="800000"/>
-            <a:headEnd/>
-            <a:tailEnd/>
-          </a:ln>
-          <a:effectLst>
-            <a:outerShdw dist="107763" dir="2700000" algn="ctr" rotWithShape="0">
-              <a:srgbClr val="808080"/>
-            </a:outerShdw>
-          </a:effectLst>
-        </p:spPr>
         <p:txBody>
-          <a:bodyPr vert="horz" wrap="square" lIns="91440" tIns="45720" rIns="91440" bIns="45720" numCol="1" anchor="t" anchorCtr="0" compatLnSpc="1">
-            <a:prstTxWarp prst="textNoShape">
-              <a:avLst/>
-            </a:prstTxWarp>
+          <a:bodyPr spcFirstLastPara="0" vert="horz" wrap="square" lIns="20320" tIns="20320" rIns="20320" bIns="2032" numCol="1" spcCol="1270" anchor="b" anchorCtr="0">
+            <a:noAutofit/>
           </a:bodyPr>
           <a:lstStyle/>
           <a:p>
-            <a:endParaRPr lang="en-US"/>
+            <a:pPr lvl="0" algn="r" defTabSz="711200">
+              <a:lnSpc>
+                <a:spcPct val="90000"/>
+              </a:lnSpc>
+              <a:spcBef>
+                <a:spcPct val="0"/>
+              </a:spcBef>
+              <a:spcAft>
+                <a:spcPct val="35000"/>
+              </a:spcAft>
+            </a:pPr>
+            <a:r>
+              <a:rPr lang="en-US" sz="1600" kern="1200" dirty="0" smtClean="0"/>
+              <a:t>Videos</a:t>
+            </a:r>
+            <a:endParaRPr lang="en-US" sz="1600" kern="1200" dirty="0"/>
           </a:p>
         </p:txBody>
       </p:sp>
     </p:spTree>
     <p:extLst>
       <p:ext uri="{BB962C8B-B14F-4D97-AF65-F5344CB8AC3E}">
-        <p14:creationId xmlns:p14="http://schemas.microsoft.com/office/powerpoint/2010/main" val="1106808826"/>
+        <p14:creationId xmlns:p14="http://schemas.microsoft.com/office/powerpoint/2010/main" val="297939564"/>
       </p:ext>
     </p:extLst>
   </p:cSld>
   <p:clrMapOvr>
     <a:masterClrMapping/>
   </p:clrMapOvr>
-  <p:timing>
-    <p:tnLst>
-      <p:par>
-        <p:cTn id="1" dur="indefinite" restart="never" nodeType="tmRoot"/>
-      </p:par>
-    </p:tnLst>
-  </p:timing>
 </p:sld>
 </file>
 

</xml_diff>